<commit_message>
Update developer guide. Update the UI section, Calendar section, UndoRedo section.
</commit_message>
<xml_diff>
--- a/docs/diagrams/ArchitectureDiagram.pptx
+++ b/docs/diagrams/ArchitectureDiagram.pptx
@@ -107,6 +107,22 @@
       </a:defRPr>
     </a:lvl9pPr>
   </p:defaultTextStyle>
+  <p:extLst>
+    <p:ext uri="{EFAFB233-063F-42B5-8137-9DF3F51BA10A}">
+      <p15:sldGuideLst xmlns:p15="http://schemas.microsoft.com/office/powerpoint/2012/main">
+        <p15:guide id="1" orient="horz" pos="1488">
+          <p15:clr>
+            <a:srgbClr val="A4A3A4"/>
+          </p15:clr>
+        </p15:guide>
+        <p15:guide id="2" pos="2880">
+          <p15:clr>
+            <a:srgbClr val="A4A3A4"/>
+          </p15:clr>
+        </p15:guide>
+      </p15:sldGuideLst>
+    </p:ext>
+  </p:extLst>
 </p:presentation>
 </file>
 
@@ -192,7 +208,7 @@
           <a:p>
             <a:fld id="{F5CC4B3F-88C1-4FFA-B1B6-F41C21DC6924}" type="datetimeFigureOut">
               <a:rPr lang="en-US" smtClean="0"/>
-              <a:t>10/16/2016</a:t>
+              <a:t>10-Nov-18</a:t>
             </a:fld>
             <a:endParaRPr lang="en-US"/>
           </a:p>
@@ -256,38 +272,37 @@
           <a:p>
             <a:pPr lvl="0"/>
             <a:r>
-              <a:rPr lang="en-US" smtClean="0"/>
+              <a:rPr lang="en-US"/>
               <a:t>Click to edit Master text styles</a:t>
             </a:r>
           </a:p>
           <a:p>
             <a:pPr lvl="1"/>
             <a:r>
-              <a:rPr lang="en-US" smtClean="0"/>
+              <a:rPr lang="en-US"/>
               <a:t>Second level</a:t>
             </a:r>
           </a:p>
           <a:p>
             <a:pPr lvl="2"/>
             <a:r>
-              <a:rPr lang="en-US" smtClean="0"/>
+              <a:rPr lang="en-US"/>
               <a:t>Third level</a:t>
             </a:r>
           </a:p>
           <a:p>
             <a:pPr lvl="3"/>
             <a:r>
-              <a:rPr lang="en-US" smtClean="0"/>
+              <a:rPr lang="en-US"/>
               <a:t>Fourth level</a:t>
             </a:r>
           </a:p>
           <a:p>
             <a:pPr lvl="4"/>
             <a:r>
-              <a:rPr lang="en-US" smtClean="0"/>
+              <a:rPr lang="en-US"/>
               <a:t>Fifth level</a:t>
             </a:r>
-            <a:endParaRPr lang="en-US"/>
           </a:p>
         </p:txBody>
       </p:sp>
@@ -498,10 +513,9 @@
           <a:lstStyle/>
           <a:p>
             <a:r>
-              <a:rPr lang="en-US" smtClean="0"/>
+              <a:rPr lang="en-US"/>
               <a:t>Click to edit Master title style</a:t>
             </a:r>
-            <a:endParaRPr lang="en-US"/>
           </a:p>
         </p:txBody>
       </p:sp>
@@ -617,10 +631,9 @@
           </a:lstStyle>
           <a:p>
             <a:r>
-              <a:rPr lang="en-US" smtClean="0"/>
+              <a:rPr lang="en-US"/>
               <a:t>Click to edit Master subtitle style</a:t>
             </a:r>
-            <a:endParaRPr lang="en-US"/>
           </a:p>
         </p:txBody>
       </p:sp>
@@ -641,7 +654,7 @@
           <a:p>
             <a:fld id="{78C97017-6FC3-485B-9764-EAC9E56C1D49}" type="datetimeFigureOut">
               <a:rPr lang="en-US" smtClean="0"/>
-              <a:t>10/16/2016</a:t>
+              <a:t>10-Nov-18</a:t>
             </a:fld>
             <a:endParaRPr lang="en-US"/>
           </a:p>
@@ -735,10 +748,9 @@
           <a:lstStyle/>
           <a:p>
             <a:r>
-              <a:rPr lang="en-US" smtClean="0"/>
+              <a:rPr lang="en-US"/>
               <a:t>Click to edit Master title style</a:t>
             </a:r>
-            <a:endParaRPr lang="en-US"/>
           </a:p>
         </p:txBody>
       </p:sp>
@@ -759,38 +771,37 @@
           <a:p>
             <a:pPr lvl="0"/>
             <a:r>
-              <a:rPr lang="en-US" smtClean="0"/>
+              <a:rPr lang="en-US"/>
               <a:t>Click to edit Master text styles</a:t>
             </a:r>
           </a:p>
           <a:p>
             <a:pPr lvl="1"/>
             <a:r>
-              <a:rPr lang="en-US" smtClean="0"/>
+              <a:rPr lang="en-US"/>
               <a:t>Second level</a:t>
             </a:r>
           </a:p>
           <a:p>
             <a:pPr lvl="2"/>
             <a:r>
-              <a:rPr lang="en-US" smtClean="0"/>
+              <a:rPr lang="en-US"/>
               <a:t>Third level</a:t>
             </a:r>
           </a:p>
           <a:p>
             <a:pPr lvl="3"/>
             <a:r>
-              <a:rPr lang="en-US" smtClean="0"/>
+              <a:rPr lang="en-US"/>
               <a:t>Fourth level</a:t>
             </a:r>
           </a:p>
           <a:p>
             <a:pPr lvl="4"/>
             <a:r>
-              <a:rPr lang="en-US" smtClean="0"/>
+              <a:rPr lang="en-US"/>
               <a:t>Fifth level</a:t>
             </a:r>
-            <a:endParaRPr lang="en-US"/>
           </a:p>
         </p:txBody>
       </p:sp>
@@ -811,7 +822,7 @@
           <a:p>
             <a:fld id="{78C97017-6FC3-485B-9764-EAC9E56C1D49}" type="datetimeFigureOut">
               <a:rPr lang="en-US" smtClean="0"/>
-              <a:t>10/16/2016</a:t>
+              <a:t>10-Nov-18</a:t>
             </a:fld>
             <a:endParaRPr lang="en-US"/>
           </a:p>
@@ -910,10 +921,9 @@
           <a:lstStyle/>
           <a:p>
             <a:r>
-              <a:rPr lang="en-US" smtClean="0"/>
+              <a:rPr lang="en-US"/>
               <a:t>Click to edit Master title style</a:t>
             </a:r>
-            <a:endParaRPr lang="en-US"/>
           </a:p>
         </p:txBody>
       </p:sp>
@@ -939,38 +949,37 @@
           <a:p>
             <a:pPr lvl="0"/>
             <a:r>
-              <a:rPr lang="en-US" smtClean="0"/>
+              <a:rPr lang="en-US"/>
               <a:t>Click to edit Master text styles</a:t>
             </a:r>
           </a:p>
           <a:p>
             <a:pPr lvl="1"/>
             <a:r>
-              <a:rPr lang="en-US" smtClean="0"/>
+              <a:rPr lang="en-US"/>
               <a:t>Second level</a:t>
             </a:r>
           </a:p>
           <a:p>
             <a:pPr lvl="2"/>
             <a:r>
-              <a:rPr lang="en-US" smtClean="0"/>
+              <a:rPr lang="en-US"/>
               <a:t>Third level</a:t>
             </a:r>
           </a:p>
           <a:p>
             <a:pPr lvl="3"/>
             <a:r>
-              <a:rPr lang="en-US" smtClean="0"/>
+              <a:rPr lang="en-US"/>
               <a:t>Fourth level</a:t>
             </a:r>
           </a:p>
           <a:p>
             <a:pPr lvl="4"/>
             <a:r>
-              <a:rPr lang="en-US" smtClean="0"/>
+              <a:rPr lang="en-US"/>
               <a:t>Fifth level</a:t>
             </a:r>
-            <a:endParaRPr lang="en-US"/>
           </a:p>
         </p:txBody>
       </p:sp>
@@ -991,7 +1000,7 @@
           <a:p>
             <a:fld id="{78C97017-6FC3-485B-9764-EAC9E56C1D49}" type="datetimeFigureOut">
               <a:rPr lang="en-US" smtClean="0"/>
-              <a:t>10/16/2016</a:t>
+              <a:t>10-Nov-18</a:t>
             </a:fld>
             <a:endParaRPr lang="en-US"/>
           </a:p>
@@ -1085,10 +1094,9 @@
           <a:lstStyle/>
           <a:p>
             <a:r>
-              <a:rPr lang="en-US" smtClean="0"/>
+              <a:rPr lang="en-US"/>
               <a:t>Click to edit Master title style</a:t>
             </a:r>
-            <a:endParaRPr lang="en-US"/>
           </a:p>
         </p:txBody>
       </p:sp>
@@ -1109,38 +1117,37 @@
           <a:p>
             <a:pPr lvl="0"/>
             <a:r>
-              <a:rPr lang="en-US" smtClean="0"/>
+              <a:rPr lang="en-US"/>
               <a:t>Click to edit Master text styles</a:t>
             </a:r>
           </a:p>
           <a:p>
             <a:pPr lvl="1"/>
             <a:r>
-              <a:rPr lang="en-US" smtClean="0"/>
+              <a:rPr lang="en-US"/>
               <a:t>Second level</a:t>
             </a:r>
           </a:p>
           <a:p>
             <a:pPr lvl="2"/>
             <a:r>
-              <a:rPr lang="en-US" smtClean="0"/>
+              <a:rPr lang="en-US"/>
               <a:t>Third level</a:t>
             </a:r>
           </a:p>
           <a:p>
             <a:pPr lvl="3"/>
             <a:r>
-              <a:rPr lang="en-US" smtClean="0"/>
+              <a:rPr lang="en-US"/>
               <a:t>Fourth level</a:t>
             </a:r>
           </a:p>
           <a:p>
             <a:pPr lvl="4"/>
             <a:r>
-              <a:rPr lang="en-US" smtClean="0"/>
+              <a:rPr lang="en-US"/>
               <a:t>Fifth level</a:t>
             </a:r>
-            <a:endParaRPr lang="en-US"/>
           </a:p>
         </p:txBody>
       </p:sp>
@@ -1161,7 +1168,7 @@
           <a:p>
             <a:fld id="{78C97017-6FC3-485B-9764-EAC9E56C1D49}" type="datetimeFigureOut">
               <a:rPr lang="en-US" smtClean="0"/>
-              <a:t>10/16/2016</a:t>
+              <a:t>10-Nov-18</a:t>
             </a:fld>
             <a:endParaRPr lang="en-US"/>
           </a:p>
@@ -1264,10 +1271,9 @@
           </a:lstStyle>
           <a:p>
             <a:r>
-              <a:rPr lang="en-US" smtClean="0"/>
+              <a:rPr lang="en-US"/>
               <a:t>Click to edit Master title style</a:t>
             </a:r>
-            <a:endParaRPr lang="en-US"/>
           </a:p>
         </p:txBody>
       </p:sp>
@@ -1384,7 +1390,7 @@
           <a:p>
             <a:pPr lvl="0"/>
             <a:r>
-              <a:rPr lang="en-US" smtClean="0"/>
+              <a:rPr lang="en-US"/>
               <a:t>Click to edit Master text styles</a:t>
             </a:r>
           </a:p>
@@ -1407,7 +1413,7 @@
           <a:p>
             <a:fld id="{78C97017-6FC3-485B-9764-EAC9E56C1D49}" type="datetimeFigureOut">
               <a:rPr lang="en-US" smtClean="0"/>
-              <a:t>10/16/2016</a:t>
+              <a:t>10-Nov-18</a:t>
             </a:fld>
             <a:endParaRPr lang="en-US"/>
           </a:p>
@@ -1501,10 +1507,9 @@
           <a:lstStyle/>
           <a:p>
             <a:r>
-              <a:rPr lang="en-US" smtClean="0"/>
+              <a:rPr lang="en-US"/>
               <a:t>Click to edit Master title style</a:t>
             </a:r>
-            <a:endParaRPr lang="en-US"/>
           </a:p>
         </p:txBody>
       </p:sp>
@@ -1558,38 +1563,37 @@
           <a:p>
             <a:pPr lvl="0"/>
             <a:r>
-              <a:rPr lang="en-US" smtClean="0"/>
+              <a:rPr lang="en-US"/>
               <a:t>Click to edit Master text styles</a:t>
             </a:r>
           </a:p>
           <a:p>
             <a:pPr lvl="1"/>
             <a:r>
-              <a:rPr lang="en-US" smtClean="0"/>
+              <a:rPr lang="en-US"/>
               <a:t>Second level</a:t>
             </a:r>
           </a:p>
           <a:p>
             <a:pPr lvl="2"/>
             <a:r>
-              <a:rPr lang="en-US" smtClean="0"/>
+              <a:rPr lang="en-US"/>
               <a:t>Third level</a:t>
             </a:r>
           </a:p>
           <a:p>
             <a:pPr lvl="3"/>
             <a:r>
-              <a:rPr lang="en-US" smtClean="0"/>
+              <a:rPr lang="en-US"/>
               <a:t>Fourth level</a:t>
             </a:r>
           </a:p>
           <a:p>
             <a:pPr lvl="4"/>
             <a:r>
-              <a:rPr lang="en-US" smtClean="0"/>
+              <a:rPr lang="en-US"/>
               <a:t>Fifth level</a:t>
             </a:r>
-            <a:endParaRPr lang="en-US"/>
           </a:p>
         </p:txBody>
       </p:sp>
@@ -1643,38 +1647,37 @@
           <a:p>
             <a:pPr lvl="0"/>
             <a:r>
-              <a:rPr lang="en-US" smtClean="0"/>
+              <a:rPr lang="en-US"/>
               <a:t>Click to edit Master text styles</a:t>
             </a:r>
           </a:p>
           <a:p>
             <a:pPr lvl="1"/>
             <a:r>
-              <a:rPr lang="en-US" smtClean="0"/>
+              <a:rPr lang="en-US"/>
               <a:t>Second level</a:t>
             </a:r>
           </a:p>
           <a:p>
             <a:pPr lvl="2"/>
             <a:r>
-              <a:rPr lang="en-US" smtClean="0"/>
+              <a:rPr lang="en-US"/>
               <a:t>Third level</a:t>
             </a:r>
           </a:p>
           <a:p>
             <a:pPr lvl="3"/>
             <a:r>
-              <a:rPr lang="en-US" smtClean="0"/>
+              <a:rPr lang="en-US"/>
               <a:t>Fourth level</a:t>
             </a:r>
           </a:p>
           <a:p>
             <a:pPr lvl="4"/>
             <a:r>
-              <a:rPr lang="en-US" smtClean="0"/>
+              <a:rPr lang="en-US"/>
               <a:t>Fifth level</a:t>
             </a:r>
-            <a:endParaRPr lang="en-US"/>
           </a:p>
         </p:txBody>
       </p:sp>
@@ -1695,7 +1698,7 @@
           <a:p>
             <a:fld id="{78C97017-6FC3-485B-9764-EAC9E56C1D49}" type="datetimeFigureOut">
               <a:rPr lang="en-US" smtClean="0"/>
-              <a:t>10/16/2016</a:t>
+              <a:t>10-Nov-18</a:t>
             </a:fld>
             <a:endParaRPr lang="en-US"/>
           </a:p>
@@ -1793,10 +1796,9 @@
           </a:lstStyle>
           <a:p>
             <a:r>
-              <a:rPr lang="en-US" smtClean="0"/>
+              <a:rPr lang="en-US"/>
               <a:t>Click to edit Master title style</a:t>
             </a:r>
-            <a:endParaRPr lang="en-US"/>
           </a:p>
         </p:txBody>
       </p:sp>
@@ -1859,7 +1861,7 @@
           <a:p>
             <a:pPr lvl="0"/>
             <a:r>
-              <a:rPr lang="en-US" smtClean="0"/>
+              <a:rPr lang="en-US"/>
               <a:t>Click to edit Master text styles</a:t>
             </a:r>
           </a:p>
@@ -1915,38 +1917,37 @@
           <a:p>
             <a:pPr lvl="0"/>
             <a:r>
-              <a:rPr lang="en-US" smtClean="0"/>
+              <a:rPr lang="en-US"/>
               <a:t>Click to edit Master text styles</a:t>
             </a:r>
           </a:p>
           <a:p>
             <a:pPr lvl="1"/>
             <a:r>
-              <a:rPr lang="en-US" smtClean="0"/>
+              <a:rPr lang="en-US"/>
               <a:t>Second level</a:t>
             </a:r>
           </a:p>
           <a:p>
             <a:pPr lvl="2"/>
             <a:r>
-              <a:rPr lang="en-US" smtClean="0"/>
+              <a:rPr lang="en-US"/>
               <a:t>Third level</a:t>
             </a:r>
           </a:p>
           <a:p>
             <a:pPr lvl="3"/>
             <a:r>
-              <a:rPr lang="en-US" smtClean="0"/>
+              <a:rPr lang="en-US"/>
               <a:t>Fourth level</a:t>
             </a:r>
           </a:p>
           <a:p>
             <a:pPr lvl="4"/>
             <a:r>
-              <a:rPr lang="en-US" smtClean="0"/>
+              <a:rPr lang="en-US"/>
               <a:t>Fifth level</a:t>
             </a:r>
-            <a:endParaRPr lang="en-US"/>
           </a:p>
         </p:txBody>
       </p:sp>
@@ -2009,7 +2010,7 @@
           <a:p>
             <a:pPr lvl="0"/>
             <a:r>
-              <a:rPr lang="en-US" smtClean="0"/>
+              <a:rPr lang="en-US"/>
               <a:t>Click to edit Master text styles</a:t>
             </a:r>
           </a:p>
@@ -2065,38 +2066,37 @@
           <a:p>
             <a:pPr lvl="0"/>
             <a:r>
-              <a:rPr lang="en-US" smtClean="0"/>
+              <a:rPr lang="en-US"/>
               <a:t>Click to edit Master text styles</a:t>
             </a:r>
           </a:p>
           <a:p>
             <a:pPr lvl="1"/>
             <a:r>
-              <a:rPr lang="en-US" smtClean="0"/>
+              <a:rPr lang="en-US"/>
               <a:t>Second level</a:t>
             </a:r>
           </a:p>
           <a:p>
             <a:pPr lvl="2"/>
             <a:r>
-              <a:rPr lang="en-US" smtClean="0"/>
+              <a:rPr lang="en-US"/>
               <a:t>Third level</a:t>
             </a:r>
           </a:p>
           <a:p>
             <a:pPr lvl="3"/>
             <a:r>
-              <a:rPr lang="en-US" smtClean="0"/>
+              <a:rPr lang="en-US"/>
               <a:t>Fourth level</a:t>
             </a:r>
           </a:p>
           <a:p>
             <a:pPr lvl="4"/>
             <a:r>
-              <a:rPr lang="en-US" smtClean="0"/>
+              <a:rPr lang="en-US"/>
               <a:t>Fifth level</a:t>
             </a:r>
-            <a:endParaRPr lang="en-US"/>
           </a:p>
         </p:txBody>
       </p:sp>
@@ -2117,7 +2117,7 @@
           <a:p>
             <a:fld id="{78C97017-6FC3-485B-9764-EAC9E56C1D49}" type="datetimeFigureOut">
               <a:rPr lang="en-US" smtClean="0"/>
-              <a:t>10/16/2016</a:t>
+              <a:t>10-Nov-18</a:t>
             </a:fld>
             <a:endParaRPr lang="en-US"/>
           </a:p>
@@ -2211,10 +2211,9 @@
           <a:lstStyle/>
           <a:p>
             <a:r>
-              <a:rPr lang="en-US" smtClean="0"/>
+              <a:rPr lang="en-US"/>
               <a:t>Click to edit Master title style</a:t>
             </a:r>
-            <a:endParaRPr lang="en-US"/>
           </a:p>
         </p:txBody>
       </p:sp>
@@ -2235,7 +2234,7 @@
           <a:p>
             <a:fld id="{78C97017-6FC3-485B-9764-EAC9E56C1D49}" type="datetimeFigureOut">
               <a:rPr lang="en-US" smtClean="0"/>
-              <a:t>10/16/2016</a:t>
+              <a:t>10-Nov-18</a:t>
             </a:fld>
             <a:endParaRPr lang="en-US"/>
           </a:p>
@@ -2330,7 +2329,7 @@
           <a:p>
             <a:fld id="{78C97017-6FC3-485B-9764-EAC9E56C1D49}" type="datetimeFigureOut">
               <a:rPr lang="en-US" smtClean="0"/>
-              <a:t>10/16/2016</a:t>
+              <a:t>10-Nov-18</a:t>
             </a:fld>
             <a:endParaRPr lang="en-US"/>
           </a:p>
@@ -2433,10 +2432,9 @@
           </a:lstStyle>
           <a:p>
             <a:r>
-              <a:rPr lang="en-US" smtClean="0"/>
+              <a:rPr lang="en-US"/>
               <a:t>Click to edit Master title style</a:t>
             </a:r>
-            <a:endParaRPr lang="en-US"/>
           </a:p>
         </p:txBody>
       </p:sp>
@@ -2490,38 +2488,37 @@
           <a:p>
             <a:pPr lvl="0"/>
             <a:r>
-              <a:rPr lang="en-US" smtClean="0"/>
+              <a:rPr lang="en-US"/>
               <a:t>Click to edit Master text styles</a:t>
             </a:r>
           </a:p>
           <a:p>
             <a:pPr lvl="1"/>
             <a:r>
-              <a:rPr lang="en-US" smtClean="0"/>
+              <a:rPr lang="en-US"/>
               <a:t>Second level</a:t>
             </a:r>
           </a:p>
           <a:p>
             <a:pPr lvl="2"/>
             <a:r>
-              <a:rPr lang="en-US" smtClean="0"/>
+              <a:rPr lang="en-US"/>
               <a:t>Third level</a:t>
             </a:r>
           </a:p>
           <a:p>
             <a:pPr lvl="3"/>
             <a:r>
-              <a:rPr lang="en-US" smtClean="0"/>
+              <a:rPr lang="en-US"/>
               <a:t>Fourth level</a:t>
             </a:r>
           </a:p>
           <a:p>
             <a:pPr lvl="4"/>
             <a:r>
-              <a:rPr lang="en-US" smtClean="0"/>
+              <a:rPr lang="en-US"/>
               <a:t>Fifth level</a:t>
             </a:r>
-            <a:endParaRPr lang="en-US"/>
           </a:p>
         </p:txBody>
       </p:sp>
@@ -2584,7 +2581,7 @@
           <a:p>
             <a:pPr lvl="0"/>
             <a:r>
-              <a:rPr lang="en-US" smtClean="0"/>
+              <a:rPr lang="en-US"/>
               <a:t>Click to edit Master text styles</a:t>
             </a:r>
           </a:p>
@@ -2607,7 +2604,7 @@
           <a:p>
             <a:fld id="{78C97017-6FC3-485B-9764-EAC9E56C1D49}" type="datetimeFigureOut">
               <a:rPr lang="en-US" smtClean="0"/>
-              <a:t>10/16/2016</a:t>
+              <a:t>10-Nov-18</a:t>
             </a:fld>
             <a:endParaRPr lang="en-US"/>
           </a:p>
@@ -2710,10 +2707,9 @@
           </a:lstStyle>
           <a:p>
             <a:r>
-              <a:rPr lang="en-US" smtClean="0"/>
+              <a:rPr lang="en-US"/>
               <a:t>Click to edit Master title style</a:t>
             </a:r>
-            <a:endParaRPr lang="en-US"/>
           </a:p>
         </p:txBody>
       </p:sp>
@@ -2837,7 +2833,7 @@
           <a:p>
             <a:pPr lvl="0"/>
             <a:r>
-              <a:rPr lang="en-US" smtClean="0"/>
+              <a:rPr lang="en-US"/>
               <a:t>Click to edit Master text styles</a:t>
             </a:r>
           </a:p>
@@ -2860,7 +2856,7 @@
           <a:p>
             <a:fld id="{78C97017-6FC3-485B-9764-EAC9E56C1D49}" type="datetimeFigureOut">
               <a:rPr lang="en-US" smtClean="0"/>
-              <a:t>10/16/2016</a:t>
+              <a:t>10-Nov-18</a:t>
             </a:fld>
             <a:endParaRPr lang="en-US"/>
           </a:p>
@@ -2969,10 +2965,9 @@
           <a:lstStyle/>
           <a:p>
             <a:r>
-              <a:rPr lang="en-US" smtClean="0"/>
+              <a:rPr lang="en-US"/>
               <a:t>Click to edit Master title style</a:t>
             </a:r>
-            <a:endParaRPr lang="en-US"/>
           </a:p>
         </p:txBody>
       </p:sp>
@@ -3003,38 +2998,37 @@
           <a:p>
             <a:pPr lvl="0"/>
             <a:r>
-              <a:rPr lang="en-US" smtClean="0"/>
+              <a:rPr lang="en-US"/>
               <a:t>Click to edit Master text styles</a:t>
             </a:r>
           </a:p>
           <a:p>
             <a:pPr lvl="1"/>
             <a:r>
-              <a:rPr lang="en-US" smtClean="0"/>
+              <a:rPr lang="en-US"/>
               <a:t>Second level</a:t>
             </a:r>
           </a:p>
           <a:p>
             <a:pPr lvl="2"/>
             <a:r>
-              <a:rPr lang="en-US" smtClean="0"/>
+              <a:rPr lang="en-US"/>
               <a:t>Third level</a:t>
             </a:r>
           </a:p>
           <a:p>
             <a:pPr lvl="3"/>
             <a:r>
-              <a:rPr lang="en-US" smtClean="0"/>
+              <a:rPr lang="en-US"/>
               <a:t>Fourth level</a:t>
             </a:r>
           </a:p>
           <a:p>
             <a:pPr lvl="4"/>
             <a:r>
-              <a:rPr lang="en-US" smtClean="0"/>
+              <a:rPr lang="en-US"/>
               <a:t>Fifth level</a:t>
             </a:r>
-            <a:endParaRPr lang="en-US"/>
           </a:p>
         </p:txBody>
       </p:sp>
@@ -3073,7 +3067,7 @@
           <a:p>
             <a:fld id="{78C97017-6FC3-485B-9764-EAC9E56C1D49}" type="datetimeFigureOut">
               <a:rPr lang="en-US" smtClean="0"/>
-              <a:t>10/16/2016</a:t>
+              <a:t>10-Nov-18</a:t>
             </a:fld>
             <a:endParaRPr lang="en-US"/>
           </a:p>
@@ -3546,7 +3540,7 @@
           <a:p>
             <a:pPr algn="ctr"/>
             <a:r>
-              <a:rPr lang="en-US" sz="1600" dirty="0" smtClean="0">
+              <a:rPr lang="en-US" sz="1600" dirty="0">
                 <a:solidFill>
                   <a:schemeClr val="bg1"/>
                 </a:solidFill>
@@ -3605,7 +3599,7 @@
           <a:p>
             <a:pPr algn="ctr"/>
             <a:r>
-              <a:rPr lang="en-US" sz="1600" dirty="0" smtClean="0">
+              <a:rPr lang="en-US" sz="1600" dirty="0">
                 <a:solidFill>
                   <a:schemeClr val="bg1"/>
                 </a:solidFill>
@@ -3668,7 +3662,7 @@
           <a:p>
             <a:pPr algn="ctr"/>
             <a:r>
-              <a:rPr lang="en-US" sz="1600" dirty="0" smtClean="0">
+              <a:rPr lang="en-US" sz="1600" dirty="0">
                 <a:solidFill>
                   <a:schemeClr val="bg1"/>
                 </a:solidFill>
@@ -3727,7 +3721,7 @@
           <a:p>
             <a:pPr algn="ctr"/>
             <a:r>
-              <a:rPr lang="en-US" sz="1600" dirty="0" smtClean="0">
+              <a:rPr lang="en-US" sz="1600" dirty="0">
                 <a:solidFill>
                   <a:schemeClr val="bg1"/>
                 </a:solidFill>
@@ -4176,101 +4170,6 @@
       </p:sp>
       <p:sp>
         <p:nvSpPr>
-          <p:cNvPr id="51" name="Cloud 50"/>
-          <p:cNvSpPr/>
-          <p:nvPr/>
-        </p:nvSpPr>
-        <p:spPr>
-          <a:xfrm>
-            <a:off x="2650069" y="1447800"/>
-            <a:ext cx="914400" cy="533400"/>
-          </a:xfrm>
-          <a:prstGeom prst="cloud">
-            <a:avLst/>
-          </a:prstGeom>
-          <a:solidFill>
-            <a:schemeClr val="bg1"/>
-          </a:solidFill>
-          <a:ln>
-            <a:solidFill>
-              <a:schemeClr val="tx1"/>
-            </a:solidFill>
-          </a:ln>
-        </p:spPr>
-        <p:style>
-          <a:lnRef idx="2">
-            <a:schemeClr val="accent1">
-              <a:shade val="50000"/>
-            </a:schemeClr>
-          </a:lnRef>
-          <a:fillRef idx="1">
-            <a:schemeClr val="accent1"/>
-          </a:fillRef>
-          <a:effectRef idx="0">
-            <a:schemeClr val="accent1"/>
-          </a:effectRef>
-          <a:fontRef idx="minor">
-            <a:schemeClr val="lt1"/>
-          </a:fontRef>
-        </p:style>
-        <p:txBody>
-          <a:bodyPr rtlCol="0" anchor="ctr"/>
-          <a:lstStyle/>
-          <a:p>
-            <a:pPr algn="ctr"/>
-            <a:r>
-              <a:rPr lang="en-US" sz="1400" dirty="0">
-                <a:solidFill>
-                  <a:schemeClr val="tx1"/>
-                </a:solidFill>
-              </a:rPr>
-              <a:t>Web</a:t>
-            </a:r>
-          </a:p>
-        </p:txBody>
-      </p:sp>
-      <p:cxnSp>
-        <p:nvCxnSpPr>
-          <p:cNvPr id="52" name="Elbow Connector 51"/>
-          <p:cNvCxnSpPr>
-            <a:stCxn id="2" idx="0"/>
-            <a:endCxn id="51" idx="2"/>
-          </p:cNvCxnSpPr>
-          <p:nvPr/>
-        </p:nvCxnSpPr>
-        <p:spPr>
-          <a:xfrm rot="5400000" flipH="1" flipV="1">
-            <a:off x="2222648" y="1760922"/>
-            <a:ext cx="476678" cy="383835"/>
-          </a:xfrm>
-          <a:prstGeom prst="bentConnector2">
-            <a:avLst/>
-          </a:prstGeom>
-          <a:ln w="28575">
-            <a:solidFill>
-              <a:srgbClr val="00B050"/>
-            </a:solidFill>
-            <a:prstDash val="sysDot"/>
-            <a:tailEnd type="arrow"/>
-          </a:ln>
-        </p:spPr>
-        <p:style>
-          <a:lnRef idx="1">
-            <a:schemeClr val="accent1"/>
-          </a:lnRef>
-          <a:fillRef idx="0">
-            <a:schemeClr val="accent1"/>
-          </a:fillRef>
-          <a:effectRef idx="0">
-            <a:schemeClr val="accent1"/>
-          </a:effectRef>
-          <a:fontRef idx="minor">
-            <a:schemeClr val="tx1"/>
-          </a:fontRef>
-        </p:style>
-      </p:cxnSp>
-      <p:sp>
-        <p:nvSpPr>
           <p:cNvPr id="23" name="Rectangle 62"/>
           <p:cNvSpPr/>
           <p:nvPr/>
@@ -4313,7 +4212,7 @@
           <a:p>
             <a:pPr algn="ctr"/>
             <a:r>
-              <a:rPr lang="en-US" sz="1600" dirty="0" smtClean="0">
+              <a:rPr lang="en-US" sz="1600" dirty="0">
                 <a:solidFill>
                   <a:schemeClr val="bg1"/>
                 </a:solidFill>
@@ -4664,7 +4563,7 @@
           <a:p>
             <a:pPr algn="ctr"/>
             <a:r>
-              <a:rPr lang="en-US" sz="1600" dirty="0" smtClean="0">
+              <a:rPr lang="en-US" sz="1600" dirty="0">
                 <a:solidFill>
                   <a:schemeClr val="bg1"/>
                 </a:solidFill>
@@ -4672,25 +4571,20 @@
               <a:t>Logs</a:t>
             </a:r>
             <a:br>
-              <a:rPr lang="en-US" sz="1600" dirty="0" smtClean="0">
+              <a:rPr lang="en-US" sz="1600" dirty="0">
                 <a:solidFill>
                   <a:schemeClr val="bg1"/>
                 </a:solidFill>
               </a:rPr>
             </a:br>
             <a:r>
-              <a:rPr lang="en-US" sz="1600" dirty="0" smtClean="0">
+              <a:rPr lang="en-US" sz="1600" dirty="0">
                 <a:solidFill>
                   <a:schemeClr val="bg1"/>
                 </a:solidFill>
               </a:rPr>
               <a:t>Center</a:t>
             </a:r>
-            <a:endParaRPr lang="en-US" sz="1600" dirty="0">
-              <a:solidFill>
-                <a:schemeClr val="bg1"/>
-              </a:solidFill>
-            </a:endParaRPr>
           </a:p>
         </p:txBody>
       </p:sp>

</xml_diff>

<commit_message>
Update register-doctor and register-patient documentation
</commit_message>
<xml_diff>
--- a/docs/diagrams/ArchitectureDiagram.pptx
+++ b/docs/diagrams/ArchitectureDiagram.pptx
@@ -107,6 +107,22 @@
       </a:defRPr>
     </a:lvl9pPr>
   </p:defaultTextStyle>
+  <p:extLst>
+    <p:ext uri="{EFAFB233-063F-42B5-8137-9DF3F51BA10A}">
+      <p15:sldGuideLst xmlns:p15="http://schemas.microsoft.com/office/powerpoint/2012/main">
+        <p15:guide id="1" orient="horz" pos="1488">
+          <p15:clr>
+            <a:srgbClr val="A4A3A4"/>
+          </p15:clr>
+        </p15:guide>
+        <p15:guide id="2" pos="2880">
+          <p15:clr>
+            <a:srgbClr val="A4A3A4"/>
+          </p15:clr>
+        </p15:guide>
+      </p15:sldGuideLst>
+    </p:ext>
+  </p:extLst>
 </p:presentation>
 </file>
 
@@ -192,7 +208,7 @@
           <a:p>
             <a:fld id="{F5CC4B3F-88C1-4FFA-B1B6-F41C21DC6924}" type="datetimeFigureOut">
               <a:rPr lang="en-US" smtClean="0"/>
-              <a:t>10/16/2016</a:t>
+              <a:t>11/12/2018</a:t>
             </a:fld>
             <a:endParaRPr lang="en-US"/>
           </a:p>
@@ -256,38 +272,37 @@
           <a:p>
             <a:pPr lvl="0"/>
             <a:r>
-              <a:rPr lang="en-US" smtClean="0"/>
+              <a:rPr lang="en-US"/>
               <a:t>Click to edit Master text styles</a:t>
             </a:r>
           </a:p>
           <a:p>
             <a:pPr lvl="1"/>
             <a:r>
-              <a:rPr lang="en-US" smtClean="0"/>
+              <a:rPr lang="en-US"/>
               <a:t>Second level</a:t>
             </a:r>
           </a:p>
           <a:p>
             <a:pPr lvl="2"/>
             <a:r>
-              <a:rPr lang="en-US" smtClean="0"/>
+              <a:rPr lang="en-US"/>
               <a:t>Third level</a:t>
             </a:r>
           </a:p>
           <a:p>
             <a:pPr lvl="3"/>
             <a:r>
-              <a:rPr lang="en-US" smtClean="0"/>
+              <a:rPr lang="en-US"/>
               <a:t>Fourth level</a:t>
             </a:r>
           </a:p>
           <a:p>
             <a:pPr lvl="4"/>
             <a:r>
-              <a:rPr lang="en-US" smtClean="0"/>
+              <a:rPr lang="en-US"/>
               <a:t>Fifth level</a:t>
             </a:r>
-            <a:endParaRPr lang="en-US"/>
           </a:p>
         </p:txBody>
       </p:sp>
@@ -498,10 +513,9 @@
           <a:lstStyle/>
           <a:p>
             <a:r>
-              <a:rPr lang="en-US" smtClean="0"/>
+              <a:rPr lang="en-US"/>
               <a:t>Click to edit Master title style</a:t>
             </a:r>
-            <a:endParaRPr lang="en-US"/>
           </a:p>
         </p:txBody>
       </p:sp>
@@ -617,10 +631,9 @@
           </a:lstStyle>
           <a:p>
             <a:r>
-              <a:rPr lang="en-US" smtClean="0"/>
+              <a:rPr lang="en-US"/>
               <a:t>Click to edit Master subtitle style</a:t>
             </a:r>
-            <a:endParaRPr lang="en-US"/>
           </a:p>
         </p:txBody>
       </p:sp>
@@ -641,7 +654,7 @@
           <a:p>
             <a:fld id="{78C97017-6FC3-485B-9764-EAC9E56C1D49}" type="datetimeFigureOut">
               <a:rPr lang="en-US" smtClean="0"/>
-              <a:t>10/16/2016</a:t>
+              <a:t>11/12/2018</a:t>
             </a:fld>
             <a:endParaRPr lang="en-US"/>
           </a:p>
@@ -735,10 +748,9 @@
           <a:lstStyle/>
           <a:p>
             <a:r>
-              <a:rPr lang="en-US" smtClean="0"/>
+              <a:rPr lang="en-US"/>
               <a:t>Click to edit Master title style</a:t>
             </a:r>
-            <a:endParaRPr lang="en-US"/>
           </a:p>
         </p:txBody>
       </p:sp>
@@ -759,38 +771,37 @@
           <a:p>
             <a:pPr lvl="0"/>
             <a:r>
-              <a:rPr lang="en-US" smtClean="0"/>
+              <a:rPr lang="en-US"/>
               <a:t>Click to edit Master text styles</a:t>
             </a:r>
           </a:p>
           <a:p>
             <a:pPr lvl="1"/>
             <a:r>
-              <a:rPr lang="en-US" smtClean="0"/>
+              <a:rPr lang="en-US"/>
               <a:t>Second level</a:t>
             </a:r>
           </a:p>
           <a:p>
             <a:pPr lvl="2"/>
             <a:r>
-              <a:rPr lang="en-US" smtClean="0"/>
+              <a:rPr lang="en-US"/>
               <a:t>Third level</a:t>
             </a:r>
           </a:p>
           <a:p>
             <a:pPr lvl="3"/>
             <a:r>
-              <a:rPr lang="en-US" smtClean="0"/>
+              <a:rPr lang="en-US"/>
               <a:t>Fourth level</a:t>
             </a:r>
           </a:p>
           <a:p>
             <a:pPr lvl="4"/>
             <a:r>
-              <a:rPr lang="en-US" smtClean="0"/>
+              <a:rPr lang="en-US"/>
               <a:t>Fifth level</a:t>
             </a:r>
-            <a:endParaRPr lang="en-US"/>
           </a:p>
         </p:txBody>
       </p:sp>
@@ -811,7 +822,7 @@
           <a:p>
             <a:fld id="{78C97017-6FC3-485B-9764-EAC9E56C1D49}" type="datetimeFigureOut">
               <a:rPr lang="en-US" smtClean="0"/>
-              <a:t>10/16/2016</a:t>
+              <a:t>11/12/2018</a:t>
             </a:fld>
             <a:endParaRPr lang="en-US"/>
           </a:p>
@@ -910,10 +921,9 @@
           <a:lstStyle/>
           <a:p>
             <a:r>
-              <a:rPr lang="en-US" smtClean="0"/>
+              <a:rPr lang="en-US"/>
               <a:t>Click to edit Master title style</a:t>
             </a:r>
-            <a:endParaRPr lang="en-US"/>
           </a:p>
         </p:txBody>
       </p:sp>
@@ -939,38 +949,37 @@
           <a:p>
             <a:pPr lvl="0"/>
             <a:r>
-              <a:rPr lang="en-US" smtClean="0"/>
+              <a:rPr lang="en-US"/>
               <a:t>Click to edit Master text styles</a:t>
             </a:r>
           </a:p>
           <a:p>
             <a:pPr lvl="1"/>
             <a:r>
-              <a:rPr lang="en-US" smtClean="0"/>
+              <a:rPr lang="en-US"/>
               <a:t>Second level</a:t>
             </a:r>
           </a:p>
           <a:p>
             <a:pPr lvl="2"/>
             <a:r>
-              <a:rPr lang="en-US" smtClean="0"/>
+              <a:rPr lang="en-US"/>
               <a:t>Third level</a:t>
             </a:r>
           </a:p>
           <a:p>
             <a:pPr lvl="3"/>
             <a:r>
-              <a:rPr lang="en-US" smtClean="0"/>
+              <a:rPr lang="en-US"/>
               <a:t>Fourth level</a:t>
             </a:r>
           </a:p>
           <a:p>
             <a:pPr lvl="4"/>
             <a:r>
-              <a:rPr lang="en-US" smtClean="0"/>
+              <a:rPr lang="en-US"/>
               <a:t>Fifth level</a:t>
             </a:r>
-            <a:endParaRPr lang="en-US"/>
           </a:p>
         </p:txBody>
       </p:sp>
@@ -991,7 +1000,7 @@
           <a:p>
             <a:fld id="{78C97017-6FC3-485B-9764-EAC9E56C1D49}" type="datetimeFigureOut">
               <a:rPr lang="en-US" smtClean="0"/>
-              <a:t>10/16/2016</a:t>
+              <a:t>11/12/2018</a:t>
             </a:fld>
             <a:endParaRPr lang="en-US"/>
           </a:p>
@@ -1085,10 +1094,9 @@
           <a:lstStyle/>
           <a:p>
             <a:r>
-              <a:rPr lang="en-US" smtClean="0"/>
+              <a:rPr lang="en-US"/>
               <a:t>Click to edit Master title style</a:t>
             </a:r>
-            <a:endParaRPr lang="en-US"/>
           </a:p>
         </p:txBody>
       </p:sp>
@@ -1109,38 +1117,37 @@
           <a:p>
             <a:pPr lvl="0"/>
             <a:r>
-              <a:rPr lang="en-US" smtClean="0"/>
+              <a:rPr lang="en-US"/>
               <a:t>Click to edit Master text styles</a:t>
             </a:r>
           </a:p>
           <a:p>
             <a:pPr lvl="1"/>
             <a:r>
-              <a:rPr lang="en-US" smtClean="0"/>
+              <a:rPr lang="en-US"/>
               <a:t>Second level</a:t>
             </a:r>
           </a:p>
           <a:p>
             <a:pPr lvl="2"/>
             <a:r>
-              <a:rPr lang="en-US" smtClean="0"/>
+              <a:rPr lang="en-US"/>
               <a:t>Third level</a:t>
             </a:r>
           </a:p>
           <a:p>
             <a:pPr lvl="3"/>
             <a:r>
-              <a:rPr lang="en-US" smtClean="0"/>
+              <a:rPr lang="en-US"/>
               <a:t>Fourth level</a:t>
             </a:r>
           </a:p>
           <a:p>
             <a:pPr lvl="4"/>
             <a:r>
-              <a:rPr lang="en-US" smtClean="0"/>
+              <a:rPr lang="en-US"/>
               <a:t>Fifth level</a:t>
             </a:r>
-            <a:endParaRPr lang="en-US"/>
           </a:p>
         </p:txBody>
       </p:sp>
@@ -1161,7 +1168,7 @@
           <a:p>
             <a:fld id="{78C97017-6FC3-485B-9764-EAC9E56C1D49}" type="datetimeFigureOut">
               <a:rPr lang="en-US" smtClean="0"/>
-              <a:t>10/16/2016</a:t>
+              <a:t>11/12/2018</a:t>
             </a:fld>
             <a:endParaRPr lang="en-US"/>
           </a:p>
@@ -1264,10 +1271,9 @@
           </a:lstStyle>
           <a:p>
             <a:r>
-              <a:rPr lang="en-US" smtClean="0"/>
+              <a:rPr lang="en-US"/>
               <a:t>Click to edit Master title style</a:t>
             </a:r>
-            <a:endParaRPr lang="en-US"/>
           </a:p>
         </p:txBody>
       </p:sp>
@@ -1384,7 +1390,7 @@
           <a:p>
             <a:pPr lvl="0"/>
             <a:r>
-              <a:rPr lang="en-US" smtClean="0"/>
+              <a:rPr lang="en-US"/>
               <a:t>Click to edit Master text styles</a:t>
             </a:r>
           </a:p>
@@ -1407,7 +1413,7 @@
           <a:p>
             <a:fld id="{78C97017-6FC3-485B-9764-EAC9E56C1D49}" type="datetimeFigureOut">
               <a:rPr lang="en-US" smtClean="0"/>
-              <a:t>10/16/2016</a:t>
+              <a:t>11/12/2018</a:t>
             </a:fld>
             <a:endParaRPr lang="en-US"/>
           </a:p>
@@ -1501,10 +1507,9 @@
           <a:lstStyle/>
           <a:p>
             <a:r>
-              <a:rPr lang="en-US" smtClean="0"/>
+              <a:rPr lang="en-US"/>
               <a:t>Click to edit Master title style</a:t>
             </a:r>
-            <a:endParaRPr lang="en-US"/>
           </a:p>
         </p:txBody>
       </p:sp>
@@ -1558,38 +1563,37 @@
           <a:p>
             <a:pPr lvl="0"/>
             <a:r>
-              <a:rPr lang="en-US" smtClean="0"/>
+              <a:rPr lang="en-US"/>
               <a:t>Click to edit Master text styles</a:t>
             </a:r>
           </a:p>
           <a:p>
             <a:pPr lvl="1"/>
             <a:r>
-              <a:rPr lang="en-US" smtClean="0"/>
+              <a:rPr lang="en-US"/>
               <a:t>Second level</a:t>
             </a:r>
           </a:p>
           <a:p>
             <a:pPr lvl="2"/>
             <a:r>
-              <a:rPr lang="en-US" smtClean="0"/>
+              <a:rPr lang="en-US"/>
               <a:t>Third level</a:t>
             </a:r>
           </a:p>
           <a:p>
             <a:pPr lvl="3"/>
             <a:r>
-              <a:rPr lang="en-US" smtClean="0"/>
+              <a:rPr lang="en-US"/>
               <a:t>Fourth level</a:t>
             </a:r>
           </a:p>
           <a:p>
             <a:pPr lvl="4"/>
             <a:r>
-              <a:rPr lang="en-US" smtClean="0"/>
+              <a:rPr lang="en-US"/>
               <a:t>Fifth level</a:t>
             </a:r>
-            <a:endParaRPr lang="en-US"/>
           </a:p>
         </p:txBody>
       </p:sp>
@@ -1643,38 +1647,37 @@
           <a:p>
             <a:pPr lvl="0"/>
             <a:r>
-              <a:rPr lang="en-US" smtClean="0"/>
+              <a:rPr lang="en-US"/>
               <a:t>Click to edit Master text styles</a:t>
             </a:r>
           </a:p>
           <a:p>
             <a:pPr lvl="1"/>
             <a:r>
-              <a:rPr lang="en-US" smtClean="0"/>
+              <a:rPr lang="en-US"/>
               <a:t>Second level</a:t>
             </a:r>
           </a:p>
           <a:p>
             <a:pPr lvl="2"/>
             <a:r>
-              <a:rPr lang="en-US" smtClean="0"/>
+              <a:rPr lang="en-US"/>
               <a:t>Third level</a:t>
             </a:r>
           </a:p>
           <a:p>
             <a:pPr lvl="3"/>
             <a:r>
-              <a:rPr lang="en-US" smtClean="0"/>
+              <a:rPr lang="en-US"/>
               <a:t>Fourth level</a:t>
             </a:r>
           </a:p>
           <a:p>
             <a:pPr lvl="4"/>
             <a:r>
-              <a:rPr lang="en-US" smtClean="0"/>
+              <a:rPr lang="en-US"/>
               <a:t>Fifth level</a:t>
             </a:r>
-            <a:endParaRPr lang="en-US"/>
           </a:p>
         </p:txBody>
       </p:sp>
@@ -1695,7 +1698,7 @@
           <a:p>
             <a:fld id="{78C97017-6FC3-485B-9764-EAC9E56C1D49}" type="datetimeFigureOut">
               <a:rPr lang="en-US" smtClean="0"/>
-              <a:t>10/16/2016</a:t>
+              <a:t>11/12/2018</a:t>
             </a:fld>
             <a:endParaRPr lang="en-US"/>
           </a:p>
@@ -1793,10 +1796,9 @@
           </a:lstStyle>
           <a:p>
             <a:r>
-              <a:rPr lang="en-US" smtClean="0"/>
+              <a:rPr lang="en-US"/>
               <a:t>Click to edit Master title style</a:t>
             </a:r>
-            <a:endParaRPr lang="en-US"/>
           </a:p>
         </p:txBody>
       </p:sp>
@@ -1859,7 +1861,7 @@
           <a:p>
             <a:pPr lvl="0"/>
             <a:r>
-              <a:rPr lang="en-US" smtClean="0"/>
+              <a:rPr lang="en-US"/>
               <a:t>Click to edit Master text styles</a:t>
             </a:r>
           </a:p>
@@ -1915,38 +1917,37 @@
           <a:p>
             <a:pPr lvl="0"/>
             <a:r>
-              <a:rPr lang="en-US" smtClean="0"/>
+              <a:rPr lang="en-US"/>
               <a:t>Click to edit Master text styles</a:t>
             </a:r>
           </a:p>
           <a:p>
             <a:pPr lvl="1"/>
             <a:r>
-              <a:rPr lang="en-US" smtClean="0"/>
+              <a:rPr lang="en-US"/>
               <a:t>Second level</a:t>
             </a:r>
           </a:p>
           <a:p>
             <a:pPr lvl="2"/>
             <a:r>
-              <a:rPr lang="en-US" smtClean="0"/>
+              <a:rPr lang="en-US"/>
               <a:t>Third level</a:t>
             </a:r>
           </a:p>
           <a:p>
             <a:pPr lvl="3"/>
             <a:r>
-              <a:rPr lang="en-US" smtClean="0"/>
+              <a:rPr lang="en-US"/>
               <a:t>Fourth level</a:t>
             </a:r>
           </a:p>
           <a:p>
             <a:pPr lvl="4"/>
             <a:r>
-              <a:rPr lang="en-US" smtClean="0"/>
+              <a:rPr lang="en-US"/>
               <a:t>Fifth level</a:t>
             </a:r>
-            <a:endParaRPr lang="en-US"/>
           </a:p>
         </p:txBody>
       </p:sp>
@@ -2009,7 +2010,7 @@
           <a:p>
             <a:pPr lvl="0"/>
             <a:r>
-              <a:rPr lang="en-US" smtClean="0"/>
+              <a:rPr lang="en-US"/>
               <a:t>Click to edit Master text styles</a:t>
             </a:r>
           </a:p>
@@ -2065,38 +2066,37 @@
           <a:p>
             <a:pPr lvl="0"/>
             <a:r>
-              <a:rPr lang="en-US" smtClean="0"/>
+              <a:rPr lang="en-US"/>
               <a:t>Click to edit Master text styles</a:t>
             </a:r>
           </a:p>
           <a:p>
             <a:pPr lvl="1"/>
             <a:r>
-              <a:rPr lang="en-US" smtClean="0"/>
+              <a:rPr lang="en-US"/>
               <a:t>Second level</a:t>
             </a:r>
           </a:p>
           <a:p>
             <a:pPr lvl="2"/>
             <a:r>
-              <a:rPr lang="en-US" smtClean="0"/>
+              <a:rPr lang="en-US"/>
               <a:t>Third level</a:t>
             </a:r>
           </a:p>
           <a:p>
             <a:pPr lvl="3"/>
             <a:r>
-              <a:rPr lang="en-US" smtClean="0"/>
+              <a:rPr lang="en-US"/>
               <a:t>Fourth level</a:t>
             </a:r>
           </a:p>
           <a:p>
             <a:pPr lvl="4"/>
             <a:r>
-              <a:rPr lang="en-US" smtClean="0"/>
+              <a:rPr lang="en-US"/>
               <a:t>Fifth level</a:t>
             </a:r>
-            <a:endParaRPr lang="en-US"/>
           </a:p>
         </p:txBody>
       </p:sp>
@@ -2117,7 +2117,7 @@
           <a:p>
             <a:fld id="{78C97017-6FC3-485B-9764-EAC9E56C1D49}" type="datetimeFigureOut">
               <a:rPr lang="en-US" smtClean="0"/>
-              <a:t>10/16/2016</a:t>
+              <a:t>11/12/2018</a:t>
             </a:fld>
             <a:endParaRPr lang="en-US"/>
           </a:p>
@@ -2211,10 +2211,9 @@
           <a:lstStyle/>
           <a:p>
             <a:r>
-              <a:rPr lang="en-US" smtClean="0"/>
+              <a:rPr lang="en-US"/>
               <a:t>Click to edit Master title style</a:t>
             </a:r>
-            <a:endParaRPr lang="en-US"/>
           </a:p>
         </p:txBody>
       </p:sp>
@@ -2235,7 +2234,7 @@
           <a:p>
             <a:fld id="{78C97017-6FC3-485B-9764-EAC9E56C1D49}" type="datetimeFigureOut">
               <a:rPr lang="en-US" smtClean="0"/>
-              <a:t>10/16/2016</a:t>
+              <a:t>11/12/2018</a:t>
             </a:fld>
             <a:endParaRPr lang="en-US"/>
           </a:p>
@@ -2330,7 +2329,7 @@
           <a:p>
             <a:fld id="{78C97017-6FC3-485B-9764-EAC9E56C1D49}" type="datetimeFigureOut">
               <a:rPr lang="en-US" smtClean="0"/>
-              <a:t>10/16/2016</a:t>
+              <a:t>11/12/2018</a:t>
             </a:fld>
             <a:endParaRPr lang="en-US"/>
           </a:p>
@@ -2433,10 +2432,9 @@
           </a:lstStyle>
           <a:p>
             <a:r>
-              <a:rPr lang="en-US" smtClean="0"/>
+              <a:rPr lang="en-US"/>
               <a:t>Click to edit Master title style</a:t>
             </a:r>
-            <a:endParaRPr lang="en-US"/>
           </a:p>
         </p:txBody>
       </p:sp>
@@ -2490,38 +2488,37 @@
           <a:p>
             <a:pPr lvl="0"/>
             <a:r>
-              <a:rPr lang="en-US" smtClean="0"/>
+              <a:rPr lang="en-US"/>
               <a:t>Click to edit Master text styles</a:t>
             </a:r>
           </a:p>
           <a:p>
             <a:pPr lvl="1"/>
             <a:r>
-              <a:rPr lang="en-US" smtClean="0"/>
+              <a:rPr lang="en-US"/>
               <a:t>Second level</a:t>
             </a:r>
           </a:p>
           <a:p>
             <a:pPr lvl="2"/>
             <a:r>
-              <a:rPr lang="en-US" smtClean="0"/>
+              <a:rPr lang="en-US"/>
               <a:t>Third level</a:t>
             </a:r>
           </a:p>
           <a:p>
             <a:pPr lvl="3"/>
             <a:r>
-              <a:rPr lang="en-US" smtClean="0"/>
+              <a:rPr lang="en-US"/>
               <a:t>Fourth level</a:t>
             </a:r>
           </a:p>
           <a:p>
             <a:pPr lvl="4"/>
             <a:r>
-              <a:rPr lang="en-US" smtClean="0"/>
+              <a:rPr lang="en-US"/>
               <a:t>Fifth level</a:t>
             </a:r>
-            <a:endParaRPr lang="en-US"/>
           </a:p>
         </p:txBody>
       </p:sp>
@@ -2584,7 +2581,7 @@
           <a:p>
             <a:pPr lvl="0"/>
             <a:r>
-              <a:rPr lang="en-US" smtClean="0"/>
+              <a:rPr lang="en-US"/>
               <a:t>Click to edit Master text styles</a:t>
             </a:r>
           </a:p>
@@ -2607,7 +2604,7 @@
           <a:p>
             <a:fld id="{78C97017-6FC3-485B-9764-EAC9E56C1D49}" type="datetimeFigureOut">
               <a:rPr lang="en-US" smtClean="0"/>
-              <a:t>10/16/2016</a:t>
+              <a:t>11/12/2018</a:t>
             </a:fld>
             <a:endParaRPr lang="en-US"/>
           </a:p>
@@ -2710,10 +2707,9 @@
           </a:lstStyle>
           <a:p>
             <a:r>
-              <a:rPr lang="en-US" smtClean="0"/>
+              <a:rPr lang="en-US"/>
               <a:t>Click to edit Master title style</a:t>
             </a:r>
-            <a:endParaRPr lang="en-US"/>
           </a:p>
         </p:txBody>
       </p:sp>
@@ -2837,7 +2833,7 @@
           <a:p>
             <a:pPr lvl="0"/>
             <a:r>
-              <a:rPr lang="en-US" smtClean="0"/>
+              <a:rPr lang="en-US"/>
               <a:t>Click to edit Master text styles</a:t>
             </a:r>
           </a:p>
@@ -2860,7 +2856,7 @@
           <a:p>
             <a:fld id="{78C97017-6FC3-485B-9764-EAC9E56C1D49}" type="datetimeFigureOut">
               <a:rPr lang="en-US" smtClean="0"/>
-              <a:t>10/16/2016</a:t>
+              <a:t>11/12/2018</a:t>
             </a:fld>
             <a:endParaRPr lang="en-US"/>
           </a:p>
@@ -2969,10 +2965,9 @@
           <a:lstStyle/>
           <a:p>
             <a:r>
-              <a:rPr lang="en-US" smtClean="0"/>
+              <a:rPr lang="en-US"/>
               <a:t>Click to edit Master title style</a:t>
             </a:r>
-            <a:endParaRPr lang="en-US"/>
           </a:p>
         </p:txBody>
       </p:sp>
@@ -3003,38 +2998,37 @@
           <a:p>
             <a:pPr lvl="0"/>
             <a:r>
-              <a:rPr lang="en-US" smtClean="0"/>
+              <a:rPr lang="en-US"/>
               <a:t>Click to edit Master text styles</a:t>
             </a:r>
           </a:p>
           <a:p>
             <a:pPr lvl="1"/>
             <a:r>
-              <a:rPr lang="en-US" smtClean="0"/>
+              <a:rPr lang="en-US"/>
               <a:t>Second level</a:t>
             </a:r>
           </a:p>
           <a:p>
             <a:pPr lvl="2"/>
             <a:r>
-              <a:rPr lang="en-US" smtClean="0"/>
+              <a:rPr lang="en-US"/>
               <a:t>Third level</a:t>
             </a:r>
           </a:p>
           <a:p>
             <a:pPr lvl="3"/>
             <a:r>
-              <a:rPr lang="en-US" smtClean="0"/>
+              <a:rPr lang="en-US"/>
               <a:t>Fourth level</a:t>
             </a:r>
           </a:p>
           <a:p>
             <a:pPr lvl="4"/>
             <a:r>
-              <a:rPr lang="en-US" smtClean="0"/>
+              <a:rPr lang="en-US"/>
               <a:t>Fifth level</a:t>
             </a:r>
-            <a:endParaRPr lang="en-US"/>
           </a:p>
         </p:txBody>
       </p:sp>
@@ -3073,7 +3067,7 @@
           <a:p>
             <a:fld id="{78C97017-6FC3-485B-9764-EAC9E56C1D49}" type="datetimeFigureOut">
               <a:rPr lang="en-US" smtClean="0"/>
-              <a:t>10/16/2016</a:t>
+              <a:t>11/12/2018</a:t>
             </a:fld>
             <a:endParaRPr lang="en-US"/>
           </a:p>
@@ -3546,7 +3540,7 @@
           <a:p>
             <a:pPr algn="ctr"/>
             <a:r>
-              <a:rPr lang="en-US" sz="1600" dirty="0" smtClean="0">
+              <a:rPr lang="en-US" sz="1600" dirty="0">
                 <a:solidFill>
                   <a:schemeClr val="bg1"/>
                 </a:solidFill>
@@ -3569,8 +3563,8 @@
         </p:nvSpPr>
         <p:spPr>
           <a:xfrm>
-            <a:off x="3412069" y="2191178"/>
-            <a:ext cx="1295400" cy="552022"/>
+            <a:off x="3412068" y="2743200"/>
+            <a:ext cx="1007517" cy="348700"/>
           </a:xfrm>
           <a:prstGeom prst="roundRect">
             <a:avLst/>
@@ -3605,7 +3599,7 @@
           <a:p>
             <a:pPr algn="ctr"/>
             <a:r>
-              <a:rPr lang="en-US" sz="1600" dirty="0" smtClean="0">
+              <a:rPr lang="en-US" sz="1600" dirty="0">
                 <a:solidFill>
                   <a:schemeClr val="bg1"/>
                 </a:solidFill>
@@ -3668,7 +3662,7 @@
           <a:p>
             <a:pPr algn="ctr"/>
             <a:r>
-              <a:rPr lang="en-US" sz="1600" dirty="0" smtClean="0">
+              <a:rPr lang="en-US" sz="1600" dirty="0">
                 <a:solidFill>
                   <a:schemeClr val="bg1"/>
                 </a:solidFill>
@@ -3691,8 +3685,8 @@
         </p:nvSpPr>
         <p:spPr>
           <a:xfrm>
-            <a:off x="3412069" y="3124200"/>
-            <a:ext cx="1295400" cy="723791"/>
+            <a:off x="3412069" y="3249050"/>
+            <a:ext cx="1007518" cy="332350"/>
           </a:xfrm>
           <a:prstGeom prst="roundRect">
             <a:avLst/>
@@ -3727,7 +3721,7 @@
           <a:p>
             <a:pPr algn="ctr"/>
             <a:r>
-              <a:rPr lang="en-US" sz="1600" dirty="0" smtClean="0">
+              <a:rPr lang="en-US" sz="1600" dirty="0">
                 <a:solidFill>
                   <a:schemeClr val="bg1"/>
                 </a:solidFill>
@@ -3809,14 +3803,14 @@
         <p:nvCxnSpPr>
           <p:cNvPr id="10" name="Straight Arrow Connector 9"/>
           <p:cNvCxnSpPr>
-            <a:endCxn id="3" idx="1"/>
+            <a:cxnSpLocks/>
           </p:cNvCxnSpPr>
           <p:nvPr/>
         </p:nvCxnSpPr>
         <p:spPr>
           <a:xfrm>
-            <a:off x="2573871" y="2467189"/>
-            <a:ext cx="838198" cy="0"/>
+            <a:off x="2133600" y="2926444"/>
+            <a:ext cx="1278468" cy="9603"/>
           </a:xfrm>
           <a:prstGeom prst="straightConnector1">
             <a:avLst/>
@@ -3846,13 +3840,15 @@
       <p:cxnSp>
         <p:nvCxnSpPr>
           <p:cNvPr id="12" name="Straight Arrow Connector 11"/>
-          <p:cNvCxnSpPr/>
+          <p:cNvCxnSpPr>
+            <a:cxnSpLocks/>
+          </p:cNvCxnSpPr>
           <p:nvPr/>
         </p:nvCxnSpPr>
         <p:spPr>
           <a:xfrm>
-            <a:off x="2569639" y="3276600"/>
-            <a:ext cx="838198" cy="0"/>
+            <a:off x="2514600" y="3415225"/>
+            <a:ext cx="897469" cy="0"/>
           </a:xfrm>
           <a:prstGeom prst="straightConnector1">
             <a:avLst/>
@@ -3883,6 +3879,7 @@
         <p:nvCxnSpPr>
           <p:cNvPr id="13" name="Straight Arrow Connector 12"/>
           <p:cNvCxnSpPr>
+            <a:cxnSpLocks/>
             <a:stCxn id="3" idx="2"/>
             <a:endCxn id="5" idx="0"/>
           </p:cNvCxnSpPr>
@@ -3890,8 +3887,8 @@
         </p:nvCxnSpPr>
         <p:spPr>
           <a:xfrm>
-            <a:off x="4059769" y="2743200"/>
-            <a:ext cx="0" cy="381000"/>
+            <a:off x="3915827" y="3091900"/>
+            <a:ext cx="1" cy="157150"/>
           </a:xfrm>
           <a:prstGeom prst="straightConnector1">
             <a:avLst/>
@@ -3921,16 +3918,22 @@
       <p:cxnSp>
         <p:nvCxnSpPr>
           <p:cNvPr id="16" name="Straight Arrow Connector 15"/>
-          <p:cNvCxnSpPr/>
+          <p:cNvCxnSpPr>
+            <a:cxnSpLocks/>
+            <a:stCxn id="3" idx="3"/>
+            <a:endCxn id="4" idx="1"/>
+          </p:cNvCxnSpPr>
           <p:nvPr/>
         </p:nvCxnSpPr>
         <p:spPr>
-          <a:xfrm>
-            <a:off x="4707469" y="2467189"/>
-            <a:ext cx="457200" cy="0"/>
-          </a:xfrm>
-          <a:prstGeom prst="straightConnector1">
-            <a:avLst/>
+          <a:xfrm flipV="1">
+            <a:off x="4419585" y="2467190"/>
+            <a:ext cx="745084" cy="450360"/>
+          </a:xfrm>
+          <a:prstGeom prst="bentConnector3">
+            <a:avLst>
+              <a:gd name="adj1" fmla="val 50000"/>
+            </a:avLst>
           </a:prstGeom>
           <a:ln w="28575">
             <a:solidFill>
@@ -4042,13 +4045,15 @@
       <p:cxnSp>
         <p:nvCxnSpPr>
           <p:cNvPr id="34" name="Straight Arrow Connector 33"/>
-          <p:cNvCxnSpPr/>
+          <p:cNvCxnSpPr>
+            <a:cxnSpLocks/>
+          </p:cNvCxnSpPr>
           <p:nvPr/>
         </p:nvCxnSpPr>
         <p:spPr>
           <a:xfrm flipV="1">
-            <a:off x="6680199" y="2467190"/>
-            <a:ext cx="939801" cy="1"/>
+            <a:off x="6612469" y="2467191"/>
+            <a:ext cx="1007531" cy="9309"/>
           </a:xfrm>
           <a:prstGeom prst="straightConnector1">
             <a:avLst/>
@@ -4313,7 +4318,7 @@
           <a:p>
             <a:pPr algn="ctr"/>
             <a:r>
-              <a:rPr lang="en-US" sz="1600" dirty="0" smtClean="0">
+              <a:rPr lang="en-US" sz="1600" dirty="0">
                 <a:solidFill>
                   <a:schemeClr val="bg1"/>
                 </a:solidFill>
@@ -4664,7 +4669,7 @@
           <a:p>
             <a:pPr algn="ctr"/>
             <a:r>
-              <a:rPr lang="en-US" sz="1600" dirty="0" smtClean="0">
+              <a:rPr lang="en-US" sz="1600" dirty="0">
                 <a:solidFill>
                   <a:schemeClr val="bg1"/>
                 </a:solidFill>
@@ -4672,25 +4677,20 @@
               <a:t>Logs</a:t>
             </a:r>
             <a:br>
-              <a:rPr lang="en-US" sz="1600" dirty="0" smtClean="0">
+              <a:rPr lang="en-US" sz="1600" dirty="0">
                 <a:solidFill>
                   <a:schemeClr val="bg1"/>
                 </a:solidFill>
               </a:rPr>
             </a:br>
             <a:r>
-              <a:rPr lang="en-US" sz="1600" dirty="0" smtClean="0">
+              <a:rPr lang="en-US" sz="1600" dirty="0">
                 <a:solidFill>
                   <a:schemeClr val="bg1"/>
                 </a:solidFill>
               </a:rPr>
               <a:t>Center</a:t>
             </a:r>
-            <a:endParaRPr lang="en-US" sz="1600" dirty="0">
-              <a:solidFill>
-                <a:schemeClr val="bg1"/>
-              </a:solidFill>
-            </a:endParaRPr>
           </a:p>
         </p:txBody>
       </p:sp>
@@ -4773,6 +4773,265 @@
           </a:fontRef>
         </p:style>
       </p:cxnSp>
+      <p:sp>
+        <p:nvSpPr>
+          <p:cNvPr id="69" name="Rectangle 45">
+            <a:extLst>
+              <a:ext uri="{FF2B5EF4-FFF2-40B4-BE49-F238E27FC236}">
+                <a16:creationId xmlns:a16="http://schemas.microsoft.com/office/drawing/2014/main" id="{1E2CC484-762F-4C65-BE84-598C93A7E90F}"/>
+              </a:ext>
+            </a:extLst>
+          </p:cNvPr>
+          <p:cNvSpPr/>
+          <p:nvPr/>
+        </p:nvSpPr>
+        <p:spPr>
+          <a:xfrm>
+            <a:off x="3412068" y="2208956"/>
+            <a:ext cx="1007518" cy="332350"/>
+          </a:xfrm>
+          <a:prstGeom prst="roundRect">
+            <a:avLst/>
+          </a:prstGeom>
+          <a:solidFill>
+            <a:srgbClr val="5D5F73"/>
+          </a:solidFill>
+          <a:ln w="19050">
+            <a:solidFill>
+              <a:srgbClr val="5D5F73"/>
+            </a:solidFill>
+          </a:ln>
+          <a:effectLst/>
+        </p:spPr>
+        <p:style>
+          <a:lnRef idx="1">
+            <a:schemeClr val="accent5"/>
+          </a:lnRef>
+          <a:fillRef idx="2">
+            <a:schemeClr val="accent5"/>
+          </a:fillRef>
+          <a:effectRef idx="1">
+            <a:schemeClr val="accent5"/>
+          </a:effectRef>
+          <a:fontRef idx="minor">
+            <a:schemeClr val="dk1"/>
+          </a:fontRef>
+        </p:style>
+        <p:txBody>
+          <a:bodyPr rtlCol="0" anchor="ctr"/>
+          <a:lstStyle/>
+          <a:p>
+            <a:pPr algn="ctr"/>
+            <a:r>
+              <a:rPr lang="en-US" sz="1600" dirty="0">
+                <a:solidFill>
+                  <a:schemeClr val="bg1"/>
+                </a:solidFill>
+              </a:rPr>
+              <a:t>Calendar</a:t>
+            </a:r>
+            <a:endParaRPr lang="en-SG" sz="1600" dirty="0">
+              <a:solidFill>
+                <a:schemeClr val="bg1"/>
+              </a:solidFill>
+            </a:endParaRPr>
+          </a:p>
+        </p:txBody>
+      </p:sp>
+      <p:cxnSp>
+        <p:nvCxnSpPr>
+          <p:cNvPr id="70" name="Straight Arrow Connector 69">
+            <a:extLst>
+              <a:ext uri="{FF2B5EF4-FFF2-40B4-BE49-F238E27FC236}">
+                <a16:creationId xmlns:a16="http://schemas.microsoft.com/office/drawing/2014/main" id="{790EAEFA-00E0-47C1-AC54-E87ACFF2861B}"/>
+              </a:ext>
+            </a:extLst>
+          </p:cNvPr>
+          <p:cNvCxnSpPr>
+            <a:cxnSpLocks/>
+          </p:cNvCxnSpPr>
+          <p:nvPr/>
+        </p:nvCxnSpPr>
+        <p:spPr>
+          <a:xfrm flipV="1">
+            <a:off x="2578100" y="2381907"/>
+            <a:ext cx="838197" cy="3546"/>
+          </a:xfrm>
+          <a:prstGeom prst="straightConnector1">
+            <a:avLst/>
+          </a:prstGeom>
+          <a:ln w="28575">
+            <a:solidFill>
+              <a:srgbClr val="00B050"/>
+            </a:solidFill>
+            <a:tailEnd type="arrow"/>
+          </a:ln>
+        </p:spPr>
+        <p:style>
+          <a:lnRef idx="1">
+            <a:schemeClr val="accent1"/>
+          </a:lnRef>
+          <a:fillRef idx="0">
+            <a:schemeClr val="accent1"/>
+          </a:fillRef>
+          <a:effectRef idx="0">
+            <a:schemeClr val="accent1"/>
+          </a:effectRef>
+          <a:fontRef idx="minor">
+            <a:schemeClr val="tx1"/>
+          </a:fontRef>
+        </p:style>
+      </p:cxnSp>
+      <p:cxnSp>
+        <p:nvCxnSpPr>
+          <p:cNvPr id="71" name="Straight Arrow Connector 70">
+            <a:extLst>
+              <a:ext uri="{FF2B5EF4-FFF2-40B4-BE49-F238E27FC236}">
+                <a16:creationId xmlns:a16="http://schemas.microsoft.com/office/drawing/2014/main" id="{80288C91-ED27-4A5E-9893-CDAEB8060682}"/>
+              </a:ext>
+            </a:extLst>
+          </p:cNvPr>
+          <p:cNvCxnSpPr>
+            <a:cxnSpLocks/>
+            <a:stCxn id="3" idx="0"/>
+            <a:endCxn id="69" idx="2"/>
+          </p:cNvCxnSpPr>
+          <p:nvPr/>
+        </p:nvCxnSpPr>
+        <p:spPr>
+          <a:xfrm flipV="1">
+            <a:off x="3915827" y="2541306"/>
+            <a:ext cx="0" cy="201894"/>
+          </a:xfrm>
+          <a:prstGeom prst="straightConnector1">
+            <a:avLst/>
+          </a:prstGeom>
+          <a:ln w="28575">
+            <a:solidFill>
+              <a:srgbClr val="0070C0"/>
+            </a:solidFill>
+            <a:tailEnd type="arrow"/>
+          </a:ln>
+        </p:spPr>
+        <p:style>
+          <a:lnRef idx="1">
+            <a:schemeClr val="accent1"/>
+          </a:lnRef>
+          <a:fillRef idx="0">
+            <a:schemeClr val="accent1"/>
+          </a:fillRef>
+          <a:effectRef idx="0">
+            <a:schemeClr val="accent1"/>
+          </a:effectRef>
+          <a:fontRef idx="minor">
+            <a:schemeClr val="tx1"/>
+          </a:fontRef>
+        </p:style>
+      </p:cxnSp>
+      <p:cxnSp>
+        <p:nvCxnSpPr>
+          <p:cNvPr id="76" name="Elbow Connector 51">
+            <a:extLst>
+              <a:ext uri="{FF2B5EF4-FFF2-40B4-BE49-F238E27FC236}">
+                <a16:creationId xmlns:a16="http://schemas.microsoft.com/office/drawing/2014/main" id="{F5A0B626-20C2-4919-8DA2-8F53F9693B2F}"/>
+              </a:ext>
+            </a:extLst>
+          </p:cNvPr>
+          <p:cNvCxnSpPr/>
+          <p:nvPr/>
+        </p:nvCxnSpPr>
+        <p:spPr>
+          <a:xfrm rot="5400000" flipH="1" flipV="1">
+            <a:off x="3869405" y="1768730"/>
+            <a:ext cx="476678" cy="383835"/>
+          </a:xfrm>
+          <a:prstGeom prst="bentConnector2">
+            <a:avLst/>
+          </a:prstGeom>
+          <a:ln w="28575">
+            <a:solidFill>
+              <a:srgbClr val="5D5F73"/>
+            </a:solidFill>
+            <a:prstDash val="sysDot"/>
+            <a:tailEnd type="arrow"/>
+          </a:ln>
+        </p:spPr>
+        <p:style>
+          <a:lnRef idx="1">
+            <a:schemeClr val="accent1"/>
+          </a:lnRef>
+          <a:fillRef idx="0">
+            <a:schemeClr val="accent1"/>
+          </a:fillRef>
+          <a:effectRef idx="0">
+            <a:schemeClr val="accent1"/>
+          </a:effectRef>
+          <a:fontRef idx="minor">
+            <a:schemeClr val="tx1"/>
+          </a:fontRef>
+        </p:style>
+      </p:cxnSp>
+      <p:sp>
+        <p:nvSpPr>
+          <p:cNvPr id="77" name="Cloud 76">
+            <a:extLst>
+              <a:ext uri="{FF2B5EF4-FFF2-40B4-BE49-F238E27FC236}">
+                <a16:creationId xmlns:a16="http://schemas.microsoft.com/office/drawing/2014/main" id="{B8A54718-6189-41DD-91AF-35B8F3642289}"/>
+              </a:ext>
+            </a:extLst>
+          </p:cNvPr>
+          <p:cNvSpPr/>
+          <p:nvPr/>
+        </p:nvSpPr>
+        <p:spPr>
+          <a:xfrm>
+            <a:off x="4274256" y="1115983"/>
+            <a:ext cx="1974143" cy="852619"/>
+          </a:xfrm>
+          <a:prstGeom prst="cloud">
+            <a:avLst/>
+          </a:prstGeom>
+          <a:solidFill>
+            <a:schemeClr val="bg1"/>
+          </a:solidFill>
+          <a:ln>
+            <a:solidFill>
+              <a:schemeClr val="tx1"/>
+            </a:solidFill>
+          </a:ln>
+        </p:spPr>
+        <p:style>
+          <a:lnRef idx="2">
+            <a:schemeClr val="accent1">
+              <a:shade val="50000"/>
+            </a:schemeClr>
+          </a:lnRef>
+          <a:fillRef idx="1">
+            <a:schemeClr val="accent1"/>
+          </a:fillRef>
+          <a:effectRef idx="0">
+            <a:schemeClr val="accent1"/>
+          </a:effectRef>
+          <a:fontRef idx="minor">
+            <a:schemeClr val="lt1"/>
+          </a:fontRef>
+        </p:style>
+        <p:txBody>
+          <a:bodyPr rtlCol="0" anchor="ctr"/>
+          <a:lstStyle/>
+          <a:p>
+            <a:pPr algn="ctr"/>
+            <a:r>
+              <a:rPr lang="en-US" sz="1400" dirty="0">
+                <a:solidFill>
+                  <a:schemeClr val="tx1"/>
+                </a:solidFill>
+              </a:rPr>
+              <a:t>Google Calendar</a:t>
+            </a:r>
+          </a:p>
+        </p:txBody>
+      </p:sp>
     </p:spTree>
     <p:extLst>
       <p:ext uri="{BB962C8B-B14F-4D97-AF65-F5344CB8AC3E}">

</xml_diff>

<commit_message>
Revert "Add Calendar Component and update storage component"
</commit_message>
<xml_diff>
--- a/docs/diagrams/ArchitectureDiagram.pptx
+++ b/docs/diagrams/ArchitectureDiagram.pptx
@@ -107,22 +107,6 @@
       </a:defRPr>
     </a:lvl9pPr>
   </p:defaultTextStyle>
-  <p:extLst>
-    <p:ext uri="{EFAFB233-063F-42B5-8137-9DF3F51BA10A}">
-      <p15:sldGuideLst xmlns:p15="http://schemas.microsoft.com/office/powerpoint/2012/main">
-        <p15:guide id="1" orient="horz" pos="1488">
-          <p15:clr>
-            <a:srgbClr val="A4A3A4"/>
-          </p15:clr>
-        </p15:guide>
-        <p15:guide id="2" pos="2880">
-          <p15:clr>
-            <a:srgbClr val="A4A3A4"/>
-          </p15:clr>
-        </p15:guide>
-      </p15:sldGuideLst>
-    </p:ext>
-  </p:extLst>
 </p:presentation>
 </file>
 
@@ -208,7 +192,7 @@
           <a:p>
             <a:fld id="{F5CC4B3F-88C1-4FFA-B1B6-F41C21DC6924}" type="datetimeFigureOut">
               <a:rPr lang="en-US" smtClean="0"/>
-              <a:t>11/12/2018</a:t>
+              <a:t>10/16/2016</a:t>
             </a:fld>
             <a:endParaRPr lang="en-US"/>
           </a:p>
@@ -272,37 +256,38 @@
           <a:p>
             <a:pPr lvl="0"/>
             <a:r>
-              <a:rPr lang="en-US"/>
+              <a:rPr lang="en-US" smtClean="0"/>
               <a:t>Click to edit Master text styles</a:t>
             </a:r>
           </a:p>
           <a:p>
             <a:pPr lvl="1"/>
             <a:r>
-              <a:rPr lang="en-US"/>
+              <a:rPr lang="en-US" smtClean="0"/>
               <a:t>Second level</a:t>
             </a:r>
           </a:p>
           <a:p>
             <a:pPr lvl="2"/>
             <a:r>
-              <a:rPr lang="en-US"/>
+              <a:rPr lang="en-US" smtClean="0"/>
               <a:t>Third level</a:t>
             </a:r>
           </a:p>
           <a:p>
             <a:pPr lvl="3"/>
             <a:r>
-              <a:rPr lang="en-US"/>
+              <a:rPr lang="en-US" smtClean="0"/>
               <a:t>Fourth level</a:t>
             </a:r>
           </a:p>
           <a:p>
             <a:pPr lvl="4"/>
             <a:r>
-              <a:rPr lang="en-US"/>
+              <a:rPr lang="en-US" smtClean="0"/>
               <a:t>Fifth level</a:t>
             </a:r>
+            <a:endParaRPr lang="en-US"/>
           </a:p>
         </p:txBody>
       </p:sp>
@@ -513,9 +498,10 @@
           <a:lstStyle/>
           <a:p>
             <a:r>
-              <a:rPr lang="en-US"/>
+              <a:rPr lang="en-US" smtClean="0"/>
               <a:t>Click to edit Master title style</a:t>
             </a:r>
+            <a:endParaRPr lang="en-US"/>
           </a:p>
         </p:txBody>
       </p:sp>
@@ -631,9 +617,10 @@
           </a:lstStyle>
           <a:p>
             <a:r>
-              <a:rPr lang="en-US"/>
+              <a:rPr lang="en-US" smtClean="0"/>
               <a:t>Click to edit Master subtitle style</a:t>
             </a:r>
+            <a:endParaRPr lang="en-US"/>
           </a:p>
         </p:txBody>
       </p:sp>
@@ -654,7 +641,7 @@
           <a:p>
             <a:fld id="{78C97017-6FC3-485B-9764-EAC9E56C1D49}" type="datetimeFigureOut">
               <a:rPr lang="en-US" smtClean="0"/>
-              <a:t>11/12/2018</a:t>
+              <a:t>10/16/2016</a:t>
             </a:fld>
             <a:endParaRPr lang="en-US"/>
           </a:p>
@@ -748,9 +735,10 @@
           <a:lstStyle/>
           <a:p>
             <a:r>
-              <a:rPr lang="en-US"/>
+              <a:rPr lang="en-US" smtClean="0"/>
               <a:t>Click to edit Master title style</a:t>
             </a:r>
+            <a:endParaRPr lang="en-US"/>
           </a:p>
         </p:txBody>
       </p:sp>
@@ -771,37 +759,38 @@
           <a:p>
             <a:pPr lvl="0"/>
             <a:r>
-              <a:rPr lang="en-US"/>
+              <a:rPr lang="en-US" smtClean="0"/>
               <a:t>Click to edit Master text styles</a:t>
             </a:r>
           </a:p>
           <a:p>
             <a:pPr lvl="1"/>
             <a:r>
-              <a:rPr lang="en-US"/>
+              <a:rPr lang="en-US" smtClean="0"/>
               <a:t>Second level</a:t>
             </a:r>
           </a:p>
           <a:p>
             <a:pPr lvl="2"/>
             <a:r>
-              <a:rPr lang="en-US"/>
+              <a:rPr lang="en-US" smtClean="0"/>
               <a:t>Third level</a:t>
             </a:r>
           </a:p>
           <a:p>
             <a:pPr lvl="3"/>
             <a:r>
-              <a:rPr lang="en-US"/>
+              <a:rPr lang="en-US" smtClean="0"/>
               <a:t>Fourth level</a:t>
             </a:r>
           </a:p>
           <a:p>
             <a:pPr lvl="4"/>
             <a:r>
-              <a:rPr lang="en-US"/>
+              <a:rPr lang="en-US" smtClean="0"/>
               <a:t>Fifth level</a:t>
             </a:r>
+            <a:endParaRPr lang="en-US"/>
           </a:p>
         </p:txBody>
       </p:sp>
@@ -822,7 +811,7 @@
           <a:p>
             <a:fld id="{78C97017-6FC3-485B-9764-EAC9E56C1D49}" type="datetimeFigureOut">
               <a:rPr lang="en-US" smtClean="0"/>
-              <a:t>11/12/2018</a:t>
+              <a:t>10/16/2016</a:t>
             </a:fld>
             <a:endParaRPr lang="en-US"/>
           </a:p>
@@ -921,9 +910,10 @@
           <a:lstStyle/>
           <a:p>
             <a:r>
-              <a:rPr lang="en-US"/>
+              <a:rPr lang="en-US" smtClean="0"/>
               <a:t>Click to edit Master title style</a:t>
             </a:r>
+            <a:endParaRPr lang="en-US"/>
           </a:p>
         </p:txBody>
       </p:sp>
@@ -949,37 +939,38 @@
           <a:p>
             <a:pPr lvl="0"/>
             <a:r>
-              <a:rPr lang="en-US"/>
+              <a:rPr lang="en-US" smtClean="0"/>
               <a:t>Click to edit Master text styles</a:t>
             </a:r>
           </a:p>
           <a:p>
             <a:pPr lvl="1"/>
             <a:r>
-              <a:rPr lang="en-US"/>
+              <a:rPr lang="en-US" smtClean="0"/>
               <a:t>Second level</a:t>
             </a:r>
           </a:p>
           <a:p>
             <a:pPr lvl="2"/>
             <a:r>
-              <a:rPr lang="en-US"/>
+              <a:rPr lang="en-US" smtClean="0"/>
               <a:t>Third level</a:t>
             </a:r>
           </a:p>
           <a:p>
             <a:pPr lvl="3"/>
             <a:r>
-              <a:rPr lang="en-US"/>
+              <a:rPr lang="en-US" smtClean="0"/>
               <a:t>Fourth level</a:t>
             </a:r>
           </a:p>
           <a:p>
             <a:pPr lvl="4"/>
             <a:r>
-              <a:rPr lang="en-US"/>
+              <a:rPr lang="en-US" smtClean="0"/>
               <a:t>Fifth level</a:t>
             </a:r>
+            <a:endParaRPr lang="en-US"/>
           </a:p>
         </p:txBody>
       </p:sp>
@@ -1000,7 +991,7 @@
           <a:p>
             <a:fld id="{78C97017-6FC3-485B-9764-EAC9E56C1D49}" type="datetimeFigureOut">
               <a:rPr lang="en-US" smtClean="0"/>
-              <a:t>11/12/2018</a:t>
+              <a:t>10/16/2016</a:t>
             </a:fld>
             <a:endParaRPr lang="en-US"/>
           </a:p>
@@ -1094,9 +1085,10 @@
           <a:lstStyle/>
           <a:p>
             <a:r>
-              <a:rPr lang="en-US"/>
+              <a:rPr lang="en-US" smtClean="0"/>
               <a:t>Click to edit Master title style</a:t>
             </a:r>
+            <a:endParaRPr lang="en-US"/>
           </a:p>
         </p:txBody>
       </p:sp>
@@ -1117,37 +1109,38 @@
           <a:p>
             <a:pPr lvl="0"/>
             <a:r>
-              <a:rPr lang="en-US"/>
+              <a:rPr lang="en-US" smtClean="0"/>
               <a:t>Click to edit Master text styles</a:t>
             </a:r>
           </a:p>
           <a:p>
             <a:pPr lvl="1"/>
             <a:r>
-              <a:rPr lang="en-US"/>
+              <a:rPr lang="en-US" smtClean="0"/>
               <a:t>Second level</a:t>
             </a:r>
           </a:p>
           <a:p>
             <a:pPr lvl="2"/>
             <a:r>
-              <a:rPr lang="en-US"/>
+              <a:rPr lang="en-US" smtClean="0"/>
               <a:t>Third level</a:t>
             </a:r>
           </a:p>
           <a:p>
             <a:pPr lvl="3"/>
             <a:r>
-              <a:rPr lang="en-US"/>
+              <a:rPr lang="en-US" smtClean="0"/>
               <a:t>Fourth level</a:t>
             </a:r>
           </a:p>
           <a:p>
             <a:pPr lvl="4"/>
             <a:r>
-              <a:rPr lang="en-US"/>
+              <a:rPr lang="en-US" smtClean="0"/>
               <a:t>Fifth level</a:t>
             </a:r>
+            <a:endParaRPr lang="en-US"/>
           </a:p>
         </p:txBody>
       </p:sp>
@@ -1168,7 +1161,7 @@
           <a:p>
             <a:fld id="{78C97017-6FC3-485B-9764-EAC9E56C1D49}" type="datetimeFigureOut">
               <a:rPr lang="en-US" smtClean="0"/>
-              <a:t>11/12/2018</a:t>
+              <a:t>10/16/2016</a:t>
             </a:fld>
             <a:endParaRPr lang="en-US"/>
           </a:p>
@@ -1271,9 +1264,10 @@
           </a:lstStyle>
           <a:p>
             <a:r>
-              <a:rPr lang="en-US"/>
+              <a:rPr lang="en-US" smtClean="0"/>
               <a:t>Click to edit Master title style</a:t>
             </a:r>
+            <a:endParaRPr lang="en-US"/>
           </a:p>
         </p:txBody>
       </p:sp>
@@ -1390,7 +1384,7 @@
           <a:p>
             <a:pPr lvl="0"/>
             <a:r>
-              <a:rPr lang="en-US"/>
+              <a:rPr lang="en-US" smtClean="0"/>
               <a:t>Click to edit Master text styles</a:t>
             </a:r>
           </a:p>
@@ -1413,7 +1407,7 @@
           <a:p>
             <a:fld id="{78C97017-6FC3-485B-9764-EAC9E56C1D49}" type="datetimeFigureOut">
               <a:rPr lang="en-US" smtClean="0"/>
-              <a:t>11/12/2018</a:t>
+              <a:t>10/16/2016</a:t>
             </a:fld>
             <a:endParaRPr lang="en-US"/>
           </a:p>
@@ -1507,9 +1501,10 @@
           <a:lstStyle/>
           <a:p>
             <a:r>
-              <a:rPr lang="en-US"/>
+              <a:rPr lang="en-US" smtClean="0"/>
               <a:t>Click to edit Master title style</a:t>
             </a:r>
+            <a:endParaRPr lang="en-US"/>
           </a:p>
         </p:txBody>
       </p:sp>
@@ -1563,37 +1558,38 @@
           <a:p>
             <a:pPr lvl="0"/>
             <a:r>
-              <a:rPr lang="en-US"/>
+              <a:rPr lang="en-US" smtClean="0"/>
               <a:t>Click to edit Master text styles</a:t>
             </a:r>
           </a:p>
           <a:p>
             <a:pPr lvl="1"/>
             <a:r>
-              <a:rPr lang="en-US"/>
+              <a:rPr lang="en-US" smtClean="0"/>
               <a:t>Second level</a:t>
             </a:r>
           </a:p>
           <a:p>
             <a:pPr lvl="2"/>
             <a:r>
-              <a:rPr lang="en-US"/>
+              <a:rPr lang="en-US" smtClean="0"/>
               <a:t>Third level</a:t>
             </a:r>
           </a:p>
           <a:p>
             <a:pPr lvl="3"/>
             <a:r>
-              <a:rPr lang="en-US"/>
+              <a:rPr lang="en-US" smtClean="0"/>
               <a:t>Fourth level</a:t>
             </a:r>
           </a:p>
           <a:p>
             <a:pPr lvl="4"/>
             <a:r>
-              <a:rPr lang="en-US"/>
+              <a:rPr lang="en-US" smtClean="0"/>
               <a:t>Fifth level</a:t>
             </a:r>
+            <a:endParaRPr lang="en-US"/>
           </a:p>
         </p:txBody>
       </p:sp>
@@ -1647,37 +1643,38 @@
           <a:p>
             <a:pPr lvl="0"/>
             <a:r>
-              <a:rPr lang="en-US"/>
+              <a:rPr lang="en-US" smtClean="0"/>
               <a:t>Click to edit Master text styles</a:t>
             </a:r>
           </a:p>
           <a:p>
             <a:pPr lvl="1"/>
             <a:r>
-              <a:rPr lang="en-US"/>
+              <a:rPr lang="en-US" smtClean="0"/>
               <a:t>Second level</a:t>
             </a:r>
           </a:p>
           <a:p>
             <a:pPr lvl="2"/>
             <a:r>
-              <a:rPr lang="en-US"/>
+              <a:rPr lang="en-US" smtClean="0"/>
               <a:t>Third level</a:t>
             </a:r>
           </a:p>
           <a:p>
             <a:pPr lvl="3"/>
             <a:r>
-              <a:rPr lang="en-US"/>
+              <a:rPr lang="en-US" smtClean="0"/>
               <a:t>Fourth level</a:t>
             </a:r>
           </a:p>
           <a:p>
             <a:pPr lvl="4"/>
             <a:r>
-              <a:rPr lang="en-US"/>
+              <a:rPr lang="en-US" smtClean="0"/>
               <a:t>Fifth level</a:t>
             </a:r>
+            <a:endParaRPr lang="en-US"/>
           </a:p>
         </p:txBody>
       </p:sp>
@@ -1698,7 +1695,7 @@
           <a:p>
             <a:fld id="{78C97017-6FC3-485B-9764-EAC9E56C1D49}" type="datetimeFigureOut">
               <a:rPr lang="en-US" smtClean="0"/>
-              <a:t>11/12/2018</a:t>
+              <a:t>10/16/2016</a:t>
             </a:fld>
             <a:endParaRPr lang="en-US"/>
           </a:p>
@@ -1796,9 +1793,10 @@
           </a:lstStyle>
           <a:p>
             <a:r>
-              <a:rPr lang="en-US"/>
+              <a:rPr lang="en-US" smtClean="0"/>
               <a:t>Click to edit Master title style</a:t>
             </a:r>
+            <a:endParaRPr lang="en-US"/>
           </a:p>
         </p:txBody>
       </p:sp>
@@ -1861,7 +1859,7 @@
           <a:p>
             <a:pPr lvl="0"/>
             <a:r>
-              <a:rPr lang="en-US"/>
+              <a:rPr lang="en-US" smtClean="0"/>
               <a:t>Click to edit Master text styles</a:t>
             </a:r>
           </a:p>
@@ -1917,37 +1915,38 @@
           <a:p>
             <a:pPr lvl="0"/>
             <a:r>
-              <a:rPr lang="en-US"/>
+              <a:rPr lang="en-US" smtClean="0"/>
               <a:t>Click to edit Master text styles</a:t>
             </a:r>
           </a:p>
           <a:p>
             <a:pPr lvl="1"/>
             <a:r>
-              <a:rPr lang="en-US"/>
+              <a:rPr lang="en-US" smtClean="0"/>
               <a:t>Second level</a:t>
             </a:r>
           </a:p>
           <a:p>
             <a:pPr lvl="2"/>
             <a:r>
-              <a:rPr lang="en-US"/>
+              <a:rPr lang="en-US" smtClean="0"/>
               <a:t>Third level</a:t>
             </a:r>
           </a:p>
           <a:p>
             <a:pPr lvl="3"/>
             <a:r>
-              <a:rPr lang="en-US"/>
+              <a:rPr lang="en-US" smtClean="0"/>
               <a:t>Fourth level</a:t>
             </a:r>
           </a:p>
           <a:p>
             <a:pPr lvl="4"/>
             <a:r>
-              <a:rPr lang="en-US"/>
+              <a:rPr lang="en-US" smtClean="0"/>
               <a:t>Fifth level</a:t>
             </a:r>
+            <a:endParaRPr lang="en-US"/>
           </a:p>
         </p:txBody>
       </p:sp>
@@ -2010,7 +2009,7 @@
           <a:p>
             <a:pPr lvl="0"/>
             <a:r>
-              <a:rPr lang="en-US"/>
+              <a:rPr lang="en-US" smtClean="0"/>
               <a:t>Click to edit Master text styles</a:t>
             </a:r>
           </a:p>
@@ -2066,37 +2065,38 @@
           <a:p>
             <a:pPr lvl="0"/>
             <a:r>
-              <a:rPr lang="en-US"/>
+              <a:rPr lang="en-US" smtClean="0"/>
               <a:t>Click to edit Master text styles</a:t>
             </a:r>
           </a:p>
           <a:p>
             <a:pPr lvl="1"/>
             <a:r>
-              <a:rPr lang="en-US"/>
+              <a:rPr lang="en-US" smtClean="0"/>
               <a:t>Second level</a:t>
             </a:r>
           </a:p>
           <a:p>
             <a:pPr lvl="2"/>
             <a:r>
-              <a:rPr lang="en-US"/>
+              <a:rPr lang="en-US" smtClean="0"/>
               <a:t>Third level</a:t>
             </a:r>
           </a:p>
           <a:p>
             <a:pPr lvl="3"/>
             <a:r>
-              <a:rPr lang="en-US"/>
+              <a:rPr lang="en-US" smtClean="0"/>
               <a:t>Fourth level</a:t>
             </a:r>
           </a:p>
           <a:p>
             <a:pPr lvl="4"/>
             <a:r>
-              <a:rPr lang="en-US"/>
+              <a:rPr lang="en-US" smtClean="0"/>
               <a:t>Fifth level</a:t>
             </a:r>
+            <a:endParaRPr lang="en-US"/>
           </a:p>
         </p:txBody>
       </p:sp>
@@ -2117,7 +2117,7 @@
           <a:p>
             <a:fld id="{78C97017-6FC3-485B-9764-EAC9E56C1D49}" type="datetimeFigureOut">
               <a:rPr lang="en-US" smtClean="0"/>
-              <a:t>11/12/2018</a:t>
+              <a:t>10/16/2016</a:t>
             </a:fld>
             <a:endParaRPr lang="en-US"/>
           </a:p>
@@ -2211,9 +2211,10 @@
           <a:lstStyle/>
           <a:p>
             <a:r>
-              <a:rPr lang="en-US"/>
+              <a:rPr lang="en-US" smtClean="0"/>
               <a:t>Click to edit Master title style</a:t>
             </a:r>
+            <a:endParaRPr lang="en-US"/>
           </a:p>
         </p:txBody>
       </p:sp>
@@ -2234,7 +2235,7 @@
           <a:p>
             <a:fld id="{78C97017-6FC3-485B-9764-EAC9E56C1D49}" type="datetimeFigureOut">
               <a:rPr lang="en-US" smtClean="0"/>
-              <a:t>11/12/2018</a:t>
+              <a:t>10/16/2016</a:t>
             </a:fld>
             <a:endParaRPr lang="en-US"/>
           </a:p>
@@ -2329,7 +2330,7 @@
           <a:p>
             <a:fld id="{78C97017-6FC3-485B-9764-EAC9E56C1D49}" type="datetimeFigureOut">
               <a:rPr lang="en-US" smtClean="0"/>
-              <a:t>11/12/2018</a:t>
+              <a:t>10/16/2016</a:t>
             </a:fld>
             <a:endParaRPr lang="en-US"/>
           </a:p>
@@ -2432,9 +2433,10 @@
           </a:lstStyle>
           <a:p>
             <a:r>
-              <a:rPr lang="en-US"/>
+              <a:rPr lang="en-US" smtClean="0"/>
               <a:t>Click to edit Master title style</a:t>
             </a:r>
+            <a:endParaRPr lang="en-US"/>
           </a:p>
         </p:txBody>
       </p:sp>
@@ -2488,37 +2490,38 @@
           <a:p>
             <a:pPr lvl="0"/>
             <a:r>
-              <a:rPr lang="en-US"/>
+              <a:rPr lang="en-US" smtClean="0"/>
               <a:t>Click to edit Master text styles</a:t>
             </a:r>
           </a:p>
           <a:p>
             <a:pPr lvl="1"/>
             <a:r>
-              <a:rPr lang="en-US"/>
+              <a:rPr lang="en-US" smtClean="0"/>
               <a:t>Second level</a:t>
             </a:r>
           </a:p>
           <a:p>
             <a:pPr lvl="2"/>
             <a:r>
-              <a:rPr lang="en-US"/>
+              <a:rPr lang="en-US" smtClean="0"/>
               <a:t>Third level</a:t>
             </a:r>
           </a:p>
           <a:p>
             <a:pPr lvl="3"/>
             <a:r>
-              <a:rPr lang="en-US"/>
+              <a:rPr lang="en-US" smtClean="0"/>
               <a:t>Fourth level</a:t>
             </a:r>
           </a:p>
           <a:p>
             <a:pPr lvl="4"/>
             <a:r>
-              <a:rPr lang="en-US"/>
+              <a:rPr lang="en-US" smtClean="0"/>
               <a:t>Fifth level</a:t>
             </a:r>
+            <a:endParaRPr lang="en-US"/>
           </a:p>
         </p:txBody>
       </p:sp>
@@ -2581,7 +2584,7 @@
           <a:p>
             <a:pPr lvl="0"/>
             <a:r>
-              <a:rPr lang="en-US"/>
+              <a:rPr lang="en-US" smtClean="0"/>
               <a:t>Click to edit Master text styles</a:t>
             </a:r>
           </a:p>
@@ -2604,7 +2607,7 @@
           <a:p>
             <a:fld id="{78C97017-6FC3-485B-9764-EAC9E56C1D49}" type="datetimeFigureOut">
               <a:rPr lang="en-US" smtClean="0"/>
-              <a:t>11/12/2018</a:t>
+              <a:t>10/16/2016</a:t>
             </a:fld>
             <a:endParaRPr lang="en-US"/>
           </a:p>
@@ -2707,9 +2710,10 @@
           </a:lstStyle>
           <a:p>
             <a:r>
-              <a:rPr lang="en-US"/>
+              <a:rPr lang="en-US" smtClean="0"/>
               <a:t>Click to edit Master title style</a:t>
             </a:r>
+            <a:endParaRPr lang="en-US"/>
           </a:p>
         </p:txBody>
       </p:sp>
@@ -2833,7 +2837,7 @@
           <a:p>
             <a:pPr lvl="0"/>
             <a:r>
-              <a:rPr lang="en-US"/>
+              <a:rPr lang="en-US" smtClean="0"/>
               <a:t>Click to edit Master text styles</a:t>
             </a:r>
           </a:p>
@@ -2856,7 +2860,7 @@
           <a:p>
             <a:fld id="{78C97017-6FC3-485B-9764-EAC9E56C1D49}" type="datetimeFigureOut">
               <a:rPr lang="en-US" smtClean="0"/>
-              <a:t>11/12/2018</a:t>
+              <a:t>10/16/2016</a:t>
             </a:fld>
             <a:endParaRPr lang="en-US"/>
           </a:p>
@@ -2965,9 +2969,10 @@
           <a:lstStyle/>
           <a:p>
             <a:r>
-              <a:rPr lang="en-US"/>
+              <a:rPr lang="en-US" smtClean="0"/>
               <a:t>Click to edit Master title style</a:t>
             </a:r>
+            <a:endParaRPr lang="en-US"/>
           </a:p>
         </p:txBody>
       </p:sp>
@@ -2998,37 +3003,38 @@
           <a:p>
             <a:pPr lvl="0"/>
             <a:r>
-              <a:rPr lang="en-US"/>
+              <a:rPr lang="en-US" smtClean="0"/>
               <a:t>Click to edit Master text styles</a:t>
             </a:r>
           </a:p>
           <a:p>
             <a:pPr lvl="1"/>
             <a:r>
-              <a:rPr lang="en-US"/>
+              <a:rPr lang="en-US" smtClean="0"/>
               <a:t>Second level</a:t>
             </a:r>
           </a:p>
           <a:p>
             <a:pPr lvl="2"/>
             <a:r>
-              <a:rPr lang="en-US"/>
+              <a:rPr lang="en-US" smtClean="0"/>
               <a:t>Third level</a:t>
             </a:r>
           </a:p>
           <a:p>
             <a:pPr lvl="3"/>
             <a:r>
-              <a:rPr lang="en-US"/>
+              <a:rPr lang="en-US" smtClean="0"/>
               <a:t>Fourth level</a:t>
             </a:r>
           </a:p>
           <a:p>
             <a:pPr lvl="4"/>
             <a:r>
-              <a:rPr lang="en-US"/>
+              <a:rPr lang="en-US" smtClean="0"/>
               <a:t>Fifth level</a:t>
             </a:r>
+            <a:endParaRPr lang="en-US"/>
           </a:p>
         </p:txBody>
       </p:sp>
@@ -3067,7 +3073,7 @@
           <a:p>
             <a:fld id="{78C97017-6FC3-485B-9764-EAC9E56C1D49}" type="datetimeFigureOut">
               <a:rPr lang="en-US" smtClean="0"/>
-              <a:t>11/12/2018</a:t>
+              <a:t>10/16/2016</a:t>
             </a:fld>
             <a:endParaRPr lang="en-US"/>
           </a:p>
@@ -3540,7 +3546,7 @@
           <a:p>
             <a:pPr algn="ctr"/>
             <a:r>
-              <a:rPr lang="en-US" sz="1600" dirty="0">
+              <a:rPr lang="en-US" sz="1600" dirty="0" smtClean="0">
                 <a:solidFill>
                   <a:schemeClr val="bg1"/>
                 </a:solidFill>
@@ -3563,8 +3569,8 @@
         </p:nvSpPr>
         <p:spPr>
           <a:xfrm>
-            <a:off x="3412068" y="2743200"/>
-            <a:ext cx="1007517" cy="348700"/>
+            <a:off x="3412069" y="2191178"/>
+            <a:ext cx="1295400" cy="552022"/>
           </a:xfrm>
           <a:prstGeom prst="roundRect">
             <a:avLst/>
@@ -3599,7 +3605,7 @@
           <a:p>
             <a:pPr algn="ctr"/>
             <a:r>
-              <a:rPr lang="en-US" sz="1600" dirty="0">
+              <a:rPr lang="en-US" sz="1600" dirty="0" smtClean="0">
                 <a:solidFill>
                   <a:schemeClr val="bg1"/>
                 </a:solidFill>
@@ -3662,7 +3668,7 @@
           <a:p>
             <a:pPr algn="ctr"/>
             <a:r>
-              <a:rPr lang="en-US" sz="1600" dirty="0">
+              <a:rPr lang="en-US" sz="1600" dirty="0" smtClean="0">
                 <a:solidFill>
                   <a:schemeClr val="bg1"/>
                 </a:solidFill>
@@ -3685,8 +3691,8 @@
         </p:nvSpPr>
         <p:spPr>
           <a:xfrm>
-            <a:off x="3412069" y="3249050"/>
-            <a:ext cx="1007518" cy="332350"/>
+            <a:off x="3412069" y="3124200"/>
+            <a:ext cx="1295400" cy="723791"/>
           </a:xfrm>
           <a:prstGeom prst="roundRect">
             <a:avLst/>
@@ -3721,7 +3727,7 @@
           <a:p>
             <a:pPr algn="ctr"/>
             <a:r>
-              <a:rPr lang="en-US" sz="1600" dirty="0">
+              <a:rPr lang="en-US" sz="1600" dirty="0" smtClean="0">
                 <a:solidFill>
                   <a:schemeClr val="bg1"/>
                 </a:solidFill>
@@ -3803,14 +3809,14 @@
         <p:nvCxnSpPr>
           <p:cNvPr id="10" name="Straight Arrow Connector 9"/>
           <p:cNvCxnSpPr>
-            <a:cxnSpLocks/>
+            <a:endCxn id="3" idx="1"/>
           </p:cNvCxnSpPr>
           <p:nvPr/>
         </p:nvCxnSpPr>
         <p:spPr>
           <a:xfrm>
-            <a:off x="2133600" y="2926444"/>
-            <a:ext cx="1278468" cy="9603"/>
+            <a:off x="2573871" y="2467189"/>
+            <a:ext cx="838198" cy="0"/>
           </a:xfrm>
           <a:prstGeom prst="straightConnector1">
             <a:avLst/>
@@ -3840,15 +3846,13 @@
       <p:cxnSp>
         <p:nvCxnSpPr>
           <p:cNvPr id="12" name="Straight Arrow Connector 11"/>
-          <p:cNvCxnSpPr>
-            <a:cxnSpLocks/>
-          </p:cNvCxnSpPr>
+          <p:cNvCxnSpPr/>
           <p:nvPr/>
         </p:nvCxnSpPr>
         <p:spPr>
           <a:xfrm>
-            <a:off x="2514600" y="3415225"/>
-            <a:ext cx="897469" cy="0"/>
+            <a:off x="2569639" y="3276600"/>
+            <a:ext cx="838198" cy="0"/>
           </a:xfrm>
           <a:prstGeom prst="straightConnector1">
             <a:avLst/>
@@ -3879,7 +3883,6 @@
         <p:nvCxnSpPr>
           <p:cNvPr id="13" name="Straight Arrow Connector 12"/>
           <p:cNvCxnSpPr>
-            <a:cxnSpLocks/>
             <a:stCxn id="3" idx="2"/>
             <a:endCxn id="5" idx="0"/>
           </p:cNvCxnSpPr>
@@ -3887,8 +3890,8 @@
         </p:nvCxnSpPr>
         <p:spPr>
           <a:xfrm>
-            <a:off x="3915827" y="3091900"/>
-            <a:ext cx="1" cy="157150"/>
+            <a:off x="4059769" y="2743200"/>
+            <a:ext cx="0" cy="381000"/>
           </a:xfrm>
           <a:prstGeom prst="straightConnector1">
             <a:avLst/>
@@ -3918,22 +3921,16 @@
       <p:cxnSp>
         <p:nvCxnSpPr>
           <p:cNvPr id="16" name="Straight Arrow Connector 15"/>
-          <p:cNvCxnSpPr>
-            <a:cxnSpLocks/>
-            <a:stCxn id="3" idx="3"/>
-            <a:endCxn id="4" idx="1"/>
-          </p:cNvCxnSpPr>
+          <p:cNvCxnSpPr/>
           <p:nvPr/>
         </p:nvCxnSpPr>
         <p:spPr>
-          <a:xfrm flipV="1">
-            <a:off x="4419585" y="2467190"/>
-            <a:ext cx="745084" cy="450360"/>
-          </a:xfrm>
-          <a:prstGeom prst="bentConnector3">
-            <a:avLst>
-              <a:gd name="adj1" fmla="val 50000"/>
-            </a:avLst>
+          <a:xfrm>
+            <a:off x="4707469" y="2467189"/>
+            <a:ext cx="457200" cy="0"/>
+          </a:xfrm>
+          <a:prstGeom prst="straightConnector1">
+            <a:avLst/>
           </a:prstGeom>
           <a:ln w="28575">
             <a:solidFill>
@@ -4045,15 +4042,13 @@
       <p:cxnSp>
         <p:nvCxnSpPr>
           <p:cNvPr id="34" name="Straight Arrow Connector 33"/>
-          <p:cNvCxnSpPr>
-            <a:cxnSpLocks/>
-          </p:cNvCxnSpPr>
+          <p:cNvCxnSpPr/>
           <p:nvPr/>
         </p:nvCxnSpPr>
         <p:spPr>
           <a:xfrm flipV="1">
-            <a:off x="6612469" y="2467191"/>
-            <a:ext cx="1007531" cy="9309"/>
+            <a:off x="6680199" y="2467190"/>
+            <a:ext cx="939801" cy="1"/>
           </a:xfrm>
           <a:prstGeom prst="straightConnector1">
             <a:avLst/>
@@ -4318,7 +4313,7 @@
           <a:p>
             <a:pPr algn="ctr"/>
             <a:r>
-              <a:rPr lang="en-US" sz="1600" dirty="0">
+              <a:rPr lang="en-US" sz="1600" dirty="0" smtClean="0">
                 <a:solidFill>
                   <a:schemeClr val="bg1"/>
                 </a:solidFill>
@@ -4669,7 +4664,7 @@
           <a:p>
             <a:pPr algn="ctr"/>
             <a:r>
-              <a:rPr lang="en-US" sz="1600" dirty="0">
+              <a:rPr lang="en-US" sz="1600" dirty="0" smtClean="0">
                 <a:solidFill>
                   <a:schemeClr val="bg1"/>
                 </a:solidFill>
@@ -4677,20 +4672,25 @@
               <a:t>Logs</a:t>
             </a:r>
             <a:br>
-              <a:rPr lang="en-US" sz="1600" dirty="0">
+              <a:rPr lang="en-US" sz="1600" dirty="0" smtClean="0">
                 <a:solidFill>
                   <a:schemeClr val="bg1"/>
                 </a:solidFill>
               </a:rPr>
             </a:br>
             <a:r>
-              <a:rPr lang="en-US" sz="1600" dirty="0">
+              <a:rPr lang="en-US" sz="1600" dirty="0" smtClean="0">
                 <a:solidFill>
                   <a:schemeClr val="bg1"/>
                 </a:solidFill>
               </a:rPr>
               <a:t>Center</a:t>
             </a:r>
+            <a:endParaRPr lang="en-US" sz="1600" dirty="0">
+              <a:solidFill>
+                <a:schemeClr val="bg1"/>
+              </a:solidFill>
+            </a:endParaRPr>
           </a:p>
         </p:txBody>
       </p:sp>
@@ -4773,265 +4773,6 @@
           </a:fontRef>
         </p:style>
       </p:cxnSp>
-      <p:sp>
-        <p:nvSpPr>
-          <p:cNvPr id="69" name="Rectangle 45">
-            <a:extLst>
-              <a:ext uri="{FF2B5EF4-FFF2-40B4-BE49-F238E27FC236}">
-                <a16:creationId xmlns:a16="http://schemas.microsoft.com/office/drawing/2014/main" id="{1E2CC484-762F-4C65-BE84-598C93A7E90F}"/>
-              </a:ext>
-            </a:extLst>
-          </p:cNvPr>
-          <p:cNvSpPr/>
-          <p:nvPr/>
-        </p:nvSpPr>
-        <p:spPr>
-          <a:xfrm>
-            <a:off x="3412068" y="2208956"/>
-            <a:ext cx="1007518" cy="332350"/>
-          </a:xfrm>
-          <a:prstGeom prst="roundRect">
-            <a:avLst/>
-          </a:prstGeom>
-          <a:solidFill>
-            <a:srgbClr val="5D5F73"/>
-          </a:solidFill>
-          <a:ln w="19050">
-            <a:solidFill>
-              <a:srgbClr val="5D5F73"/>
-            </a:solidFill>
-          </a:ln>
-          <a:effectLst/>
-        </p:spPr>
-        <p:style>
-          <a:lnRef idx="1">
-            <a:schemeClr val="accent5"/>
-          </a:lnRef>
-          <a:fillRef idx="2">
-            <a:schemeClr val="accent5"/>
-          </a:fillRef>
-          <a:effectRef idx="1">
-            <a:schemeClr val="accent5"/>
-          </a:effectRef>
-          <a:fontRef idx="minor">
-            <a:schemeClr val="dk1"/>
-          </a:fontRef>
-        </p:style>
-        <p:txBody>
-          <a:bodyPr rtlCol="0" anchor="ctr"/>
-          <a:lstStyle/>
-          <a:p>
-            <a:pPr algn="ctr"/>
-            <a:r>
-              <a:rPr lang="en-US" sz="1600" dirty="0">
-                <a:solidFill>
-                  <a:schemeClr val="bg1"/>
-                </a:solidFill>
-              </a:rPr>
-              <a:t>Calendar</a:t>
-            </a:r>
-            <a:endParaRPr lang="en-SG" sz="1600" dirty="0">
-              <a:solidFill>
-                <a:schemeClr val="bg1"/>
-              </a:solidFill>
-            </a:endParaRPr>
-          </a:p>
-        </p:txBody>
-      </p:sp>
-      <p:cxnSp>
-        <p:nvCxnSpPr>
-          <p:cNvPr id="70" name="Straight Arrow Connector 69">
-            <a:extLst>
-              <a:ext uri="{FF2B5EF4-FFF2-40B4-BE49-F238E27FC236}">
-                <a16:creationId xmlns:a16="http://schemas.microsoft.com/office/drawing/2014/main" id="{790EAEFA-00E0-47C1-AC54-E87ACFF2861B}"/>
-              </a:ext>
-            </a:extLst>
-          </p:cNvPr>
-          <p:cNvCxnSpPr>
-            <a:cxnSpLocks/>
-          </p:cNvCxnSpPr>
-          <p:nvPr/>
-        </p:nvCxnSpPr>
-        <p:spPr>
-          <a:xfrm flipV="1">
-            <a:off x="2578100" y="2381907"/>
-            <a:ext cx="838197" cy="3546"/>
-          </a:xfrm>
-          <a:prstGeom prst="straightConnector1">
-            <a:avLst/>
-          </a:prstGeom>
-          <a:ln w="28575">
-            <a:solidFill>
-              <a:srgbClr val="00B050"/>
-            </a:solidFill>
-            <a:tailEnd type="arrow"/>
-          </a:ln>
-        </p:spPr>
-        <p:style>
-          <a:lnRef idx="1">
-            <a:schemeClr val="accent1"/>
-          </a:lnRef>
-          <a:fillRef idx="0">
-            <a:schemeClr val="accent1"/>
-          </a:fillRef>
-          <a:effectRef idx="0">
-            <a:schemeClr val="accent1"/>
-          </a:effectRef>
-          <a:fontRef idx="minor">
-            <a:schemeClr val="tx1"/>
-          </a:fontRef>
-        </p:style>
-      </p:cxnSp>
-      <p:cxnSp>
-        <p:nvCxnSpPr>
-          <p:cNvPr id="71" name="Straight Arrow Connector 70">
-            <a:extLst>
-              <a:ext uri="{FF2B5EF4-FFF2-40B4-BE49-F238E27FC236}">
-                <a16:creationId xmlns:a16="http://schemas.microsoft.com/office/drawing/2014/main" id="{80288C91-ED27-4A5E-9893-CDAEB8060682}"/>
-              </a:ext>
-            </a:extLst>
-          </p:cNvPr>
-          <p:cNvCxnSpPr>
-            <a:cxnSpLocks/>
-            <a:stCxn id="3" idx="0"/>
-            <a:endCxn id="69" idx="2"/>
-          </p:cNvCxnSpPr>
-          <p:nvPr/>
-        </p:nvCxnSpPr>
-        <p:spPr>
-          <a:xfrm flipV="1">
-            <a:off x="3915827" y="2541306"/>
-            <a:ext cx="0" cy="201894"/>
-          </a:xfrm>
-          <a:prstGeom prst="straightConnector1">
-            <a:avLst/>
-          </a:prstGeom>
-          <a:ln w="28575">
-            <a:solidFill>
-              <a:srgbClr val="0070C0"/>
-            </a:solidFill>
-            <a:tailEnd type="arrow"/>
-          </a:ln>
-        </p:spPr>
-        <p:style>
-          <a:lnRef idx="1">
-            <a:schemeClr val="accent1"/>
-          </a:lnRef>
-          <a:fillRef idx="0">
-            <a:schemeClr val="accent1"/>
-          </a:fillRef>
-          <a:effectRef idx="0">
-            <a:schemeClr val="accent1"/>
-          </a:effectRef>
-          <a:fontRef idx="minor">
-            <a:schemeClr val="tx1"/>
-          </a:fontRef>
-        </p:style>
-      </p:cxnSp>
-      <p:cxnSp>
-        <p:nvCxnSpPr>
-          <p:cNvPr id="76" name="Elbow Connector 51">
-            <a:extLst>
-              <a:ext uri="{FF2B5EF4-FFF2-40B4-BE49-F238E27FC236}">
-                <a16:creationId xmlns:a16="http://schemas.microsoft.com/office/drawing/2014/main" id="{F5A0B626-20C2-4919-8DA2-8F53F9693B2F}"/>
-              </a:ext>
-            </a:extLst>
-          </p:cNvPr>
-          <p:cNvCxnSpPr/>
-          <p:nvPr/>
-        </p:nvCxnSpPr>
-        <p:spPr>
-          <a:xfrm rot="5400000" flipH="1" flipV="1">
-            <a:off x="3869405" y="1768730"/>
-            <a:ext cx="476678" cy="383835"/>
-          </a:xfrm>
-          <a:prstGeom prst="bentConnector2">
-            <a:avLst/>
-          </a:prstGeom>
-          <a:ln w="28575">
-            <a:solidFill>
-              <a:srgbClr val="5D5F73"/>
-            </a:solidFill>
-            <a:prstDash val="sysDot"/>
-            <a:tailEnd type="arrow"/>
-          </a:ln>
-        </p:spPr>
-        <p:style>
-          <a:lnRef idx="1">
-            <a:schemeClr val="accent1"/>
-          </a:lnRef>
-          <a:fillRef idx="0">
-            <a:schemeClr val="accent1"/>
-          </a:fillRef>
-          <a:effectRef idx="0">
-            <a:schemeClr val="accent1"/>
-          </a:effectRef>
-          <a:fontRef idx="minor">
-            <a:schemeClr val="tx1"/>
-          </a:fontRef>
-        </p:style>
-      </p:cxnSp>
-      <p:sp>
-        <p:nvSpPr>
-          <p:cNvPr id="77" name="Cloud 76">
-            <a:extLst>
-              <a:ext uri="{FF2B5EF4-FFF2-40B4-BE49-F238E27FC236}">
-                <a16:creationId xmlns:a16="http://schemas.microsoft.com/office/drawing/2014/main" id="{B8A54718-6189-41DD-91AF-35B8F3642289}"/>
-              </a:ext>
-            </a:extLst>
-          </p:cNvPr>
-          <p:cNvSpPr/>
-          <p:nvPr/>
-        </p:nvSpPr>
-        <p:spPr>
-          <a:xfrm>
-            <a:off x="4274256" y="1115983"/>
-            <a:ext cx="1974143" cy="852619"/>
-          </a:xfrm>
-          <a:prstGeom prst="cloud">
-            <a:avLst/>
-          </a:prstGeom>
-          <a:solidFill>
-            <a:schemeClr val="bg1"/>
-          </a:solidFill>
-          <a:ln>
-            <a:solidFill>
-              <a:schemeClr val="tx1"/>
-            </a:solidFill>
-          </a:ln>
-        </p:spPr>
-        <p:style>
-          <a:lnRef idx="2">
-            <a:schemeClr val="accent1">
-              <a:shade val="50000"/>
-            </a:schemeClr>
-          </a:lnRef>
-          <a:fillRef idx="1">
-            <a:schemeClr val="accent1"/>
-          </a:fillRef>
-          <a:effectRef idx="0">
-            <a:schemeClr val="accent1"/>
-          </a:effectRef>
-          <a:fontRef idx="minor">
-            <a:schemeClr val="lt1"/>
-          </a:fontRef>
-        </p:style>
-        <p:txBody>
-          <a:bodyPr rtlCol="0" anchor="ctr"/>
-          <a:lstStyle/>
-          <a:p>
-            <a:pPr algn="ctr"/>
-            <a:r>
-              <a:rPr lang="en-US" sz="1400" dirty="0">
-                <a:solidFill>
-                  <a:schemeClr val="tx1"/>
-                </a:solidFill>
-              </a:rPr>
-              <a:t>Google Calendar</a:t>
-            </a:r>
-          </a:p>
-        </p:txBody>
-      </p:sp>
     </p:spTree>
     <p:extLst>
       <p:ext uri="{BB962C8B-B14F-4D97-AF65-F5344CB8AC3E}">

</xml_diff>

<commit_message>
Edit developer guide again
</commit_message>
<xml_diff>
--- a/docs/diagrams/ArchitectureDiagram.pptx
+++ b/docs/diagrams/ArchitectureDiagram.pptx
@@ -107,6 +107,22 @@
       </a:defRPr>
     </a:lvl9pPr>
   </p:defaultTextStyle>
+  <p:extLst>
+    <p:ext uri="{EFAFB233-063F-42B5-8137-9DF3F51BA10A}">
+      <p15:sldGuideLst xmlns:p15="http://schemas.microsoft.com/office/powerpoint/2012/main">
+        <p15:guide id="1" orient="horz" pos="1488">
+          <p15:clr>
+            <a:srgbClr val="A4A3A4"/>
+          </p15:clr>
+        </p15:guide>
+        <p15:guide id="2" pos="2880">
+          <p15:clr>
+            <a:srgbClr val="A4A3A4"/>
+          </p15:clr>
+        </p15:guide>
+      </p15:sldGuideLst>
+    </p:ext>
+  </p:extLst>
 </p:presentation>
 </file>
 
@@ -192,7 +208,7 @@
           <a:p>
             <a:fld id="{F5CC4B3F-88C1-4FFA-B1B6-F41C21DC6924}" type="datetimeFigureOut">
               <a:rPr lang="en-US" smtClean="0"/>
-              <a:t>10/16/2016</a:t>
+              <a:t>11/12/2018</a:t>
             </a:fld>
             <a:endParaRPr lang="en-US"/>
           </a:p>
@@ -256,38 +272,37 @@
           <a:p>
             <a:pPr lvl="0"/>
             <a:r>
-              <a:rPr lang="en-US" smtClean="0"/>
+              <a:rPr lang="en-US"/>
               <a:t>Click to edit Master text styles</a:t>
             </a:r>
           </a:p>
           <a:p>
             <a:pPr lvl="1"/>
             <a:r>
-              <a:rPr lang="en-US" smtClean="0"/>
+              <a:rPr lang="en-US"/>
               <a:t>Second level</a:t>
             </a:r>
           </a:p>
           <a:p>
             <a:pPr lvl="2"/>
             <a:r>
-              <a:rPr lang="en-US" smtClean="0"/>
+              <a:rPr lang="en-US"/>
               <a:t>Third level</a:t>
             </a:r>
           </a:p>
           <a:p>
             <a:pPr lvl="3"/>
             <a:r>
-              <a:rPr lang="en-US" smtClean="0"/>
+              <a:rPr lang="en-US"/>
               <a:t>Fourth level</a:t>
             </a:r>
           </a:p>
           <a:p>
             <a:pPr lvl="4"/>
             <a:r>
-              <a:rPr lang="en-US" smtClean="0"/>
+              <a:rPr lang="en-US"/>
               <a:t>Fifth level</a:t>
             </a:r>
-            <a:endParaRPr lang="en-US"/>
           </a:p>
         </p:txBody>
       </p:sp>
@@ -498,10 +513,9 @@
           <a:lstStyle/>
           <a:p>
             <a:r>
-              <a:rPr lang="en-US" smtClean="0"/>
+              <a:rPr lang="en-US"/>
               <a:t>Click to edit Master title style</a:t>
             </a:r>
-            <a:endParaRPr lang="en-US"/>
           </a:p>
         </p:txBody>
       </p:sp>
@@ -617,10 +631,9 @@
           </a:lstStyle>
           <a:p>
             <a:r>
-              <a:rPr lang="en-US" smtClean="0"/>
+              <a:rPr lang="en-US"/>
               <a:t>Click to edit Master subtitle style</a:t>
             </a:r>
-            <a:endParaRPr lang="en-US"/>
           </a:p>
         </p:txBody>
       </p:sp>
@@ -641,7 +654,7 @@
           <a:p>
             <a:fld id="{78C97017-6FC3-485B-9764-EAC9E56C1D49}" type="datetimeFigureOut">
               <a:rPr lang="en-US" smtClean="0"/>
-              <a:t>10/16/2016</a:t>
+              <a:t>11/12/2018</a:t>
             </a:fld>
             <a:endParaRPr lang="en-US"/>
           </a:p>
@@ -735,10 +748,9 @@
           <a:lstStyle/>
           <a:p>
             <a:r>
-              <a:rPr lang="en-US" smtClean="0"/>
+              <a:rPr lang="en-US"/>
               <a:t>Click to edit Master title style</a:t>
             </a:r>
-            <a:endParaRPr lang="en-US"/>
           </a:p>
         </p:txBody>
       </p:sp>
@@ -759,38 +771,37 @@
           <a:p>
             <a:pPr lvl="0"/>
             <a:r>
-              <a:rPr lang="en-US" smtClean="0"/>
+              <a:rPr lang="en-US"/>
               <a:t>Click to edit Master text styles</a:t>
             </a:r>
           </a:p>
           <a:p>
             <a:pPr lvl="1"/>
             <a:r>
-              <a:rPr lang="en-US" smtClean="0"/>
+              <a:rPr lang="en-US"/>
               <a:t>Second level</a:t>
             </a:r>
           </a:p>
           <a:p>
             <a:pPr lvl="2"/>
             <a:r>
-              <a:rPr lang="en-US" smtClean="0"/>
+              <a:rPr lang="en-US"/>
               <a:t>Third level</a:t>
             </a:r>
           </a:p>
           <a:p>
             <a:pPr lvl="3"/>
             <a:r>
-              <a:rPr lang="en-US" smtClean="0"/>
+              <a:rPr lang="en-US"/>
               <a:t>Fourth level</a:t>
             </a:r>
           </a:p>
           <a:p>
             <a:pPr lvl="4"/>
             <a:r>
-              <a:rPr lang="en-US" smtClean="0"/>
+              <a:rPr lang="en-US"/>
               <a:t>Fifth level</a:t>
             </a:r>
-            <a:endParaRPr lang="en-US"/>
           </a:p>
         </p:txBody>
       </p:sp>
@@ -811,7 +822,7 @@
           <a:p>
             <a:fld id="{78C97017-6FC3-485B-9764-EAC9E56C1D49}" type="datetimeFigureOut">
               <a:rPr lang="en-US" smtClean="0"/>
-              <a:t>10/16/2016</a:t>
+              <a:t>11/12/2018</a:t>
             </a:fld>
             <a:endParaRPr lang="en-US"/>
           </a:p>
@@ -910,10 +921,9 @@
           <a:lstStyle/>
           <a:p>
             <a:r>
-              <a:rPr lang="en-US" smtClean="0"/>
+              <a:rPr lang="en-US"/>
               <a:t>Click to edit Master title style</a:t>
             </a:r>
-            <a:endParaRPr lang="en-US"/>
           </a:p>
         </p:txBody>
       </p:sp>
@@ -939,38 +949,37 @@
           <a:p>
             <a:pPr lvl="0"/>
             <a:r>
-              <a:rPr lang="en-US" smtClean="0"/>
+              <a:rPr lang="en-US"/>
               <a:t>Click to edit Master text styles</a:t>
             </a:r>
           </a:p>
           <a:p>
             <a:pPr lvl="1"/>
             <a:r>
-              <a:rPr lang="en-US" smtClean="0"/>
+              <a:rPr lang="en-US"/>
               <a:t>Second level</a:t>
             </a:r>
           </a:p>
           <a:p>
             <a:pPr lvl="2"/>
             <a:r>
-              <a:rPr lang="en-US" smtClean="0"/>
+              <a:rPr lang="en-US"/>
               <a:t>Third level</a:t>
             </a:r>
           </a:p>
           <a:p>
             <a:pPr lvl="3"/>
             <a:r>
-              <a:rPr lang="en-US" smtClean="0"/>
+              <a:rPr lang="en-US"/>
               <a:t>Fourth level</a:t>
             </a:r>
           </a:p>
           <a:p>
             <a:pPr lvl="4"/>
             <a:r>
-              <a:rPr lang="en-US" smtClean="0"/>
+              <a:rPr lang="en-US"/>
               <a:t>Fifth level</a:t>
             </a:r>
-            <a:endParaRPr lang="en-US"/>
           </a:p>
         </p:txBody>
       </p:sp>
@@ -991,7 +1000,7 @@
           <a:p>
             <a:fld id="{78C97017-6FC3-485B-9764-EAC9E56C1D49}" type="datetimeFigureOut">
               <a:rPr lang="en-US" smtClean="0"/>
-              <a:t>10/16/2016</a:t>
+              <a:t>11/12/2018</a:t>
             </a:fld>
             <a:endParaRPr lang="en-US"/>
           </a:p>
@@ -1085,10 +1094,9 @@
           <a:lstStyle/>
           <a:p>
             <a:r>
-              <a:rPr lang="en-US" smtClean="0"/>
+              <a:rPr lang="en-US"/>
               <a:t>Click to edit Master title style</a:t>
             </a:r>
-            <a:endParaRPr lang="en-US"/>
           </a:p>
         </p:txBody>
       </p:sp>
@@ -1109,38 +1117,37 @@
           <a:p>
             <a:pPr lvl="0"/>
             <a:r>
-              <a:rPr lang="en-US" smtClean="0"/>
+              <a:rPr lang="en-US"/>
               <a:t>Click to edit Master text styles</a:t>
             </a:r>
           </a:p>
           <a:p>
             <a:pPr lvl="1"/>
             <a:r>
-              <a:rPr lang="en-US" smtClean="0"/>
+              <a:rPr lang="en-US"/>
               <a:t>Second level</a:t>
             </a:r>
           </a:p>
           <a:p>
             <a:pPr lvl="2"/>
             <a:r>
-              <a:rPr lang="en-US" smtClean="0"/>
+              <a:rPr lang="en-US"/>
               <a:t>Third level</a:t>
             </a:r>
           </a:p>
           <a:p>
             <a:pPr lvl="3"/>
             <a:r>
-              <a:rPr lang="en-US" smtClean="0"/>
+              <a:rPr lang="en-US"/>
               <a:t>Fourth level</a:t>
             </a:r>
           </a:p>
           <a:p>
             <a:pPr lvl="4"/>
             <a:r>
-              <a:rPr lang="en-US" smtClean="0"/>
+              <a:rPr lang="en-US"/>
               <a:t>Fifth level</a:t>
             </a:r>
-            <a:endParaRPr lang="en-US"/>
           </a:p>
         </p:txBody>
       </p:sp>
@@ -1161,7 +1168,7 @@
           <a:p>
             <a:fld id="{78C97017-6FC3-485B-9764-EAC9E56C1D49}" type="datetimeFigureOut">
               <a:rPr lang="en-US" smtClean="0"/>
-              <a:t>10/16/2016</a:t>
+              <a:t>11/12/2018</a:t>
             </a:fld>
             <a:endParaRPr lang="en-US"/>
           </a:p>
@@ -1264,10 +1271,9 @@
           </a:lstStyle>
           <a:p>
             <a:r>
-              <a:rPr lang="en-US" smtClean="0"/>
+              <a:rPr lang="en-US"/>
               <a:t>Click to edit Master title style</a:t>
             </a:r>
-            <a:endParaRPr lang="en-US"/>
           </a:p>
         </p:txBody>
       </p:sp>
@@ -1384,7 +1390,7 @@
           <a:p>
             <a:pPr lvl="0"/>
             <a:r>
-              <a:rPr lang="en-US" smtClean="0"/>
+              <a:rPr lang="en-US"/>
               <a:t>Click to edit Master text styles</a:t>
             </a:r>
           </a:p>
@@ -1407,7 +1413,7 @@
           <a:p>
             <a:fld id="{78C97017-6FC3-485B-9764-EAC9E56C1D49}" type="datetimeFigureOut">
               <a:rPr lang="en-US" smtClean="0"/>
-              <a:t>10/16/2016</a:t>
+              <a:t>11/12/2018</a:t>
             </a:fld>
             <a:endParaRPr lang="en-US"/>
           </a:p>
@@ -1501,10 +1507,9 @@
           <a:lstStyle/>
           <a:p>
             <a:r>
-              <a:rPr lang="en-US" smtClean="0"/>
+              <a:rPr lang="en-US"/>
               <a:t>Click to edit Master title style</a:t>
             </a:r>
-            <a:endParaRPr lang="en-US"/>
           </a:p>
         </p:txBody>
       </p:sp>
@@ -1558,38 +1563,37 @@
           <a:p>
             <a:pPr lvl="0"/>
             <a:r>
-              <a:rPr lang="en-US" smtClean="0"/>
+              <a:rPr lang="en-US"/>
               <a:t>Click to edit Master text styles</a:t>
             </a:r>
           </a:p>
           <a:p>
             <a:pPr lvl="1"/>
             <a:r>
-              <a:rPr lang="en-US" smtClean="0"/>
+              <a:rPr lang="en-US"/>
               <a:t>Second level</a:t>
             </a:r>
           </a:p>
           <a:p>
             <a:pPr lvl="2"/>
             <a:r>
-              <a:rPr lang="en-US" smtClean="0"/>
+              <a:rPr lang="en-US"/>
               <a:t>Third level</a:t>
             </a:r>
           </a:p>
           <a:p>
             <a:pPr lvl="3"/>
             <a:r>
-              <a:rPr lang="en-US" smtClean="0"/>
+              <a:rPr lang="en-US"/>
               <a:t>Fourth level</a:t>
             </a:r>
           </a:p>
           <a:p>
             <a:pPr lvl="4"/>
             <a:r>
-              <a:rPr lang="en-US" smtClean="0"/>
+              <a:rPr lang="en-US"/>
               <a:t>Fifth level</a:t>
             </a:r>
-            <a:endParaRPr lang="en-US"/>
           </a:p>
         </p:txBody>
       </p:sp>
@@ -1643,38 +1647,37 @@
           <a:p>
             <a:pPr lvl="0"/>
             <a:r>
-              <a:rPr lang="en-US" smtClean="0"/>
+              <a:rPr lang="en-US"/>
               <a:t>Click to edit Master text styles</a:t>
             </a:r>
           </a:p>
           <a:p>
             <a:pPr lvl="1"/>
             <a:r>
-              <a:rPr lang="en-US" smtClean="0"/>
+              <a:rPr lang="en-US"/>
               <a:t>Second level</a:t>
             </a:r>
           </a:p>
           <a:p>
             <a:pPr lvl="2"/>
             <a:r>
-              <a:rPr lang="en-US" smtClean="0"/>
+              <a:rPr lang="en-US"/>
               <a:t>Third level</a:t>
             </a:r>
           </a:p>
           <a:p>
             <a:pPr lvl="3"/>
             <a:r>
-              <a:rPr lang="en-US" smtClean="0"/>
+              <a:rPr lang="en-US"/>
               <a:t>Fourth level</a:t>
             </a:r>
           </a:p>
           <a:p>
             <a:pPr lvl="4"/>
             <a:r>
-              <a:rPr lang="en-US" smtClean="0"/>
+              <a:rPr lang="en-US"/>
               <a:t>Fifth level</a:t>
             </a:r>
-            <a:endParaRPr lang="en-US"/>
           </a:p>
         </p:txBody>
       </p:sp>
@@ -1695,7 +1698,7 @@
           <a:p>
             <a:fld id="{78C97017-6FC3-485B-9764-EAC9E56C1D49}" type="datetimeFigureOut">
               <a:rPr lang="en-US" smtClean="0"/>
-              <a:t>10/16/2016</a:t>
+              <a:t>11/12/2018</a:t>
             </a:fld>
             <a:endParaRPr lang="en-US"/>
           </a:p>
@@ -1793,10 +1796,9 @@
           </a:lstStyle>
           <a:p>
             <a:r>
-              <a:rPr lang="en-US" smtClean="0"/>
+              <a:rPr lang="en-US"/>
               <a:t>Click to edit Master title style</a:t>
             </a:r>
-            <a:endParaRPr lang="en-US"/>
           </a:p>
         </p:txBody>
       </p:sp>
@@ -1859,7 +1861,7 @@
           <a:p>
             <a:pPr lvl="0"/>
             <a:r>
-              <a:rPr lang="en-US" smtClean="0"/>
+              <a:rPr lang="en-US"/>
               <a:t>Click to edit Master text styles</a:t>
             </a:r>
           </a:p>
@@ -1915,38 +1917,37 @@
           <a:p>
             <a:pPr lvl="0"/>
             <a:r>
-              <a:rPr lang="en-US" smtClean="0"/>
+              <a:rPr lang="en-US"/>
               <a:t>Click to edit Master text styles</a:t>
             </a:r>
           </a:p>
           <a:p>
             <a:pPr lvl="1"/>
             <a:r>
-              <a:rPr lang="en-US" smtClean="0"/>
+              <a:rPr lang="en-US"/>
               <a:t>Second level</a:t>
             </a:r>
           </a:p>
           <a:p>
             <a:pPr lvl="2"/>
             <a:r>
-              <a:rPr lang="en-US" smtClean="0"/>
+              <a:rPr lang="en-US"/>
               <a:t>Third level</a:t>
             </a:r>
           </a:p>
           <a:p>
             <a:pPr lvl="3"/>
             <a:r>
-              <a:rPr lang="en-US" smtClean="0"/>
+              <a:rPr lang="en-US"/>
               <a:t>Fourth level</a:t>
             </a:r>
           </a:p>
           <a:p>
             <a:pPr lvl="4"/>
             <a:r>
-              <a:rPr lang="en-US" smtClean="0"/>
+              <a:rPr lang="en-US"/>
               <a:t>Fifth level</a:t>
             </a:r>
-            <a:endParaRPr lang="en-US"/>
           </a:p>
         </p:txBody>
       </p:sp>
@@ -2009,7 +2010,7 @@
           <a:p>
             <a:pPr lvl="0"/>
             <a:r>
-              <a:rPr lang="en-US" smtClean="0"/>
+              <a:rPr lang="en-US"/>
               <a:t>Click to edit Master text styles</a:t>
             </a:r>
           </a:p>
@@ -2065,38 +2066,37 @@
           <a:p>
             <a:pPr lvl="0"/>
             <a:r>
-              <a:rPr lang="en-US" smtClean="0"/>
+              <a:rPr lang="en-US"/>
               <a:t>Click to edit Master text styles</a:t>
             </a:r>
           </a:p>
           <a:p>
             <a:pPr lvl="1"/>
             <a:r>
-              <a:rPr lang="en-US" smtClean="0"/>
+              <a:rPr lang="en-US"/>
               <a:t>Second level</a:t>
             </a:r>
           </a:p>
           <a:p>
             <a:pPr lvl="2"/>
             <a:r>
-              <a:rPr lang="en-US" smtClean="0"/>
+              <a:rPr lang="en-US"/>
               <a:t>Third level</a:t>
             </a:r>
           </a:p>
           <a:p>
             <a:pPr lvl="3"/>
             <a:r>
-              <a:rPr lang="en-US" smtClean="0"/>
+              <a:rPr lang="en-US"/>
               <a:t>Fourth level</a:t>
             </a:r>
           </a:p>
           <a:p>
             <a:pPr lvl="4"/>
             <a:r>
-              <a:rPr lang="en-US" smtClean="0"/>
+              <a:rPr lang="en-US"/>
               <a:t>Fifth level</a:t>
             </a:r>
-            <a:endParaRPr lang="en-US"/>
           </a:p>
         </p:txBody>
       </p:sp>
@@ -2117,7 +2117,7 @@
           <a:p>
             <a:fld id="{78C97017-6FC3-485B-9764-EAC9E56C1D49}" type="datetimeFigureOut">
               <a:rPr lang="en-US" smtClean="0"/>
-              <a:t>10/16/2016</a:t>
+              <a:t>11/12/2018</a:t>
             </a:fld>
             <a:endParaRPr lang="en-US"/>
           </a:p>
@@ -2211,10 +2211,9 @@
           <a:lstStyle/>
           <a:p>
             <a:r>
-              <a:rPr lang="en-US" smtClean="0"/>
+              <a:rPr lang="en-US"/>
               <a:t>Click to edit Master title style</a:t>
             </a:r>
-            <a:endParaRPr lang="en-US"/>
           </a:p>
         </p:txBody>
       </p:sp>
@@ -2235,7 +2234,7 @@
           <a:p>
             <a:fld id="{78C97017-6FC3-485B-9764-EAC9E56C1D49}" type="datetimeFigureOut">
               <a:rPr lang="en-US" smtClean="0"/>
-              <a:t>10/16/2016</a:t>
+              <a:t>11/12/2018</a:t>
             </a:fld>
             <a:endParaRPr lang="en-US"/>
           </a:p>
@@ -2330,7 +2329,7 @@
           <a:p>
             <a:fld id="{78C97017-6FC3-485B-9764-EAC9E56C1D49}" type="datetimeFigureOut">
               <a:rPr lang="en-US" smtClean="0"/>
-              <a:t>10/16/2016</a:t>
+              <a:t>11/12/2018</a:t>
             </a:fld>
             <a:endParaRPr lang="en-US"/>
           </a:p>
@@ -2433,10 +2432,9 @@
           </a:lstStyle>
           <a:p>
             <a:r>
-              <a:rPr lang="en-US" smtClean="0"/>
+              <a:rPr lang="en-US"/>
               <a:t>Click to edit Master title style</a:t>
             </a:r>
-            <a:endParaRPr lang="en-US"/>
           </a:p>
         </p:txBody>
       </p:sp>
@@ -2490,38 +2488,37 @@
           <a:p>
             <a:pPr lvl="0"/>
             <a:r>
-              <a:rPr lang="en-US" smtClean="0"/>
+              <a:rPr lang="en-US"/>
               <a:t>Click to edit Master text styles</a:t>
             </a:r>
           </a:p>
           <a:p>
             <a:pPr lvl="1"/>
             <a:r>
-              <a:rPr lang="en-US" smtClean="0"/>
+              <a:rPr lang="en-US"/>
               <a:t>Second level</a:t>
             </a:r>
           </a:p>
           <a:p>
             <a:pPr lvl="2"/>
             <a:r>
-              <a:rPr lang="en-US" smtClean="0"/>
+              <a:rPr lang="en-US"/>
               <a:t>Third level</a:t>
             </a:r>
           </a:p>
           <a:p>
             <a:pPr lvl="3"/>
             <a:r>
-              <a:rPr lang="en-US" smtClean="0"/>
+              <a:rPr lang="en-US"/>
               <a:t>Fourth level</a:t>
             </a:r>
           </a:p>
           <a:p>
             <a:pPr lvl="4"/>
             <a:r>
-              <a:rPr lang="en-US" smtClean="0"/>
+              <a:rPr lang="en-US"/>
               <a:t>Fifth level</a:t>
             </a:r>
-            <a:endParaRPr lang="en-US"/>
           </a:p>
         </p:txBody>
       </p:sp>
@@ -2584,7 +2581,7 @@
           <a:p>
             <a:pPr lvl="0"/>
             <a:r>
-              <a:rPr lang="en-US" smtClean="0"/>
+              <a:rPr lang="en-US"/>
               <a:t>Click to edit Master text styles</a:t>
             </a:r>
           </a:p>
@@ -2607,7 +2604,7 @@
           <a:p>
             <a:fld id="{78C97017-6FC3-485B-9764-EAC9E56C1D49}" type="datetimeFigureOut">
               <a:rPr lang="en-US" smtClean="0"/>
-              <a:t>10/16/2016</a:t>
+              <a:t>11/12/2018</a:t>
             </a:fld>
             <a:endParaRPr lang="en-US"/>
           </a:p>
@@ -2710,10 +2707,9 @@
           </a:lstStyle>
           <a:p>
             <a:r>
-              <a:rPr lang="en-US" smtClean="0"/>
+              <a:rPr lang="en-US"/>
               <a:t>Click to edit Master title style</a:t>
             </a:r>
-            <a:endParaRPr lang="en-US"/>
           </a:p>
         </p:txBody>
       </p:sp>
@@ -2837,7 +2833,7 @@
           <a:p>
             <a:pPr lvl="0"/>
             <a:r>
-              <a:rPr lang="en-US" smtClean="0"/>
+              <a:rPr lang="en-US"/>
               <a:t>Click to edit Master text styles</a:t>
             </a:r>
           </a:p>
@@ -2860,7 +2856,7 @@
           <a:p>
             <a:fld id="{78C97017-6FC3-485B-9764-EAC9E56C1D49}" type="datetimeFigureOut">
               <a:rPr lang="en-US" smtClean="0"/>
-              <a:t>10/16/2016</a:t>
+              <a:t>11/12/2018</a:t>
             </a:fld>
             <a:endParaRPr lang="en-US"/>
           </a:p>
@@ -2969,10 +2965,9 @@
           <a:lstStyle/>
           <a:p>
             <a:r>
-              <a:rPr lang="en-US" smtClean="0"/>
+              <a:rPr lang="en-US"/>
               <a:t>Click to edit Master title style</a:t>
             </a:r>
-            <a:endParaRPr lang="en-US"/>
           </a:p>
         </p:txBody>
       </p:sp>
@@ -3003,38 +2998,37 @@
           <a:p>
             <a:pPr lvl="0"/>
             <a:r>
-              <a:rPr lang="en-US" smtClean="0"/>
+              <a:rPr lang="en-US"/>
               <a:t>Click to edit Master text styles</a:t>
             </a:r>
           </a:p>
           <a:p>
             <a:pPr lvl="1"/>
             <a:r>
-              <a:rPr lang="en-US" smtClean="0"/>
+              <a:rPr lang="en-US"/>
               <a:t>Second level</a:t>
             </a:r>
           </a:p>
           <a:p>
             <a:pPr lvl="2"/>
             <a:r>
-              <a:rPr lang="en-US" smtClean="0"/>
+              <a:rPr lang="en-US"/>
               <a:t>Third level</a:t>
             </a:r>
           </a:p>
           <a:p>
             <a:pPr lvl="3"/>
             <a:r>
-              <a:rPr lang="en-US" smtClean="0"/>
+              <a:rPr lang="en-US"/>
               <a:t>Fourth level</a:t>
             </a:r>
           </a:p>
           <a:p>
             <a:pPr lvl="4"/>
             <a:r>
-              <a:rPr lang="en-US" smtClean="0"/>
+              <a:rPr lang="en-US"/>
               <a:t>Fifth level</a:t>
             </a:r>
-            <a:endParaRPr lang="en-US"/>
           </a:p>
         </p:txBody>
       </p:sp>
@@ -3073,7 +3067,7 @@
           <a:p>
             <a:fld id="{78C97017-6FC3-485B-9764-EAC9E56C1D49}" type="datetimeFigureOut">
               <a:rPr lang="en-US" smtClean="0"/>
-              <a:t>10/16/2016</a:t>
+              <a:t>11/12/2018</a:t>
             </a:fld>
             <a:endParaRPr lang="en-US"/>
           </a:p>
@@ -3546,7 +3540,7 @@
           <a:p>
             <a:pPr algn="ctr"/>
             <a:r>
-              <a:rPr lang="en-US" sz="1600" dirty="0" smtClean="0">
+              <a:rPr lang="en-US" sz="1600" dirty="0">
                 <a:solidFill>
                   <a:schemeClr val="bg1"/>
                 </a:solidFill>
@@ -3569,8 +3563,8 @@
         </p:nvSpPr>
         <p:spPr>
           <a:xfrm>
-            <a:off x="3412069" y="2191178"/>
-            <a:ext cx="1295400" cy="552022"/>
+            <a:off x="3412069" y="2667000"/>
+            <a:ext cx="1295400" cy="257523"/>
           </a:xfrm>
           <a:prstGeom prst="roundRect">
             <a:avLst/>
@@ -3605,7 +3599,7 @@
           <a:p>
             <a:pPr algn="ctr"/>
             <a:r>
-              <a:rPr lang="en-US" sz="1600" dirty="0" smtClean="0">
+              <a:rPr lang="en-US" sz="1600" dirty="0">
                 <a:solidFill>
                   <a:schemeClr val="bg1"/>
                 </a:solidFill>
@@ -3668,7 +3662,7 @@
           <a:p>
             <a:pPr algn="ctr"/>
             <a:r>
-              <a:rPr lang="en-US" sz="1600" dirty="0" smtClean="0">
+              <a:rPr lang="en-US" sz="1600" dirty="0">
                 <a:solidFill>
                   <a:schemeClr val="bg1"/>
                 </a:solidFill>
@@ -3691,8 +3685,8 @@
         </p:nvSpPr>
         <p:spPr>
           <a:xfrm>
-            <a:off x="3412069" y="3124200"/>
-            <a:ext cx="1295400" cy="723791"/>
+            <a:off x="3412069" y="3181559"/>
+            <a:ext cx="1295400" cy="247179"/>
           </a:xfrm>
           <a:prstGeom prst="roundRect">
             <a:avLst/>
@@ -3727,7 +3721,7 @@
           <a:p>
             <a:pPr algn="ctr"/>
             <a:r>
-              <a:rPr lang="en-US" sz="1600" dirty="0" smtClean="0">
+              <a:rPr lang="en-US" sz="1600" dirty="0">
                 <a:solidFill>
                   <a:schemeClr val="bg1"/>
                 </a:solidFill>
@@ -3809,14 +3803,15 @@
         <p:nvCxnSpPr>
           <p:cNvPr id="10" name="Straight Arrow Connector 9"/>
           <p:cNvCxnSpPr>
+            <a:cxnSpLocks/>
             <a:endCxn id="3" idx="1"/>
           </p:cNvCxnSpPr>
           <p:nvPr/>
         </p:nvCxnSpPr>
         <p:spPr>
           <a:xfrm>
-            <a:off x="2573871" y="2467189"/>
-            <a:ext cx="838198" cy="0"/>
+            <a:off x="2573871" y="2795761"/>
+            <a:ext cx="838198" cy="1"/>
           </a:xfrm>
           <a:prstGeom prst="straightConnector1">
             <a:avLst/>
@@ -3883,6 +3878,7 @@
         <p:nvCxnSpPr>
           <p:cNvPr id="13" name="Straight Arrow Connector 12"/>
           <p:cNvCxnSpPr>
+            <a:cxnSpLocks/>
             <a:stCxn id="3" idx="2"/>
             <a:endCxn id="5" idx="0"/>
           </p:cNvCxnSpPr>
@@ -3890,8 +3886,8 @@
         </p:nvCxnSpPr>
         <p:spPr>
           <a:xfrm>
-            <a:off x="4059769" y="2743200"/>
-            <a:ext cx="0" cy="381000"/>
+            <a:off x="4059769" y="2924523"/>
+            <a:ext cx="0" cy="257036"/>
           </a:xfrm>
           <a:prstGeom prst="straightConnector1">
             <a:avLst/>
@@ -3921,16 +3917,21 @@
       <p:cxnSp>
         <p:nvCxnSpPr>
           <p:cNvPr id="16" name="Straight Arrow Connector 15"/>
-          <p:cNvCxnSpPr/>
+          <p:cNvCxnSpPr>
+            <a:cxnSpLocks/>
+            <a:stCxn id="3" idx="3"/>
+          </p:cNvCxnSpPr>
           <p:nvPr/>
         </p:nvCxnSpPr>
         <p:spPr>
-          <a:xfrm>
-            <a:off x="4707469" y="2467189"/>
-            <a:ext cx="457200" cy="0"/>
-          </a:xfrm>
-          <a:prstGeom prst="straightConnector1">
-            <a:avLst/>
+          <a:xfrm flipV="1">
+            <a:off x="4707469" y="2559832"/>
+            <a:ext cx="457200" cy="235930"/>
+          </a:xfrm>
+          <a:prstGeom prst="bentConnector3">
+            <a:avLst>
+              <a:gd name="adj1" fmla="val 50000"/>
+            </a:avLst>
           </a:prstGeom>
           <a:ln w="28575">
             <a:solidFill>
@@ -4313,7 +4314,7 @@
           <a:p>
             <a:pPr algn="ctr"/>
             <a:r>
-              <a:rPr lang="en-US" sz="1600" dirty="0" smtClean="0">
+              <a:rPr lang="en-US" sz="1600" dirty="0">
                 <a:solidFill>
                   <a:schemeClr val="bg1"/>
                 </a:solidFill>
@@ -4664,7 +4665,7 @@
           <a:p>
             <a:pPr algn="ctr"/>
             <a:r>
-              <a:rPr lang="en-US" sz="1600" dirty="0" smtClean="0">
+              <a:rPr lang="en-US" sz="1600" dirty="0">
                 <a:solidFill>
                   <a:schemeClr val="bg1"/>
                 </a:solidFill>
@@ -4672,25 +4673,20 @@
               <a:t>Logs</a:t>
             </a:r>
             <a:br>
-              <a:rPr lang="en-US" sz="1600" dirty="0" smtClean="0">
+              <a:rPr lang="en-US" sz="1600" dirty="0">
                 <a:solidFill>
                   <a:schemeClr val="bg1"/>
                 </a:solidFill>
               </a:rPr>
             </a:br>
             <a:r>
-              <a:rPr lang="en-US" sz="1600" dirty="0" smtClean="0">
+              <a:rPr lang="en-US" sz="1600" dirty="0">
                 <a:solidFill>
                   <a:schemeClr val="bg1"/>
                 </a:solidFill>
               </a:rPr>
               <a:t>Center</a:t>
             </a:r>
-            <a:endParaRPr lang="en-US" sz="1600" dirty="0">
-              <a:solidFill>
-                <a:schemeClr val="bg1"/>
-              </a:solidFill>
-            </a:endParaRPr>
           </a:p>
         </p:txBody>
       </p:sp>
@@ -4756,6 +4752,227 @@
                 <a:lumMod val="75000"/>
               </a:schemeClr>
             </a:solidFill>
+          </a:ln>
+        </p:spPr>
+        <p:style>
+          <a:lnRef idx="1">
+            <a:schemeClr val="accent1"/>
+          </a:lnRef>
+          <a:fillRef idx="0">
+            <a:schemeClr val="accent1"/>
+          </a:fillRef>
+          <a:effectRef idx="0">
+            <a:schemeClr val="accent1"/>
+          </a:effectRef>
+          <a:fontRef idx="minor">
+            <a:schemeClr val="tx1"/>
+          </a:fontRef>
+        </p:style>
+      </p:cxnSp>
+      <p:sp>
+        <p:nvSpPr>
+          <p:cNvPr id="41" name="Cloud 40">
+            <a:extLst>
+              <a:ext uri="{FF2B5EF4-FFF2-40B4-BE49-F238E27FC236}">
+                <a16:creationId xmlns:a16="http://schemas.microsoft.com/office/drawing/2014/main" id="{960FD03F-5165-43C0-B6A5-42FE9653047C}"/>
+              </a:ext>
+            </a:extLst>
+          </p:cNvPr>
+          <p:cNvSpPr/>
+          <p:nvPr/>
+        </p:nvSpPr>
+        <p:spPr>
+          <a:xfrm>
+            <a:off x="4213193" y="1284960"/>
+            <a:ext cx="1273207" cy="649257"/>
+          </a:xfrm>
+          <a:prstGeom prst="cloud">
+            <a:avLst/>
+          </a:prstGeom>
+          <a:solidFill>
+            <a:schemeClr val="bg1"/>
+          </a:solidFill>
+          <a:ln>
+            <a:solidFill>
+              <a:schemeClr val="tx1"/>
+            </a:solidFill>
+          </a:ln>
+        </p:spPr>
+        <p:style>
+          <a:lnRef idx="2">
+            <a:schemeClr val="accent1">
+              <a:shade val="50000"/>
+            </a:schemeClr>
+          </a:lnRef>
+          <a:fillRef idx="1">
+            <a:schemeClr val="accent1"/>
+          </a:fillRef>
+          <a:effectRef idx="0">
+            <a:schemeClr val="accent1"/>
+          </a:effectRef>
+          <a:fontRef idx="minor">
+            <a:schemeClr val="lt1"/>
+          </a:fontRef>
+        </p:style>
+        <p:txBody>
+          <a:bodyPr rtlCol="0" anchor="ctr"/>
+          <a:lstStyle/>
+          <a:p>
+            <a:pPr algn="ctr"/>
+            <a:r>
+              <a:rPr lang="en-US" sz="1400" dirty="0">
+                <a:solidFill>
+                  <a:schemeClr val="tx1"/>
+                </a:solidFill>
+              </a:rPr>
+              <a:t>Google Calendar</a:t>
+            </a:r>
+          </a:p>
+        </p:txBody>
+      </p:sp>
+      <p:sp>
+        <p:nvSpPr>
+          <p:cNvPr id="42" name="Rectangle 45">
+            <a:extLst>
+              <a:ext uri="{FF2B5EF4-FFF2-40B4-BE49-F238E27FC236}">
+                <a16:creationId xmlns:a16="http://schemas.microsoft.com/office/drawing/2014/main" id="{6AD9AD18-DE8C-47FC-BEFD-5B556919F693}"/>
+              </a:ext>
+            </a:extLst>
+          </p:cNvPr>
+          <p:cNvSpPr/>
+          <p:nvPr/>
+        </p:nvSpPr>
+        <p:spPr>
+          <a:xfrm>
+            <a:off x="3413273" y="2180877"/>
+            <a:ext cx="1295400" cy="257523"/>
+          </a:xfrm>
+          <a:prstGeom prst="roundRect">
+            <a:avLst/>
+          </a:prstGeom>
+          <a:solidFill>
+            <a:schemeClr val="bg1">
+              <a:lumMod val="65000"/>
+            </a:schemeClr>
+          </a:solidFill>
+          <a:ln w="19050">
+            <a:solidFill>
+              <a:schemeClr val="bg1">
+                <a:lumMod val="65000"/>
+              </a:schemeClr>
+            </a:solidFill>
+          </a:ln>
+          <a:effectLst/>
+        </p:spPr>
+        <p:style>
+          <a:lnRef idx="1">
+            <a:schemeClr val="accent5"/>
+          </a:lnRef>
+          <a:fillRef idx="2">
+            <a:schemeClr val="accent5"/>
+          </a:fillRef>
+          <a:effectRef idx="1">
+            <a:schemeClr val="accent5"/>
+          </a:effectRef>
+          <a:fontRef idx="minor">
+            <a:schemeClr val="dk1"/>
+          </a:fontRef>
+        </p:style>
+        <p:txBody>
+          <a:bodyPr rtlCol="0" anchor="ctr"/>
+          <a:lstStyle/>
+          <a:p>
+            <a:pPr algn="ctr"/>
+            <a:r>
+              <a:rPr lang="en-US" sz="1600" dirty="0">
+                <a:solidFill>
+                  <a:schemeClr val="bg1"/>
+                </a:solidFill>
+              </a:rPr>
+              <a:t>Calendar</a:t>
+            </a:r>
+            <a:endParaRPr lang="en-SG" sz="1600" dirty="0">
+              <a:solidFill>
+                <a:schemeClr val="bg1"/>
+              </a:solidFill>
+            </a:endParaRPr>
+          </a:p>
+        </p:txBody>
+      </p:sp>
+      <p:cxnSp>
+        <p:nvCxnSpPr>
+          <p:cNvPr id="44" name="Elbow Connector 51">
+            <a:extLst>
+              <a:ext uri="{FF2B5EF4-FFF2-40B4-BE49-F238E27FC236}">
+                <a16:creationId xmlns:a16="http://schemas.microsoft.com/office/drawing/2014/main" id="{09632F31-4456-4601-AD93-0466C390B697}"/>
+              </a:ext>
+            </a:extLst>
+          </p:cNvPr>
+          <p:cNvCxnSpPr/>
+          <p:nvPr/>
+        </p:nvCxnSpPr>
+        <p:spPr>
+          <a:xfrm rot="5400000" flipH="1" flipV="1">
+            <a:off x="3823872" y="1692516"/>
+            <a:ext cx="476678" cy="383835"/>
+          </a:xfrm>
+          <a:prstGeom prst="bentConnector2">
+            <a:avLst/>
+          </a:prstGeom>
+          <a:ln w="28575">
+            <a:solidFill>
+              <a:schemeClr val="bg1">
+                <a:lumMod val="65000"/>
+              </a:schemeClr>
+            </a:solidFill>
+            <a:prstDash val="sysDot"/>
+            <a:tailEnd type="arrow"/>
+          </a:ln>
+        </p:spPr>
+        <p:style>
+          <a:lnRef idx="1">
+            <a:schemeClr val="accent1"/>
+          </a:lnRef>
+          <a:fillRef idx="0">
+            <a:schemeClr val="accent1"/>
+          </a:fillRef>
+          <a:effectRef idx="0">
+            <a:schemeClr val="accent1"/>
+          </a:effectRef>
+          <a:fontRef idx="minor">
+            <a:schemeClr val="tx1"/>
+          </a:fontRef>
+        </p:style>
+      </p:cxnSp>
+      <p:cxnSp>
+        <p:nvCxnSpPr>
+          <p:cNvPr id="45" name="Straight Arrow Connector 44">
+            <a:extLst>
+              <a:ext uri="{FF2B5EF4-FFF2-40B4-BE49-F238E27FC236}">
+                <a16:creationId xmlns:a16="http://schemas.microsoft.com/office/drawing/2014/main" id="{F883737D-6EE0-49C9-9756-D58DB809CB65}"/>
+              </a:ext>
+            </a:extLst>
+          </p:cNvPr>
+          <p:cNvCxnSpPr>
+            <a:cxnSpLocks/>
+            <a:stCxn id="3" idx="0"/>
+            <a:endCxn id="42" idx="2"/>
+          </p:cNvCxnSpPr>
+          <p:nvPr/>
+        </p:nvCxnSpPr>
+        <p:spPr>
+          <a:xfrm flipV="1">
+            <a:off x="4059769" y="2438400"/>
+            <a:ext cx="1204" cy="228600"/>
+          </a:xfrm>
+          <a:prstGeom prst="straightConnector1">
+            <a:avLst/>
+          </a:prstGeom>
+          <a:ln w="28575">
+            <a:solidFill>
+              <a:srgbClr val="0070C0"/>
+            </a:solidFill>
+            <a:tailEnd type="arrow"/>
           </a:ln>
         </p:spPr>
         <p:style>

</xml_diff>

<commit_message>
Update component diagrams and manual testing instructions (#338)
* Update template UG/DG

* Resolve conflicts

* Add manual testing instructions

* Update storage diagram

* Add tip to command format
</commit_message>
<xml_diff>
--- a/docs/diagrams/ArchitectureDiagram.pptx
+++ b/docs/diagrams/ArchitectureDiagram.pptx
@@ -5,10 +5,11 @@
     <p:sldMasterId id="2147483648" r:id="rId1"/>
   </p:sldMasterIdLst>
   <p:notesMasterIdLst>
-    <p:notesMasterId r:id="rId3"/>
+    <p:notesMasterId r:id="rId4"/>
   </p:notesMasterIdLst>
   <p:sldIdLst>
     <p:sldId id="259" r:id="rId2"/>
+    <p:sldId id="261" r:id="rId3"/>
   </p:sldIdLst>
   <p:sldSz cx="9144000" cy="6858000" type="screen4x3"/>
   <p:notesSz cx="6858000" cy="9144000"/>
@@ -107,6 +108,22 @@
       </a:defRPr>
     </a:lvl9pPr>
   </p:defaultTextStyle>
+  <p:extLst>
+    <p:ext uri="{EFAFB233-063F-42B5-8137-9DF3F51BA10A}">
+      <p15:sldGuideLst xmlns:p15="http://schemas.microsoft.com/office/powerpoint/2012/main">
+        <p15:guide id="1" orient="horz" pos="1488">
+          <p15:clr>
+            <a:srgbClr val="A4A3A4"/>
+          </p15:clr>
+        </p15:guide>
+        <p15:guide id="2" pos="2880">
+          <p15:clr>
+            <a:srgbClr val="A4A3A4"/>
+          </p15:clr>
+        </p15:guide>
+      </p15:sldGuideLst>
+    </p:ext>
+  </p:extLst>
 </p:presentation>
 </file>
 
@@ -192,7 +209,7 @@
           <a:p>
             <a:fld id="{F5CC4B3F-88C1-4FFA-B1B6-F41C21DC6924}" type="datetimeFigureOut">
               <a:rPr lang="en-US" smtClean="0"/>
-              <a:t>10/16/2016</a:t>
+              <a:t>11/12/2018</a:t>
             </a:fld>
             <a:endParaRPr lang="en-US"/>
           </a:p>
@@ -256,38 +273,37 @@
           <a:p>
             <a:pPr lvl="0"/>
             <a:r>
-              <a:rPr lang="en-US" smtClean="0"/>
+              <a:rPr lang="en-US"/>
               <a:t>Click to edit Master text styles</a:t>
             </a:r>
           </a:p>
           <a:p>
             <a:pPr lvl="1"/>
             <a:r>
-              <a:rPr lang="en-US" smtClean="0"/>
+              <a:rPr lang="en-US"/>
               <a:t>Second level</a:t>
             </a:r>
           </a:p>
           <a:p>
             <a:pPr lvl="2"/>
             <a:r>
-              <a:rPr lang="en-US" smtClean="0"/>
+              <a:rPr lang="en-US"/>
               <a:t>Third level</a:t>
             </a:r>
           </a:p>
           <a:p>
             <a:pPr lvl="3"/>
             <a:r>
-              <a:rPr lang="en-US" smtClean="0"/>
+              <a:rPr lang="en-US"/>
               <a:t>Fourth level</a:t>
             </a:r>
           </a:p>
           <a:p>
             <a:pPr lvl="4"/>
             <a:r>
-              <a:rPr lang="en-US" smtClean="0"/>
+              <a:rPr lang="en-US"/>
               <a:t>Fifth level</a:t>
             </a:r>
-            <a:endParaRPr lang="en-US"/>
           </a:p>
         </p:txBody>
       </p:sp>
@@ -498,10 +514,9 @@
           <a:lstStyle/>
           <a:p>
             <a:r>
-              <a:rPr lang="en-US" smtClean="0"/>
+              <a:rPr lang="en-US"/>
               <a:t>Click to edit Master title style</a:t>
             </a:r>
-            <a:endParaRPr lang="en-US"/>
           </a:p>
         </p:txBody>
       </p:sp>
@@ -617,10 +632,9 @@
           </a:lstStyle>
           <a:p>
             <a:r>
-              <a:rPr lang="en-US" smtClean="0"/>
+              <a:rPr lang="en-US"/>
               <a:t>Click to edit Master subtitle style</a:t>
             </a:r>
-            <a:endParaRPr lang="en-US"/>
           </a:p>
         </p:txBody>
       </p:sp>
@@ -641,7 +655,7 @@
           <a:p>
             <a:fld id="{78C97017-6FC3-485B-9764-EAC9E56C1D49}" type="datetimeFigureOut">
               <a:rPr lang="en-US" smtClean="0"/>
-              <a:t>10/16/2016</a:t>
+              <a:t>11/12/2018</a:t>
             </a:fld>
             <a:endParaRPr lang="en-US"/>
           </a:p>
@@ -735,10 +749,9 @@
           <a:lstStyle/>
           <a:p>
             <a:r>
-              <a:rPr lang="en-US" smtClean="0"/>
+              <a:rPr lang="en-US"/>
               <a:t>Click to edit Master title style</a:t>
             </a:r>
-            <a:endParaRPr lang="en-US"/>
           </a:p>
         </p:txBody>
       </p:sp>
@@ -759,38 +772,37 @@
           <a:p>
             <a:pPr lvl="0"/>
             <a:r>
-              <a:rPr lang="en-US" smtClean="0"/>
+              <a:rPr lang="en-US"/>
               <a:t>Click to edit Master text styles</a:t>
             </a:r>
           </a:p>
           <a:p>
             <a:pPr lvl="1"/>
             <a:r>
-              <a:rPr lang="en-US" smtClean="0"/>
+              <a:rPr lang="en-US"/>
               <a:t>Second level</a:t>
             </a:r>
           </a:p>
           <a:p>
             <a:pPr lvl="2"/>
             <a:r>
-              <a:rPr lang="en-US" smtClean="0"/>
+              <a:rPr lang="en-US"/>
               <a:t>Third level</a:t>
             </a:r>
           </a:p>
           <a:p>
             <a:pPr lvl="3"/>
             <a:r>
-              <a:rPr lang="en-US" smtClean="0"/>
+              <a:rPr lang="en-US"/>
               <a:t>Fourth level</a:t>
             </a:r>
           </a:p>
           <a:p>
             <a:pPr lvl="4"/>
             <a:r>
-              <a:rPr lang="en-US" smtClean="0"/>
+              <a:rPr lang="en-US"/>
               <a:t>Fifth level</a:t>
             </a:r>
-            <a:endParaRPr lang="en-US"/>
           </a:p>
         </p:txBody>
       </p:sp>
@@ -811,7 +823,7 @@
           <a:p>
             <a:fld id="{78C97017-6FC3-485B-9764-EAC9E56C1D49}" type="datetimeFigureOut">
               <a:rPr lang="en-US" smtClean="0"/>
-              <a:t>10/16/2016</a:t>
+              <a:t>11/12/2018</a:t>
             </a:fld>
             <a:endParaRPr lang="en-US"/>
           </a:p>
@@ -910,10 +922,9 @@
           <a:lstStyle/>
           <a:p>
             <a:r>
-              <a:rPr lang="en-US" smtClean="0"/>
+              <a:rPr lang="en-US"/>
               <a:t>Click to edit Master title style</a:t>
             </a:r>
-            <a:endParaRPr lang="en-US"/>
           </a:p>
         </p:txBody>
       </p:sp>
@@ -939,38 +950,37 @@
           <a:p>
             <a:pPr lvl="0"/>
             <a:r>
-              <a:rPr lang="en-US" smtClean="0"/>
+              <a:rPr lang="en-US"/>
               <a:t>Click to edit Master text styles</a:t>
             </a:r>
           </a:p>
           <a:p>
             <a:pPr lvl="1"/>
             <a:r>
-              <a:rPr lang="en-US" smtClean="0"/>
+              <a:rPr lang="en-US"/>
               <a:t>Second level</a:t>
             </a:r>
           </a:p>
           <a:p>
             <a:pPr lvl="2"/>
             <a:r>
-              <a:rPr lang="en-US" smtClean="0"/>
+              <a:rPr lang="en-US"/>
               <a:t>Third level</a:t>
             </a:r>
           </a:p>
           <a:p>
             <a:pPr lvl="3"/>
             <a:r>
-              <a:rPr lang="en-US" smtClean="0"/>
+              <a:rPr lang="en-US"/>
               <a:t>Fourth level</a:t>
             </a:r>
           </a:p>
           <a:p>
             <a:pPr lvl="4"/>
             <a:r>
-              <a:rPr lang="en-US" smtClean="0"/>
+              <a:rPr lang="en-US"/>
               <a:t>Fifth level</a:t>
             </a:r>
-            <a:endParaRPr lang="en-US"/>
           </a:p>
         </p:txBody>
       </p:sp>
@@ -991,7 +1001,7 @@
           <a:p>
             <a:fld id="{78C97017-6FC3-485B-9764-EAC9E56C1D49}" type="datetimeFigureOut">
               <a:rPr lang="en-US" smtClean="0"/>
-              <a:t>10/16/2016</a:t>
+              <a:t>11/12/2018</a:t>
             </a:fld>
             <a:endParaRPr lang="en-US"/>
           </a:p>
@@ -1085,10 +1095,9 @@
           <a:lstStyle/>
           <a:p>
             <a:r>
-              <a:rPr lang="en-US" smtClean="0"/>
+              <a:rPr lang="en-US"/>
               <a:t>Click to edit Master title style</a:t>
             </a:r>
-            <a:endParaRPr lang="en-US"/>
           </a:p>
         </p:txBody>
       </p:sp>
@@ -1109,38 +1118,37 @@
           <a:p>
             <a:pPr lvl="0"/>
             <a:r>
-              <a:rPr lang="en-US" smtClean="0"/>
+              <a:rPr lang="en-US"/>
               <a:t>Click to edit Master text styles</a:t>
             </a:r>
           </a:p>
           <a:p>
             <a:pPr lvl="1"/>
             <a:r>
-              <a:rPr lang="en-US" smtClean="0"/>
+              <a:rPr lang="en-US"/>
               <a:t>Second level</a:t>
             </a:r>
           </a:p>
           <a:p>
             <a:pPr lvl="2"/>
             <a:r>
-              <a:rPr lang="en-US" smtClean="0"/>
+              <a:rPr lang="en-US"/>
               <a:t>Third level</a:t>
             </a:r>
           </a:p>
           <a:p>
             <a:pPr lvl="3"/>
             <a:r>
-              <a:rPr lang="en-US" smtClean="0"/>
+              <a:rPr lang="en-US"/>
               <a:t>Fourth level</a:t>
             </a:r>
           </a:p>
           <a:p>
             <a:pPr lvl="4"/>
             <a:r>
-              <a:rPr lang="en-US" smtClean="0"/>
+              <a:rPr lang="en-US"/>
               <a:t>Fifth level</a:t>
             </a:r>
-            <a:endParaRPr lang="en-US"/>
           </a:p>
         </p:txBody>
       </p:sp>
@@ -1161,7 +1169,7 @@
           <a:p>
             <a:fld id="{78C97017-6FC3-485B-9764-EAC9E56C1D49}" type="datetimeFigureOut">
               <a:rPr lang="en-US" smtClean="0"/>
-              <a:t>10/16/2016</a:t>
+              <a:t>11/12/2018</a:t>
             </a:fld>
             <a:endParaRPr lang="en-US"/>
           </a:p>
@@ -1264,10 +1272,9 @@
           </a:lstStyle>
           <a:p>
             <a:r>
-              <a:rPr lang="en-US" smtClean="0"/>
+              <a:rPr lang="en-US"/>
               <a:t>Click to edit Master title style</a:t>
             </a:r>
-            <a:endParaRPr lang="en-US"/>
           </a:p>
         </p:txBody>
       </p:sp>
@@ -1384,7 +1391,7 @@
           <a:p>
             <a:pPr lvl="0"/>
             <a:r>
-              <a:rPr lang="en-US" smtClean="0"/>
+              <a:rPr lang="en-US"/>
               <a:t>Click to edit Master text styles</a:t>
             </a:r>
           </a:p>
@@ -1407,7 +1414,7 @@
           <a:p>
             <a:fld id="{78C97017-6FC3-485B-9764-EAC9E56C1D49}" type="datetimeFigureOut">
               <a:rPr lang="en-US" smtClean="0"/>
-              <a:t>10/16/2016</a:t>
+              <a:t>11/12/2018</a:t>
             </a:fld>
             <a:endParaRPr lang="en-US"/>
           </a:p>
@@ -1501,10 +1508,9 @@
           <a:lstStyle/>
           <a:p>
             <a:r>
-              <a:rPr lang="en-US" smtClean="0"/>
+              <a:rPr lang="en-US"/>
               <a:t>Click to edit Master title style</a:t>
             </a:r>
-            <a:endParaRPr lang="en-US"/>
           </a:p>
         </p:txBody>
       </p:sp>
@@ -1558,38 +1564,37 @@
           <a:p>
             <a:pPr lvl="0"/>
             <a:r>
-              <a:rPr lang="en-US" smtClean="0"/>
+              <a:rPr lang="en-US"/>
               <a:t>Click to edit Master text styles</a:t>
             </a:r>
           </a:p>
           <a:p>
             <a:pPr lvl="1"/>
             <a:r>
-              <a:rPr lang="en-US" smtClean="0"/>
+              <a:rPr lang="en-US"/>
               <a:t>Second level</a:t>
             </a:r>
           </a:p>
           <a:p>
             <a:pPr lvl="2"/>
             <a:r>
-              <a:rPr lang="en-US" smtClean="0"/>
+              <a:rPr lang="en-US"/>
               <a:t>Third level</a:t>
             </a:r>
           </a:p>
           <a:p>
             <a:pPr lvl="3"/>
             <a:r>
-              <a:rPr lang="en-US" smtClean="0"/>
+              <a:rPr lang="en-US"/>
               <a:t>Fourth level</a:t>
             </a:r>
           </a:p>
           <a:p>
             <a:pPr lvl="4"/>
             <a:r>
-              <a:rPr lang="en-US" smtClean="0"/>
+              <a:rPr lang="en-US"/>
               <a:t>Fifth level</a:t>
             </a:r>
-            <a:endParaRPr lang="en-US"/>
           </a:p>
         </p:txBody>
       </p:sp>
@@ -1643,38 +1648,37 @@
           <a:p>
             <a:pPr lvl="0"/>
             <a:r>
-              <a:rPr lang="en-US" smtClean="0"/>
+              <a:rPr lang="en-US"/>
               <a:t>Click to edit Master text styles</a:t>
             </a:r>
           </a:p>
           <a:p>
             <a:pPr lvl="1"/>
             <a:r>
-              <a:rPr lang="en-US" smtClean="0"/>
+              <a:rPr lang="en-US"/>
               <a:t>Second level</a:t>
             </a:r>
           </a:p>
           <a:p>
             <a:pPr lvl="2"/>
             <a:r>
-              <a:rPr lang="en-US" smtClean="0"/>
+              <a:rPr lang="en-US"/>
               <a:t>Third level</a:t>
             </a:r>
           </a:p>
           <a:p>
             <a:pPr lvl="3"/>
             <a:r>
-              <a:rPr lang="en-US" smtClean="0"/>
+              <a:rPr lang="en-US"/>
               <a:t>Fourth level</a:t>
             </a:r>
           </a:p>
           <a:p>
             <a:pPr lvl="4"/>
             <a:r>
-              <a:rPr lang="en-US" smtClean="0"/>
+              <a:rPr lang="en-US"/>
               <a:t>Fifth level</a:t>
             </a:r>
-            <a:endParaRPr lang="en-US"/>
           </a:p>
         </p:txBody>
       </p:sp>
@@ -1695,7 +1699,7 @@
           <a:p>
             <a:fld id="{78C97017-6FC3-485B-9764-EAC9E56C1D49}" type="datetimeFigureOut">
               <a:rPr lang="en-US" smtClean="0"/>
-              <a:t>10/16/2016</a:t>
+              <a:t>11/12/2018</a:t>
             </a:fld>
             <a:endParaRPr lang="en-US"/>
           </a:p>
@@ -1793,10 +1797,9 @@
           </a:lstStyle>
           <a:p>
             <a:r>
-              <a:rPr lang="en-US" smtClean="0"/>
+              <a:rPr lang="en-US"/>
               <a:t>Click to edit Master title style</a:t>
             </a:r>
-            <a:endParaRPr lang="en-US"/>
           </a:p>
         </p:txBody>
       </p:sp>
@@ -1859,7 +1862,7 @@
           <a:p>
             <a:pPr lvl="0"/>
             <a:r>
-              <a:rPr lang="en-US" smtClean="0"/>
+              <a:rPr lang="en-US"/>
               <a:t>Click to edit Master text styles</a:t>
             </a:r>
           </a:p>
@@ -1915,38 +1918,37 @@
           <a:p>
             <a:pPr lvl="0"/>
             <a:r>
-              <a:rPr lang="en-US" smtClean="0"/>
+              <a:rPr lang="en-US"/>
               <a:t>Click to edit Master text styles</a:t>
             </a:r>
           </a:p>
           <a:p>
             <a:pPr lvl="1"/>
             <a:r>
-              <a:rPr lang="en-US" smtClean="0"/>
+              <a:rPr lang="en-US"/>
               <a:t>Second level</a:t>
             </a:r>
           </a:p>
           <a:p>
             <a:pPr lvl="2"/>
             <a:r>
-              <a:rPr lang="en-US" smtClean="0"/>
+              <a:rPr lang="en-US"/>
               <a:t>Third level</a:t>
             </a:r>
           </a:p>
           <a:p>
             <a:pPr lvl="3"/>
             <a:r>
-              <a:rPr lang="en-US" smtClean="0"/>
+              <a:rPr lang="en-US"/>
               <a:t>Fourth level</a:t>
             </a:r>
           </a:p>
           <a:p>
             <a:pPr lvl="4"/>
             <a:r>
-              <a:rPr lang="en-US" smtClean="0"/>
+              <a:rPr lang="en-US"/>
               <a:t>Fifth level</a:t>
             </a:r>
-            <a:endParaRPr lang="en-US"/>
           </a:p>
         </p:txBody>
       </p:sp>
@@ -2009,7 +2011,7 @@
           <a:p>
             <a:pPr lvl="0"/>
             <a:r>
-              <a:rPr lang="en-US" smtClean="0"/>
+              <a:rPr lang="en-US"/>
               <a:t>Click to edit Master text styles</a:t>
             </a:r>
           </a:p>
@@ -2065,38 +2067,37 @@
           <a:p>
             <a:pPr lvl="0"/>
             <a:r>
-              <a:rPr lang="en-US" smtClean="0"/>
+              <a:rPr lang="en-US"/>
               <a:t>Click to edit Master text styles</a:t>
             </a:r>
           </a:p>
           <a:p>
             <a:pPr lvl="1"/>
             <a:r>
-              <a:rPr lang="en-US" smtClean="0"/>
+              <a:rPr lang="en-US"/>
               <a:t>Second level</a:t>
             </a:r>
           </a:p>
           <a:p>
             <a:pPr lvl="2"/>
             <a:r>
-              <a:rPr lang="en-US" smtClean="0"/>
+              <a:rPr lang="en-US"/>
               <a:t>Third level</a:t>
             </a:r>
           </a:p>
           <a:p>
             <a:pPr lvl="3"/>
             <a:r>
-              <a:rPr lang="en-US" smtClean="0"/>
+              <a:rPr lang="en-US"/>
               <a:t>Fourth level</a:t>
             </a:r>
           </a:p>
           <a:p>
             <a:pPr lvl="4"/>
             <a:r>
-              <a:rPr lang="en-US" smtClean="0"/>
+              <a:rPr lang="en-US"/>
               <a:t>Fifth level</a:t>
             </a:r>
-            <a:endParaRPr lang="en-US"/>
           </a:p>
         </p:txBody>
       </p:sp>
@@ -2117,7 +2118,7 @@
           <a:p>
             <a:fld id="{78C97017-6FC3-485B-9764-EAC9E56C1D49}" type="datetimeFigureOut">
               <a:rPr lang="en-US" smtClean="0"/>
-              <a:t>10/16/2016</a:t>
+              <a:t>11/12/2018</a:t>
             </a:fld>
             <a:endParaRPr lang="en-US"/>
           </a:p>
@@ -2211,10 +2212,9 @@
           <a:lstStyle/>
           <a:p>
             <a:r>
-              <a:rPr lang="en-US" smtClean="0"/>
+              <a:rPr lang="en-US"/>
               <a:t>Click to edit Master title style</a:t>
             </a:r>
-            <a:endParaRPr lang="en-US"/>
           </a:p>
         </p:txBody>
       </p:sp>
@@ -2235,7 +2235,7 @@
           <a:p>
             <a:fld id="{78C97017-6FC3-485B-9764-EAC9E56C1D49}" type="datetimeFigureOut">
               <a:rPr lang="en-US" smtClean="0"/>
-              <a:t>10/16/2016</a:t>
+              <a:t>11/12/2018</a:t>
             </a:fld>
             <a:endParaRPr lang="en-US"/>
           </a:p>
@@ -2330,7 +2330,7 @@
           <a:p>
             <a:fld id="{78C97017-6FC3-485B-9764-EAC9E56C1D49}" type="datetimeFigureOut">
               <a:rPr lang="en-US" smtClean="0"/>
-              <a:t>10/16/2016</a:t>
+              <a:t>11/12/2018</a:t>
             </a:fld>
             <a:endParaRPr lang="en-US"/>
           </a:p>
@@ -2433,10 +2433,9 @@
           </a:lstStyle>
           <a:p>
             <a:r>
-              <a:rPr lang="en-US" smtClean="0"/>
+              <a:rPr lang="en-US"/>
               <a:t>Click to edit Master title style</a:t>
             </a:r>
-            <a:endParaRPr lang="en-US"/>
           </a:p>
         </p:txBody>
       </p:sp>
@@ -2490,38 +2489,37 @@
           <a:p>
             <a:pPr lvl="0"/>
             <a:r>
-              <a:rPr lang="en-US" smtClean="0"/>
+              <a:rPr lang="en-US"/>
               <a:t>Click to edit Master text styles</a:t>
             </a:r>
           </a:p>
           <a:p>
             <a:pPr lvl="1"/>
             <a:r>
-              <a:rPr lang="en-US" smtClean="0"/>
+              <a:rPr lang="en-US"/>
               <a:t>Second level</a:t>
             </a:r>
           </a:p>
           <a:p>
             <a:pPr lvl="2"/>
             <a:r>
-              <a:rPr lang="en-US" smtClean="0"/>
+              <a:rPr lang="en-US"/>
               <a:t>Third level</a:t>
             </a:r>
           </a:p>
           <a:p>
             <a:pPr lvl="3"/>
             <a:r>
-              <a:rPr lang="en-US" smtClean="0"/>
+              <a:rPr lang="en-US"/>
               <a:t>Fourth level</a:t>
             </a:r>
           </a:p>
           <a:p>
             <a:pPr lvl="4"/>
             <a:r>
-              <a:rPr lang="en-US" smtClean="0"/>
+              <a:rPr lang="en-US"/>
               <a:t>Fifth level</a:t>
             </a:r>
-            <a:endParaRPr lang="en-US"/>
           </a:p>
         </p:txBody>
       </p:sp>
@@ -2584,7 +2582,7 @@
           <a:p>
             <a:pPr lvl="0"/>
             <a:r>
-              <a:rPr lang="en-US" smtClean="0"/>
+              <a:rPr lang="en-US"/>
               <a:t>Click to edit Master text styles</a:t>
             </a:r>
           </a:p>
@@ -2607,7 +2605,7 @@
           <a:p>
             <a:fld id="{78C97017-6FC3-485B-9764-EAC9E56C1D49}" type="datetimeFigureOut">
               <a:rPr lang="en-US" smtClean="0"/>
-              <a:t>10/16/2016</a:t>
+              <a:t>11/12/2018</a:t>
             </a:fld>
             <a:endParaRPr lang="en-US"/>
           </a:p>
@@ -2710,10 +2708,9 @@
           </a:lstStyle>
           <a:p>
             <a:r>
-              <a:rPr lang="en-US" smtClean="0"/>
+              <a:rPr lang="en-US"/>
               <a:t>Click to edit Master title style</a:t>
             </a:r>
-            <a:endParaRPr lang="en-US"/>
           </a:p>
         </p:txBody>
       </p:sp>
@@ -2837,7 +2834,7 @@
           <a:p>
             <a:pPr lvl="0"/>
             <a:r>
-              <a:rPr lang="en-US" smtClean="0"/>
+              <a:rPr lang="en-US"/>
               <a:t>Click to edit Master text styles</a:t>
             </a:r>
           </a:p>
@@ -2860,7 +2857,7 @@
           <a:p>
             <a:fld id="{78C97017-6FC3-485B-9764-EAC9E56C1D49}" type="datetimeFigureOut">
               <a:rPr lang="en-US" smtClean="0"/>
-              <a:t>10/16/2016</a:t>
+              <a:t>11/12/2018</a:t>
             </a:fld>
             <a:endParaRPr lang="en-US"/>
           </a:p>
@@ -2969,10 +2966,9 @@
           <a:lstStyle/>
           <a:p>
             <a:r>
-              <a:rPr lang="en-US" smtClean="0"/>
+              <a:rPr lang="en-US"/>
               <a:t>Click to edit Master title style</a:t>
             </a:r>
-            <a:endParaRPr lang="en-US"/>
           </a:p>
         </p:txBody>
       </p:sp>
@@ -3003,38 +2999,37 @@
           <a:p>
             <a:pPr lvl="0"/>
             <a:r>
-              <a:rPr lang="en-US" smtClean="0"/>
+              <a:rPr lang="en-US"/>
               <a:t>Click to edit Master text styles</a:t>
             </a:r>
           </a:p>
           <a:p>
             <a:pPr lvl="1"/>
             <a:r>
-              <a:rPr lang="en-US" smtClean="0"/>
+              <a:rPr lang="en-US"/>
               <a:t>Second level</a:t>
             </a:r>
           </a:p>
           <a:p>
             <a:pPr lvl="2"/>
             <a:r>
-              <a:rPr lang="en-US" smtClean="0"/>
+              <a:rPr lang="en-US"/>
               <a:t>Third level</a:t>
             </a:r>
           </a:p>
           <a:p>
             <a:pPr lvl="3"/>
             <a:r>
-              <a:rPr lang="en-US" smtClean="0"/>
+              <a:rPr lang="en-US"/>
               <a:t>Fourth level</a:t>
             </a:r>
           </a:p>
           <a:p>
             <a:pPr lvl="4"/>
             <a:r>
-              <a:rPr lang="en-US" smtClean="0"/>
+              <a:rPr lang="en-US"/>
               <a:t>Fifth level</a:t>
             </a:r>
-            <a:endParaRPr lang="en-US"/>
           </a:p>
         </p:txBody>
       </p:sp>
@@ -3073,7 +3068,7 @@
           <a:p>
             <a:fld id="{78C97017-6FC3-485B-9764-EAC9E56C1D49}" type="datetimeFigureOut">
               <a:rPr lang="en-US" smtClean="0"/>
-              <a:t>10/16/2016</a:t>
+              <a:t>11/12/2018</a:t>
             </a:fld>
             <a:endParaRPr lang="en-US"/>
           </a:p>
@@ -3546,7 +3541,7 @@
           <a:p>
             <a:pPr algn="ctr"/>
             <a:r>
-              <a:rPr lang="en-US" sz="1600" dirty="0" smtClean="0">
+              <a:rPr lang="en-US" sz="1600" dirty="0">
                 <a:solidFill>
                   <a:schemeClr val="bg1"/>
                 </a:solidFill>
@@ -3605,7 +3600,7 @@
           <a:p>
             <a:pPr algn="ctr"/>
             <a:r>
-              <a:rPr lang="en-US" sz="1600" dirty="0" smtClean="0">
+              <a:rPr lang="en-US" sz="1600" dirty="0">
                 <a:solidFill>
                   <a:schemeClr val="bg1"/>
                 </a:solidFill>
@@ -3668,7 +3663,7 @@
           <a:p>
             <a:pPr algn="ctr"/>
             <a:r>
-              <a:rPr lang="en-US" sz="1600" dirty="0" smtClean="0">
+              <a:rPr lang="en-US" sz="1600" dirty="0">
                 <a:solidFill>
                   <a:schemeClr val="bg1"/>
                 </a:solidFill>
@@ -3727,7 +3722,7 @@
           <a:p>
             <a:pPr algn="ctr"/>
             <a:r>
-              <a:rPr lang="en-US" sz="1600" dirty="0" smtClean="0">
+              <a:rPr lang="en-US" sz="1600" dirty="0">
                 <a:solidFill>
                   <a:schemeClr val="bg1"/>
                 </a:solidFill>
@@ -4233,6 +4228,7 @@
         <p:nvCxnSpPr>
           <p:cNvPr id="52" name="Elbow Connector 51"/>
           <p:cNvCxnSpPr>
+            <a:cxnSpLocks/>
             <a:stCxn id="2" idx="0"/>
             <a:endCxn id="51" idx="2"/>
           </p:cNvCxnSpPr>
@@ -4313,7 +4309,7 @@
           <a:p>
             <a:pPr algn="ctr"/>
             <a:r>
-              <a:rPr lang="en-US" sz="1600" dirty="0" smtClean="0">
+              <a:rPr lang="en-US" sz="1600" dirty="0">
                 <a:solidFill>
                   <a:schemeClr val="bg1"/>
                 </a:solidFill>
@@ -4664,7 +4660,7 @@
           <a:p>
             <a:pPr algn="ctr"/>
             <a:r>
-              <a:rPr lang="en-US" sz="1600" dirty="0" smtClean="0">
+              <a:rPr lang="en-US" sz="1600" dirty="0">
                 <a:solidFill>
                   <a:schemeClr val="bg1"/>
                 </a:solidFill>
@@ -4672,25 +4668,20 @@
               <a:t>Logs</a:t>
             </a:r>
             <a:br>
-              <a:rPr lang="en-US" sz="1600" dirty="0" smtClean="0">
+              <a:rPr lang="en-US" sz="1600" dirty="0">
                 <a:solidFill>
                   <a:schemeClr val="bg1"/>
                 </a:solidFill>
               </a:rPr>
             </a:br>
             <a:r>
-              <a:rPr lang="en-US" sz="1600" dirty="0" smtClean="0">
+              <a:rPr lang="en-US" sz="1600" dirty="0">
                 <a:solidFill>
                   <a:schemeClr val="bg1"/>
                 </a:solidFill>
               </a:rPr>
               <a:t>Center</a:t>
             </a:r>
-            <a:endParaRPr lang="en-US" sz="1600" dirty="0">
-              <a:solidFill>
-                <a:schemeClr val="bg1"/>
-              </a:solidFill>
-            </a:endParaRPr>
           </a:p>
         </p:txBody>
       </p:sp>
@@ -4777,6 +4768,1261 @@
     <p:extLst>
       <p:ext uri="{BB962C8B-B14F-4D97-AF65-F5344CB8AC3E}">
         <p14:creationId xmlns:p14="http://schemas.microsoft.com/office/powerpoint/2010/main" val="1981432603"/>
+      </p:ext>
+    </p:extLst>
+  </p:cSld>
+  <p:clrMapOvr>
+    <a:masterClrMapping/>
+  </p:clrMapOvr>
+</p:sld>
+</file>
+
+<file path=ppt/slides/slide2.xml><?xml version="1.0" encoding="utf-8"?>
+<p:sld xmlns:a="http://schemas.openxmlformats.org/drawingml/2006/main" xmlns:r="http://schemas.openxmlformats.org/officeDocument/2006/relationships" xmlns:p="http://schemas.openxmlformats.org/presentationml/2006/main">
+  <p:cSld>
+    <p:spTree>
+      <p:nvGrpSpPr>
+        <p:cNvPr id="1" name=""/>
+        <p:cNvGrpSpPr/>
+        <p:nvPr/>
+      </p:nvGrpSpPr>
+      <p:grpSpPr>
+        <a:xfrm>
+          <a:off x="0" y="0"/>
+          <a:ext cx="0" cy="0"/>
+          <a:chOff x="0" y="0"/>
+          <a:chExt cx="0" cy="0"/>
+        </a:xfrm>
+      </p:grpSpPr>
+      <p:sp>
+        <p:nvSpPr>
+          <p:cNvPr id="15" name="Rounded Rectangle 14"/>
+          <p:cNvSpPr/>
+          <p:nvPr/>
+        </p:nvSpPr>
+        <p:spPr>
+          <a:xfrm>
+            <a:off x="1636188" y="2057400"/>
+            <a:ext cx="5700181" cy="2667000"/>
+          </a:xfrm>
+          <a:prstGeom prst="roundRect">
+            <a:avLst>
+              <a:gd name="adj" fmla="val 5768"/>
+            </a:avLst>
+          </a:prstGeom>
+          <a:solidFill>
+            <a:schemeClr val="bg1">
+              <a:lumMod val="95000"/>
+            </a:schemeClr>
+          </a:solidFill>
+          <a:ln>
+            <a:solidFill>
+              <a:schemeClr val="bg1">
+                <a:lumMod val="85000"/>
+              </a:schemeClr>
+            </a:solidFill>
+          </a:ln>
+        </p:spPr>
+        <p:style>
+          <a:lnRef idx="2">
+            <a:schemeClr val="accent1">
+              <a:shade val="50000"/>
+            </a:schemeClr>
+          </a:lnRef>
+          <a:fillRef idx="1">
+            <a:schemeClr val="accent1"/>
+          </a:fillRef>
+          <a:effectRef idx="0">
+            <a:schemeClr val="accent1"/>
+          </a:effectRef>
+          <a:fontRef idx="minor">
+            <a:schemeClr val="lt1"/>
+          </a:fontRef>
+        </p:style>
+        <p:txBody>
+          <a:bodyPr rtlCol="0" anchor="ctr"/>
+          <a:lstStyle/>
+          <a:p>
+            <a:pPr algn="ctr"/>
+            <a:endParaRPr lang="en-US"/>
+          </a:p>
+        </p:txBody>
+      </p:sp>
+      <p:sp>
+        <p:nvSpPr>
+          <p:cNvPr id="2" name="Rectangle 62"/>
+          <p:cNvSpPr/>
+          <p:nvPr/>
+        </p:nvSpPr>
+        <p:spPr>
+          <a:xfrm flipH="1">
+            <a:off x="1964269" y="2191178"/>
+            <a:ext cx="609602" cy="1294917"/>
+          </a:xfrm>
+          <a:prstGeom prst="roundRect">
+            <a:avLst/>
+          </a:prstGeom>
+          <a:solidFill>
+            <a:srgbClr val="00B050"/>
+          </a:solidFill>
+          <a:ln w="19050">
+            <a:solidFill>
+              <a:srgbClr val="00B050"/>
+            </a:solidFill>
+          </a:ln>
+          <a:effectLst/>
+        </p:spPr>
+        <p:style>
+          <a:lnRef idx="1">
+            <a:schemeClr val="accent2"/>
+          </a:lnRef>
+          <a:fillRef idx="2">
+            <a:schemeClr val="accent2"/>
+          </a:fillRef>
+          <a:effectRef idx="1">
+            <a:schemeClr val="accent2"/>
+          </a:effectRef>
+          <a:fontRef idx="minor">
+            <a:schemeClr val="dk1"/>
+          </a:fontRef>
+        </p:style>
+        <p:txBody>
+          <a:bodyPr rtlCol="0" anchor="ctr"/>
+          <a:lstStyle/>
+          <a:p>
+            <a:pPr algn="ctr"/>
+            <a:r>
+              <a:rPr lang="en-US" sz="1600" dirty="0">
+                <a:solidFill>
+                  <a:schemeClr val="bg1"/>
+                </a:solidFill>
+              </a:rPr>
+              <a:t>UI</a:t>
+            </a:r>
+            <a:endParaRPr lang="en-SG" sz="1600" dirty="0">
+              <a:solidFill>
+                <a:schemeClr val="bg1"/>
+              </a:solidFill>
+            </a:endParaRPr>
+          </a:p>
+        </p:txBody>
+      </p:sp>
+      <p:sp>
+        <p:nvSpPr>
+          <p:cNvPr id="3" name="Rectangle 45"/>
+          <p:cNvSpPr/>
+          <p:nvPr/>
+        </p:nvSpPr>
+        <p:spPr>
+          <a:xfrm>
+            <a:off x="3412069" y="2191178"/>
+            <a:ext cx="1295400" cy="552022"/>
+          </a:xfrm>
+          <a:prstGeom prst="roundRect">
+            <a:avLst/>
+          </a:prstGeom>
+          <a:solidFill>
+            <a:srgbClr val="0070C0"/>
+          </a:solidFill>
+          <a:ln w="19050">
+            <a:solidFill>
+              <a:srgbClr val="0070C0"/>
+            </a:solidFill>
+          </a:ln>
+          <a:effectLst/>
+        </p:spPr>
+        <p:style>
+          <a:lnRef idx="1">
+            <a:schemeClr val="accent5"/>
+          </a:lnRef>
+          <a:fillRef idx="2">
+            <a:schemeClr val="accent5"/>
+          </a:fillRef>
+          <a:effectRef idx="1">
+            <a:schemeClr val="accent5"/>
+          </a:effectRef>
+          <a:fontRef idx="minor">
+            <a:schemeClr val="dk1"/>
+          </a:fontRef>
+        </p:style>
+        <p:txBody>
+          <a:bodyPr rtlCol="0" anchor="ctr"/>
+          <a:lstStyle/>
+          <a:p>
+            <a:pPr algn="ctr"/>
+            <a:r>
+              <a:rPr lang="en-US" sz="1600" dirty="0">
+                <a:solidFill>
+                  <a:schemeClr val="bg1"/>
+                </a:solidFill>
+              </a:rPr>
+              <a:t>Logic</a:t>
+            </a:r>
+            <a:endParaRPr lang="en-SG" sz="1600" dirty="0">
+              <a:solidFill>
+                <a:schemeClr val="bg1"/>
+              </a:solidFill>
+            </a:endParaRPr>
+          </a:p>
+        </p:txBody>
+      </p:sp>
+      <p:sp>
+        <p:nvSpPr>
+          <p:cNvPr id="4" name="Rectangle 45"/>
+          <p:cNvSpPr/>
+          <p:nvPr/>
+        </p:nvSpPr>
+        <p:spPr>
+          <a:xfrm>
+            <a:off x="5164669" y="2191179"/>
+            <a:ext cx="1447800" cy="552022"/>
+          </a:xfrm>
+          <a:prstGeom prst="roundRect">
+            <a:avLst/>
+          </a:prstGeom>
+          <a:solidFill>
+            <a:schemeClr val="accent6">
+              <a:lumMod val="75000"/>
+            </a:schemeClr>
+          </a:solidFill>
+          <a:ln w="19050">
+            <a:solidFill>
+              <a:schemeClr val="accent6">
+                <a:lumMod val="75000"/>
+              </a:schemeClr>
+            </a:solidFill>
+          </a:ln>
+          <a:effectLst/>
+        </p:spPr>
+        <p:style>
+          <a:lnRef idx="1">
+            <a:schemeClr val="accent5"/>
+          </a:lnRef>
+          <a:fillRef idx="2">
+            <a:schemeClr val="accent5"/>
+          </a:fillRef>
+          <a:effectRef idx="1">
+            <a:schemeClr val="accent5"/>
+          </a:effectRef>
+          <a:fontRef idx="minor">
+            <a:schemeClr val="dk1"/>
+          </a:fontRef>
+        </p:style>
+        <p:txBody>
+          <a:bodyPr rtlCol="0" anchor="ctr"/>
+          <a:lstStyle/>
+          <a:p>
+            <a:pPr algn="ctr"/>
+            <a:r>
+              <a:rPr lang="en-US" sz="1600" dirty="0">
+                <a:solidFill>
+                  <a:schemeClr val="bg1"/>
+                </a:solidFill>
+              </a:rPr>
+              <a:t>Storage</a:t>
+            </a:r>
+            <a:endParaRPr lang="en-SG" sz="1600" dirty="0">
+              <a:solidFill>
+                <a:schemeClr val="bg1"/>
+              </a:solidFill>
+            </a:endParaRPr>
+          </a:p>
+        </p:txBody>
+      </p:sp>
+      <p:sp>
+        <p:nvSpPr>
+          <p:cNvPr id="5" name="Rectangle 45"/>
+          <p:cNvSpPr/>
+          <p:nvPr/>
+        </p:nvSpPr>
+        <p:spPr>
+          <a:xfrm>
+            <a:off x="3412069" y="3124200"/>
+            <a:ext cx="1295400" cy="723791"/>
+          </a:xfrm>
+          <a:prstGeom prst="roundRect">
+            <a:avLst/>
+          </a:prstGeom>
+          <a:solidFill>
+            <a:srgbClr val="7030A0"/>
+          </a:solidFill>
+          <a:ln w="19050">
+            <a:solidFill>
+              <a:srgbClr val="7030A0"/>
+            </a:solidFill>
+          </a:ln>
+          <a:effectLst/>
+        </p:spPr>
+        <p:style>
+          <a:lnRef idx="1">
+            <a:schemeClr val="accent5"/>
+          </a:lnRef>
+          <a:fillRef idx="2">
+            <a:schemeClr val="accent5"/>
+          </a:fillRef>
+          <a:effectRef idx="1">
+            <a:schemeClr val="accent5"/>
+          </a:effectRef>
+          <a:fontRef idx="minor">
+            <a:schemeClr val="dk1"/>
+          </a:fontRef>
+        </p:style>
+        <p:txBody>
+          <a:bodyPr rtlCol="0" anchor="ctr"/>
+          <a:lstStyle/>
+          <a:p>
+            <a:pPr algn="ctr"/>
+            <a:r>
+              <a:rPr lang="en-US" sz="1600" dirty="0">
+                <a:solidFill>
+                  <a:schemeClr val="bg1"/>
+                </a:solidFill>
+              </a:rPr>
+              <a:t>Model</a:t>
+            </a:r>
+            <a:endParaRPr lang="en-SG" sz="1600" dirty="0">
+              <a:solidFill>
+                <a:schemeClr val="bg1"/>
+              </a:solidFill>
+            </a:endParaRPr>
+          </a:p>
+        </p:txBody>
+      </p:sp>
+      <p:sp>
+        <p:nvSpPr>
+          <p:cNvPr id="8" name="Rectangle 45"/>
+          <p:cNvSpPr/>
+          <p:nvPr/>
+        </p:nvSpPr>
+        <p:spPr>
+          <a:xfrm>
+            <a:off x="3217846" y="4131994"/>
+            <a:ext cx="2658531" cy="444640"/>
+          </a:xfrm>
+          <a:prstGeom prst="roundRect">
+            <a:avLst/>
+          </a:prstGeom>
+          <a:solidFill>
+            <a:schemeClr val="accent5">
+              <a:lumMod val="75000"/>
+            </a:schemeClr>
+          </a:solidFill>
+          <a:ln w="19050">
+            <a:solidFill>
+              <a:schemeClr val="accent5">
+                <a:lumMod val="75000"/>
+              </a:schemeClr>
+            </a:solidFill>
+          </a:ln>
+          <a:effectLst/>
+        </p:spPr>
+        <p:style>
+          <a:lnRef idx="1">
+            <a:schemeClr val="accent5"/>
+          </a:lnRef>
+          <a:fillRef idx="2">
+            <a:schemeClr val="accent5"/>
+          </a:fillRef>
+          <a:effectRef idx="1">
+            <a:schemeClr val="accent5"/>
+          </a:effectRef>
+          <a:fontRef idx="minor">
+            <a:schemeClr val="dk1"/>
+          </a:fontRef>
+        </p:style>
+        <p:txBody>
+          <a:bodyPr rtlCol="0" anchor="ctr"/>
+          <a:lstStyle/>
+          <a:p>
+            <a:pPr algn="ctr"/>
+            <a:r>
+              <a:rPr lang="en-US" sz="1400" dirty="0">
+                <a:solidFill>
+                  <a:schemeClr val="bg1"/>
+                </a:solidFill>
+              </a:rPr>
+              <a:t>Commons</a:t>
+            </a:r>
+            <a:endParaRPr lang="en-SG" sz="1400" dirty="0">
+              <a:solidFill>
+                <a:schemeClr val="bg1"/>
+              </a:solidFill>
+            </a:endParaRPr>
+          </a:p>
+        </p:txBody>
+      </p:sp>
+      <p:cxnSp>
+        <p:nvCxnSpPr>
+          <p:cNvPr id="10" name="Straight Arrow Connector 9"/>
+          <p:cNvCxnSpPr>
+            <a:endCxn id="3" idx="1"/>
+          </p:cNvCxnSpPr>
+          <p:nvPr/>
+        </p:nvCxnSpPr>
+        <p:spPr>
+          <a:xfrm>
+            <a:off x="2573871" y="2467189"/>
+            <a:ext cx="838198" cy="0"/>
+          </a:xfrm>
+          <a:prstGeom prst="straightConnector1">
+            <a:avLst/>
+          </a:prstGeom>
+          <a:ln w="28575">
+            <a:solidFill>
+              <a:srgbClr val="00B050"/>
+            </a:solidFill>
+            <a:tailEnd type="arrow"/>
+          </a:ln>
+        </p:spPr>
+        <p:style>
+          <a:lnRef idx="1">
+            <a:schemeClr val="accent1"/>
+          </a:lnRef>
+          <a:fillRef idx="0">
+            <a:schemeClr val="accent1"/>
+          </a:fillRef>
+          <a:effectRef idx="0">
+            <a:schemeClr val="accent1"/>
+          </a:effectRef>
+          <a:fontRef idx="minor">
+            <a:schemeClr val="tx1"/>
+          </a:fontRef>
+        </p:style>
+      </p:cxnSp>
+      <p:cxnSp>
+        <p:nvCxnSpPr>
+          <p:cNvPr id="12" name="Straight Arrow Connector 11"/>
+          <p:cNvCxnSpPr/>
+          <p:nvPr/>
+        </p:nvCxnSpPr>
+        <p:spPr>
+          <a:xfrm>
+            <a:off x="2569639" y="3276600"/>
+            <a:ext cx="838198" cy="0"/>
+          </a:xfrm>
+          <a:prstGeom prst="straightConnector1">
+            <a:avLst/>
+          </a:prstGeom>
+          <a:ln w="28575">
+            <a:solidFill>
+              <a:srgbClr val="00B050"/>
+            </a:solidFill>
+            <a:tailEnd type="arrow"/>
+          </a:ln>
+        </p:spPr>
+        <p:style>
+          <a:lnRef idx="1">
+            <a:schemeClr val="accent1"/>
+          </a:lnRef>
+          <a:fillRef idx="0">
+            <a:schemeClr val="accent1"/>
+          </a:fillRef>
+          <a:effectRef idx="0">
+            <a:schemeClr val="accent1"/>
+          </a:effectRef>
+          <a:fontRef idx="minor">
+            <a:schemeClr val="tx1"/>
+          </a:fontRef>
+        </p:style>
+      </p:cxnSp>
+      <p:cxnSp>
+        <p:nvCxnSpPr>
+          <p:cNvPr id="13" name="Straight Arrow Connector 12"/>
+          <p:cNvCxnSpPr>
+            <a:stCxn id="3" idx="2"/>
+            <a:endCxn id="5" idx="0"/>
+          </p:cNvCxnSpPr>
+          <p:nvPr/>
+        </p:nvCxnSpPr>
+        <p:spPr>
+          <a:xfrm>
+            <a:off x="4059769" y="2743200"/>
+            <a:ext cx="0" cy="381000"/>
+          </a:xfrm>
+          <a:prstGeom prst="straightConnector1">
+            <a:avLst/>
+          </a:prstGeom>
+          <a:ln w="28575">
+            <a:solidFill>
+              <a:srgbClr val="0070C0"/>
+            </a:solidFill>
+            <a:tailEnd type="arrow"/>
+          </a:ln>
+        </p:spPr>
+        <p:style>
+          <a:lnRef idx="1">
+            <a:schemeClr val="accent1"/>
+          </a:lnRef>
+          <a:fillRef idx="0">
+            <a:schemeClr val="accent1"/>
+          </a:fillRef>
+          <a:effectRef idx="0">
+            <a:schemeClr val="accent1"/>
+          </a:effectRef>
+          <a:fontRef idx="minor">
+            <a:schemeClr val="tx1"/>
+          </a:fontRef>
+        </p:style>
+      </p:cxnSp>
+      <p:cxnSp>
+        <p:nvCxnSpPr>
+          <p:cNvPr id="16" name="Straight Arrow Connector 15"/>
+          <p:cNvCxnSpPr/>
+          <p:nvPr/>
+        </p:nvCxnSpPr>
+        <p:spPr>
+          <a:xfrm>
+            <a:off x="4707469" y="2467189"/>
+            <a:ext cx="457200" cy="0"/>
+          </a:xfrm>
+          <a:prstGeom prst="straightConnector1">
+            <a:avLst/>
+          </a:prstGeom>
+          <a:ln w="28575">
+            <a:solidFill>
+              <a:srgbClr val="0070C0"/>
+            </a:solidFill>
+            <a:tailEnd type="arrow"/>
+          </a:ln>
+        </p:spPr>
+        <p:style>
+          <a:lnRef idx="1">
+            <a:schemeClr val="accent1"/>
+          </a:lnRef>
+          <a:fillRef idx="0">
+            <a:schemeClr val="accent1"/>
+          </a:fillRef>
+          <a:effectRef idx="0">
+            <a:schemeClr val="accent1"/>
+          </a:effectRef>
+          <a:fontRef idx="minor">
+            <a:schemeClr val="tx1"/>
+          </a:fontRef>
+        </p:style>
+      </p:cxnSp>
+      <p:sp>
+        <p:nvSpPr>
+          <p:cNvPr id="29" name="Smiley Face 28"/>
+          <p:cNvSpPr/>
+          <p:nvPr/>
+        </p:nvSpPr>
+        <p:spPr>
+          <a:xfrm>
+            <a:off x="1202269" y="2743200"/>
+            <a:ext cx="381000" cy="381000"/>
+          </a:xfrm>
+          <a:prstGeom prst="smileyFace">
+            <a:avLst/>
+          </a:prstGeom>
+          <a:solidFill>
+            <a:schemeClr val="bg1"/>
+          </a:solidFill>
+          <a:ln>
+            <a:solidFill>
+              <a:schemeClr val="tx1"/>
+            </a:solidFill>
+          </a:ln>
+        </p:spPr>
+        <p:style>
+          <a:lnRef idx="2">
+            <a:schemeClr val="accent1">
+              <a:shade val="50000"/>
+            </a:schemeClr>
+          </a:lnRef>
+          <a:fillRef idx="1">
+            <a:schemeClr val="accent1"/>
+          </a:fillRef>
+          <a:effectRef idx="0">
+            <a:schemeClr val="accent1"/>
+          </a:effectRef>
+          <a:fontRef idx="minor">
+            <a:schemeClr val="lt1"/>
+          </a:fontRef>
+        </p:style>
+        <p:txBody>
+          <a:bodyPr rtlCol="0" anchor="ctr"/>
+          <a:lstStyle/>
+          <a:p>
+            <a:pPr algn="ctr"/>
+            <a:endParaRPr lang="en-US"/>
+          </a:p>
+        </p:txBody>
+      </p:sp>
+      <p:cxnSp>
+        <p:nvCxnSpPr>
+          <p:cNvPr id="32" name="Straight Arrow Connector 31"/>
+          <p:cNvCxnSpPr/>
+          <p:nvPr/>
+        </p:nvCxnSpPr>
+        <p:spPr>
+          <a:xfrm flipV="1">
+            <a:off x="1636188" y="2939996"/>
+            <a:ext cx="273050" cy="1"/>
+          </a:xfrm>
+          <a:prstGeom prst="straightConnector1">
+            <a:avLst/>
+          </a:prstGeom>
+          <a:ln w="28575">
+            <a:solidFill>
+              <a:schemeClr val="tx1"/>
+            </a:solidFill>
+            <a:prstDash val="sysDot"/>
+            <a:tailEnd type="arrow"/>
+          </a:ln>
+        </p:spPr>
+        <p:style>
+          <a:lnRef idx="1">
+            <a:schemeClr val="accent1"/>
+          </a:lnRef>
+          <a:fillRef idx="0">
+            <a:schemeClr val="accent1"/>
+          </a:fillRef>
+          <a:effectRef idx="0">
+            <a:schemeClr val="accent1"/>
+          </a:effectRef>
+          <a:fontRef idx="minor">
+            <a:schemeClr val="tx1"/>
+          </a:fontRef>
+        </p:style>
+      </p:cxnSp>
+      <p:cxnSp>
+        <p:nvCxnSpPr>
+          <p:cNvPr id="34" name="Straight Arrow Connector 33"/>
+          <p:cNvCxnSpPr/>
+          <p:nvPr/>
+        </p:nvCxnSpPr>
+        <p:spPr>
+          <a:xfrm flipV="1">
+            <a:off x="6680199" y="2467190"/>
+            <a:ext cx="939801" cy="1"/>
+          </a:xfrm>
+          <a:prstGeom prst="straightConnector1">
+            <a:avLst/>
+          </a:prstGeom>
+          <a:ln w="28575">
+            <a:solidFill>
+              <a:schemeClr val="accent6">
+                <a:lumMod val="75000"/>
+              </a:schemeClr>
+            </a:solidFill>
+            <a:prstDash val="sysDot"/>
+            <a:tailEnd type="arrow"/>
+          </a:ln>
+        </p:spPr>
+        <p:style>
+          <a:lnRef idx="1">
+            <a:schemeClr val="accent1"/>
+          </a:lnRef>
+          <a:fillRef idx="0">
+            <a:schemeClr val="accent1"/>
+          </a:fillRef>
+          <a:effectRef idx="0">
+            <a:schemeClr val="accent1"/>
+          </a:effectRef>
+          <a:fontRef idx="minor">
+            <a:schemeClr val="tx1"/>
+          </a:fontRef>
+        </p:style>
+      </p:cxnSp>
+      <p:sp>
+        <p:nvSpPr>
+          <p:cNvPr id="35" name="Folded Corner 34"/>
+          <p:cNvSpPr/>
+          <p:nvPr/>
+        </p:nvSpPr>
+        <p:spPr>
+          <a:xfrm>
+            <a:off x="7679269" y="2286000"/>
+            <a:ext cx="381000" cy="381000"/>
+          </a:xfrm>
+          <a:prstGeom prst="foldedCorner">
+            <a:avLst/>
+          </a:prstGeom>
+          <a:solidFill>
+            <a:schemeClr val="bg1"/>
+          </a:solidFill>
+          <a:ln>
+            <a:solidFill>
+              <a:schemeClr val="tx1"/>
+            </a:solidFill>
+          </a:ln>
+        </p:spPr>
+        <p:style>
+          <a:lnRef idx="2">
+            <a:schemeClr val="accent1">
+              <a:shade val="50000"/>
+            </a:schemeClr>
+          </a:lnRef>
+          <a:fillRef idx="1">
+            <a:schemeClr val="accent1"/>
+          </a:fillRef>
+          <a:effectRef idx="0">
+            <a:schemeClr val="accent1"/>
+          </a:effectRef>
+          <a:fontRef idx="minor">
+            <a:schemeClr val="lt1"/>
+          </a:fontRef>
+        </p:style>
+        <p:txBody>
+          <a:bodyPr rtlCol="0" anchor="ctr"/>
+          <a:lstStyle/>
+          <a:p>
+            <a:pPr algn="ctr"/>
+            <a:endParaRPr lang="en-US"/>
+          </a:p>
+        </p:txBody>
+      </p:sp>
+      <p:sp>
+        <p:nvSpPr>
+          <p:cNvPr id="36" name="Folded Corner 35"/>
+          <p:cNvSpPr/>
+          <p:nvPr/>
+        </p:nvSpPr>
+        <p:spPr>
+          <a:xfrm>
+            <a:off x="7772400" y="2362200"/>
+            <a:ext cx="381000" cy="381000"/>
+          </a:xfrm>
+          <a:prstGeom prst="foldedCorner">
+            <a:avLst/>
+          </a:prstGeom>
+          <a:solidFill>
+            <a:schemeClr val="bg1"/>
+          </a:solidFill>
+          <a:ln>
+            <a:solidFill>
+              <a:schemeClr val="tx1"/>
+            </a:solidFill>
+          </a:ln>
+        </p:spPr>
+        <p:style>
+          <a:lnRef idx="2">
+            <a:schemeClr val="accent1">
+              <a:shade val="50000"/>
+            </a:schemeClr>
+          </a:lnRef>
+          <a:fillRef idx="1">
+            <a:schemeClr val="accent1"/>
+          </a:fillRef>
+          <a:effectRef idx="0">
+            <a:schemeClr val="accent1"/>
+          </a:effectRef>
+          <a:fontRef idx="minor">
+            <a:schemeClr val="lt1"/>
+          </a:fontRef>
+        </p:style>
+        <p:txBody>
+          <a:bodyPr rtlCol="0" anchor="ctr"/>
+          <a:lstStyle/>
+          <a:p>
+            <a:pPr algn="ctr"/>
+            <a:endParaRPr lang="en-US"/>
+          </a:p>
+        </p:txBody>
+      </p:sp>
+      <p:sp>
+        <p:nvSpPr>
+          <p:cNvPr id="23" name="Rectangle 62"/>
+          <p:cNvSpPr/>
+          <p:nvPr/>
+        </p:nvSpPr>
+        <p:spPr>
+          <a:xfrm flipH="1">
+            <a:off x="1964269" y="3959459"/>
+            <a:ext cx="778931" cy="570908"/>
+          </a:xfrm>
+          <a:prstGeom prst="roundRect">
+            <a:avLst/>
+          </a:prstGeom>
+          <a:solidFill>
+            <a:srgbClr val="C00000"/>
+          </a:solidFill>
+          <a:ln w="19050">
+            <a:solidFill>
+              <a:srgbClr val="C00000"/>
+            </a:solidFill>
+          </a:ln>
+          <a:effectLst/>
+        </p:spPr>
+        <p:style>
+          <a:lnRef idx="1">
+            <a:schemeClr val="accent2"/>
+          </a:lnRef>
+          <a:fillRef idx="2">
+            <a:schemeClr val="accent2"/>
+          </a:fillRef>
+          <a:effectRef idx="1">
+            <a:schemeClr val="accent2"/>
+          </a:effectRef>
+          <a:fontRef idx="minor">
+            <a:schemeClr val="dk1"/>
+          </a:fontRef>
+        </p:style>
+        <p:txBody>
+          <a:bodyPr rtlCol="0" anchor="ctr"/>
+          <a:lstStyle/>
+          <a:p>
+            <a:pPr algn="ctr"/>
+            <a:r>
+              <a:rPr lang="en-US" sz="1600" dirty="0">
+                <a:solidFill>
+                  <a:schemeClr val="bg1"/>
+                </a:solidFill>
+              </a:rPr>
+              <a:t>Main</a:t>
+            </a:r>
+            <a:endParaRPr lang="en-SG" sz="1600" dirty="0">
+              <a:solidFill>
+                <a:schemeClr val="bg1"/>
+              </a:solidFill>
+            </a:endParaRPr>
+          </a:p>
+        </p:txBody>
+      </p:sp>
+      <p:cxnSp>
+        <p:nvCxnSpPr>
+          <p:cNvPr id="30" name="Straight Arrow Connector 29"/>
+          <p:cNvCxnSpPr/>
+          <p:nvPr/>
+        </p:nvCxnSpPr>
+        <p:spPr>
+          <a:xfrm>
+            <a:off x="4945047" y="3750994"/>
+            <a:ext cx="0" cy="381000"/>
+          </a:xfrm>
+          <a:prstGeom prst="straightConnector1">
+            <a:avLst/>
+          </a:prstGeom>
+          <a:ln w="28575">
+            <a:solidFill>
+              <a:schemeClr val="accent5">
+                <a:lumMod val="75000"/>
+              </a:schemeClr>
+            </a:solidFill>
+            <a:prstDash val="sysDot"/>
+            <a:tailEnd type="arrow"/>
+          </a:ln>
+        </p:spPr>
+        <p:style>
+          <a:lnRef idx="1">
+            <a:schemeClr val="accent1"/>
+          </a:lnRef>
+          <a:fillRef idx="0">
+            <a:schemeClr val="accent1"/>
+          </a:fillRef>
+          <a:effectRef idx="0">
+            <a:schemeClr val="accent1"/>
+          </a:effectRef>
+          <a:fontRef idx="minor">
+            <a:schemeClr val="tx1"/>
+          </a:fontRef>
+        </p:style>
+      </p:cxnSp>
+      <p:cxnSp>
+        <p:nvCxnSpPr>
+          <p:cNvPr id="31" name="Straight Arrow Connector 30"/>
+          <p:cNvCxnSpPr/>
+          <p:nvPr/>
+        </p:nvCxnSpPr>
+        <p:spPr>
+          <a:xfrm>
+            <a:off x="5097447" y="3761908"/>
+            <a:ext cx="0" cy="381000"/>
+          </a:xfrm>
+          <a:prstGeom prst="straightConnector1">
+            <a:avLst/>
+          </a:prstGeom>
+          <a:ln w="28575">
+            <a:solidFill>
+              <a:schemeClr val="accent5">
+                <a:lumMod val="75000"/>
+              </a:schemeClr>
+            </a:solidFill>
+            <a:prstDash val="sysDot"/>
+            <a:tailEnd type="arrow"/>
+          </a:ln>
+        </p:spPr>
+        <p:style>
+          <a:lnRef idx="1">
+            <a:schemeClr val="accent1"/>
+          </a:lnRef>
+          <a:fillRef idx="0">
+            <a:schemeClr val="accent1"/>
+          </a:fillRef>
+          <a:effectRef idx="0">
+            <a:schemeClr val="accent1"/>
+          </a:effectRef>
+          <a:fontRef idx="minor">
+            <a:schemeClr val="tx1"/>
+          </a:fontRef>
+        </p:style>
+      </p:cxnSp>
+      <p:cxnSp>
+        <p:nvCxnSpPr>
+          <p:cNvPr id="33" name="Straight Arrow Connector 32"/>
+          <p:cNvCxnSpPr/>
+          <p:nvPr/>
+        </p:nvCxnSpPr>
+        <p:spPr>
+          <a:xfrm>
+            <a:off x="5249847" y="3750994"/>
+            <a:ext cx="0" cy="381000"/>
+          </a:xfrm>
+          <a:prstGeom prst="straightConnector1">
+            <a:avLst/>
+          </a:prstGeom>
+          <a:ln w="28575">
+            <a:solidFill>
+              <a:schemeClr val="accent5">
+                <a:lumMod val="75000"/>
+              </a:schemeClr>
+            </a:solidFill>
+            <a:prstDash val="sysDot"/>
+            <a:tailEnd type="arrow"/>
+          </a:ln>
+        </p:spPr>
+        <p:style>
+          <a:lnRef idx="1">
+            <a:schemeClr val="accent1"/>
+          </a:lnRef>
+          <a:fillRef idx="0">
+            <a:schemeClr val="accent1"/>
+          </a:fillRef>
+          <a:effectRef idx="0">
+            <a:schemeClr val="accent1"/>
+          </a:effectRef>
+          <a:fontRef idx="minor">
+            <a:schemeClr val="tx1"/>
+          </a:fontRef>
+        </p:style>
+      </p:cxnSp>
+      <p:cxnSp>
+        <p:nvCxnSpPr>
+          <p:cNvPr id="37" name="Straight Arrow Connector 36"/>
+          <p:cNvCxnSpPr>
+            <a:stCxn id="23" idx="1"/>
+          </p:cNvCxnSpPr>
+          <p:nvPr/>
+        </p:nvCxnSpPr>
+        <p:spPr>
+          <a:xfrm>
+            <a:off x="2743200" y="4244913"/>
+            <a:ext cx="249770" cy="0"/>
+          </a:xfrm>
+          <a:prstGeom prst="straightConnector1">
+            <a:avLst/>
+          </a:prstGeom>
+          <a:ln w="28575">
+            <a:solidFill>
+              <a:srgbClr val="C00000"/>
+            </a:solidFill>
+            <a:prstDash val="solid"/>
+            <a:tailEnd type="arrow"/>
+          </a:ln>
+        </p:spPr>
+        <p:style>
+          <a:lnRef idx="1">
+            <a:schemeClr val="accent1"/>
+          </a:lnRef>
+          <a:fillRef idx="0">
+            <a:schemeClr val="accent1"/>
+          </a:fillRef>
+          <a:effectRef idx="0">
+            <a:schemeClr val="accent1"/>
+          </a:effectRef>
+          <a:fontRef idx="minor">
+            <a:schemeClr val="tx1"/>
+          </a:fontRef>
+        </p:style>
+      </p:cxnSp>
+      <p:cxnSp>
+        <p:nvCxnSpPr>
+          <p:cNvPr id="38" name="Straight Arrow Connector 37"/>
+          <p:cNvCxnSpPr/>
+          <p:nvPr/>
+        </p:nvCxnSpPr>
+        <p:spPr>
+          <a:xfrm rot="13867188">
+            <a:off x="2743200" y="3755022"/>
+            <a:ext cx="0" cy="381000"/>
+          </a:xfrm>
+          <a:prstGeom prst="straightConnector1">
+            <a:avLst/>
+          </a:prstGeom>
+          <a:ln w="28575">
+            <a:solidFill>
+              <a:srgbClr val="C00000"/>
+            </a:solidFill>
+            <a:prstDash val="solid"/>
+            <a:tailEnd type="arrow"/>
+          </a:ln>
+        </p:spPr>
+        <p:style>
+          <a:lnRef idx="1">
+            <a:schemeClr val="accent1"/>
+          </a:lnRef>
+          <a:fillRef idx="0">
+            <a:schemeClr val="accent1"/>
+          </a:fillRef>
+          <a:effectRef idx="0">
+            <a:schemeClr val="accent1"/>
+          </a:effectRef>
+          <a:fontRef idx="minor">
+            <a:schemeClr val="tx1"/>
+          </a:fontRef>
+        </p:style>
+      </p:cxnSp>
+      <p:cxnSp>
+        <p:nvCxnSpPr>
+          <p:cNvPr id="39" name="Straight Arrow Connector 38"/>
+          <p:cNvCxnSpPr/>
+          <p:nvPr/>
+        </p:nvCxnSpPr>
+        <p:spPr>
+          <a:xfrm flipV="1">
+            <a:off x="2353734" y="3697061"/>
+            <a:ext cx="0" cy="301859"/>
+          </a:xfrm>
+          <a:prstGeom prst="straightConnector1">
+            <a:avLst/>
+          </a:prstGeom>
+          <a:ln w="28575">
+            <a:solidFill>
+              <a:srgbClr val="C00000"/>
+            </a:solidFill>
+            <a:prstDash val="solid"/>
+            <a:tailEnd type="arrow"/>
+          </a:ln>
+        </p:spPr>
+        <p:style>
+          <a:lnRef idx="1">
+            <a:schemeClr val="accent1"/>
+          </a:lnRef>
+          <a:fillRef idx="0">
+            <a:schemeClr val="accent1"/>
+          </a:fillRef>
+          <a:effectRef idx="0">
+            <a:schemeClr val="accent1"/>
+          </a:effectRef>
+          <a:fontRef idx="minor">
+            <a:schemeClr val="tx1"/>
+          </a:fontRef>
+        </p:style>
+      </p:cxnSp>
+      <p:sp>
+        <p:nvSpPr>
+          <p:cNvPr id="6" name="Oval 5"/>
+          <p:cNvSpPr/>
+          <p:nvPr/>
+        </p:nvSpPr>
+        <p:spPr>
+          <a:xfrm>
+            <a:off x="4936069" y="2909316"/>
+            <a:ext cx="1219201" cy="533400"/>
+          </a:xfrm>
+          <a:prstGeom prst="ellipse">
+            <a:avLst/>
+          </a:prstGeom>
+          <a:solidFill>
+            <a:schemeClr val="accent5">
+              <a:lumMod val="75000"/>
+            </a:schemeClr>
+          </a:solidFill>
+          <a:ln w="19050">
+            <a:solidFill>
+              <a:schemeClr val="accent5">
+                <a:lumMod val="75000"/>
+              </a:schemeClr>
+            </a:solidFill>
+          </a:ln>
+          <a:effectLst/>
+        </p:spPr>
+        <p:style>
+          <a:lnRef idx="1">
+            <a:schemeClr val="accent5"/>
+          </a:lnRef>
+          <a:fillRef idx="2">
+            <a:schemeClr val="accent5"/>
+          </a:fillRef>
+          <a:effectRef idx="1">
+            <a:schemeClr val="accent5"/>
+          </a:effectRef>
+          <a:fontRef idx="minor">
+            <a:schemeClr val="dk1"/>
+          </a:fontRef>
+        </p:style>
+        <p:txBody>
+          <a:bodyPr rtlCol="0" anchor="ctr"/>
+          <a:lstStyle/>
+          <a:p>
+            <a:pPr algn="ctr"/>
+            <a:r>
+              <a:rPr lang="en-US" sz="1600" dirty="0">
+                <a:solidFill>
+                  <a:schemeClr val="bg1"/>
+                </a:solidFill>
+              </a:rPr>
+              <a:t>Events Center</a:t>
+            </a:r>
+          </a:p>
+        </p:txBody>
+      </p:sp>
+      <p:sp>
+        <p:nvSpPr>
+          <p:cNvPr id="26" name="Oval 25"/>
+          <p:cNvSpPr/>
+          <p:nvPr/>
+        </p:nvSpPr>
+        <p:spPr>
+          <a:xfrm>
+            <a:off x="5888569" y="3515641"/>
+            <a:ext cx="1219201" cy="533400"/>
+          </a:xfrm>
+          <a:prstGeom prst="ellipse">
+            <a:avLst/>
+          </a:prstGeom>
+          <a:solidFill>
+            <a:schemeClr val="accent5">
+              <a:lumMod val="75000"/>
+            </a:schemeClr>
+          </a:solidFill>
+          <a:ln w="19050">
+            <a:solidFill>
+              <a:schemeClr val="accent5">
+                <a:lumMod val="75000"/>
+              </a:schemeClr>
+            </a:solidFill>
+          </a:ln>
+          <a:effectLst/>
+        </p:spPr>
+        <p:style>
+          <a:lnRef idx="1">
+            <a:schemeClr val="accent5"/>
+          </a:lnRef>
+          <a:fillRef idx="2">
+            <a:schemeClr val="accent5"/>
+          </a:fillRef>
+          <a:effectRef idx="1">
+            <a:schemeClr val="accent5"/>
+          </a:effectRef>
+          <a:fontRef idx="minor">
+            <a:schemeClr val="dk1"/>
+          </a:fontRef>
+        </p:style>
+        <p:txBody>
+          <a:bodyPr rtlCol="0" anchor="ctr"/>
+          <a:lstStyle/>
+          <a:p>
+            <a:pPr algn="ctr"/>
+            <a:r>
+              <a:rPr lang="en-US" sz="1600" dirty="0">
+                <a:solidFill>
+                  <a:schemeClr val="bg1"/>
+                </a:solidFill>
+              </a:rPr>
+              <a:t>Logs</a:t>
+            </a:r>
+            <a:br>
+              <a:rPr lang="en-US" sz="1600" dirty="0">
+                <a:solidFill>
+                  <a:schemeClr val="bg1"/>
+                </a:solidFill>
+              </a:rPr>
+            </a:br>
+            <a:r>
+              <a:rPr lang="en-US" sz="1600" dirty="0">
+                <a:solidFill>
+                  <a:schemeClr val="bg1"/>
+                </a:solidFill>
+              </a:rPr>
+              <a:t>Center</a:t>
+            </a:r>
+          </a:p>
+        </p:txBody>
+      </p:sp>
+      <p:cxnSp>
+        <p:nvCxnSpPr>
+          <p:cNvPr id="40" name="Elbow Connector 39"/>
+          <p:cNvCxnSpPr>
+            <a:stCxn id="26" idx="4"/>
+            <a:endCxn id="8" idx="3"/>
+          </p:cNvCxnSpPr>
+          <p:nvPr/>
+        </p:nvCxnSpPr>
+        <p:spPr>
+          <a:xfrm rot="5400000">
+            <a:off x="6034638" y="3890781"/>
+            <a:ext cx="305273" cy="621793"/>
+          </a:xfrm>
+          <a:prstGeom prst="bentConnector2">
+            <a:avLst/>
+          </a:prstGeom>
+          <a:ln w="28575">
+            <a:solidFill>
+              <a:schemeClr val="accent5">
+                <a:lumMod val="75000"/>
+              </a:schemeClr>
+            </a:solidFill>
+          </a:ln>
+        </p:spPr>
+        <p:style>
+          <a:lnRef idx="1">
+            <a:schemeClr val="accent1"/>
+          </a:lnRef>
+          <a:fillRef idx="0">
+            <a:schemeClr val="accent1"/>
+          </a:fillRef>
+          <a:effectRef idx="0">
+            <a:schemeClr val="accent1"/>
+          </a:effectRef>
+          <a:fontRef idx="minor">
+            <a:schemeClr val="tx1"/>
+          </a:fontRef>
+        </p:style>
+      </p:cxnSp>
+      <p:cxnSp>
+        <p:nvCxnSpPr>
+          <p:cNvPr id="9" name="Elbow Connector 8"/>
+          <p:cNvCxnSpPr>
+            <a:stCxn id="6" idx="4"/>
+          </p:cNvCxnSpPr>
+          <p:nvPr/>
+        </p:nvCxnSpPr>
+        <p:spPr>
+          <a:xfrm rot="5400000">
+            <a:off x="5195574" y="3792812"/>
+            <a:ext cx="700192" cy="1"/>
+          </a:xfrm>
+          <a:prstGeom prst="bentConnector3">
+            <a:avLst/>
+          </a:prstGeom>
+          <a:ln w="28575">
+            <a:solidFill>
+              <a:schemeClr val="accent5">
+                <a:lumMod val="75000"/>
+              </a:schemeClr>
+            </a:solidFill>
+          </a:ln>
+        </p:spPr>
+        <p:style>
+          <a:lnRef idx="1">
+            <a:schemeClr val="accent1"/>
+          </a:lnRef>
+          <a:fillRef idx="0">
+            <a:schemeClr val="accent1"/>
+          </a:fillRef>
+          <a:effectRef idx="0">
+            <a:schemeClr val="accent1"/>
+          </a:effectRef>
+          <a:fontRef idx="minor">
+            <a:schemeClr val="tx1"/>
+          </a:fontRef>
+        </p:style>
+      </p:cxnSp>
+    </p:spTree>
+    <p:extLst>
+      <p:ext uri="{BB962C8B-B14F-4D97-AF65-F5344CB8AC3E}">
+        <p14:creationId xmlns:p14="http://schemas.microsoft.com/office/powerpoint/2010/main" val="2698971452"/>
       </p:ext>
     </p:extLst>
   </p:cSld>

</xml_diff>